<commit_message>
Context and 0 level added
</commit_message>
<xml_diff>
--- a/report/Child education Diagrams.pptx
+++ b/report/Child education Diagrams.pptx
@@ -6,6 +6,7 @@
   </p:sldMasterIdLst>
   <p:sldIdLst>
     <p:sldId id="256" r:id="rId2"/>
+    <p:sldId id="257" r:id="rId3"/>
   </p:sldIdLst>
   <p:sldSz cx="9144000" cy="6858000" type="screen4x3"/>
   <p:notesSz cx="6858000" cy="9144000"/>
@@ -288,6 +289,7 @@
           <a:p>
             <a:fld id="{1C2E6CAD-E44B-47CA-902C-3E943E2AE032}" type="datetimeFigureOut">
               <a:rPr lang="en-US" smtClean="0"/>
+              <a:pPr/>
               <a:t>12/29/2012</a:t>
             </a:fld>
             <a:endParaRPr lang="en-US"/>
@@ -330,6 +332,7 @@
           <a:p>
             <a:fld id="{A5FF2893-11F5-468B-9C2E-B99862B9133F}" type="slidenum">
               <a:rPr lang="en-US" smtClean="0"/>
+              <a:pPr/>
               <a:t>‹#›</a:t>
             </a:fld>
             <a:endParaRPr lang="en-US"/>
@@ -453,6 +456,7 @@
           <a:p>
             <a:fld id="{1C2E6CAD-E44B-47CA-902C-3E943E2AE032}" type="datetimeFigureOut">
               <a:rPr lang="en-US" smtClean="0"/>
+              <a:pPr/>
               <a:t>12/29/2012</a:t>
             </a:fld>
             <a:endParaRPr lang="en-US"/>
@@ -495,6 +499,7 @@
           <a:p>
             <a:fld id="{A5FF2893-11F5-468B-9C2E-B99862B9133F}" type="slidenum">
               <a:rPr lang="en-US" smtClean="0"/>
+              <a:pPr/>
               <a:t>‹#›</a:t>
             </a:fld>
             <a:endParaRPr lang="en-US"/>
@@ -628,6 +633,7 @@
           <a:p>
             <a:fld id="{1C2E6CAD-E44B-47CA-902C-3E943E2AE032}" type="datetimeFigureOut">
               <a:rPr lang="en-US" smtClean="0"/>
+              <a:pPr/>
               <a:t>12/29/2012</a:t>
             </a:fld>
             <a:endParaRPr lang="en-US"/>
@@ -670,6 +676,7 @@
           <a:p>
             <a:fld id="{A5FF2893-11F5-468B-9C2E-B99862B9133F}" type="slidenum">
               <a:rPr lang="en-US" smtClean="0"/>
+              <a:pPr/>
               <a:t>‹#›</a:t>
             </a:fld>
             <a:endParaRPr lang="en-US"/>
@@ -793,6 +800,7 @@
           <a:p>
             <a:fld id="{1C2E6CAD-E44B-47CA-902C-3E943E2AE032}" type="datetimeFigureOut">
               <a:rPr lang="en-US" smtClean="0"/>
+              <a:pPr/>
               <a:t>12/29/2012</a:t>
             </a:fld>
             <a:endParaRPr lang="en-US"/>
@@ -835,6 +843,7 @@
           <a:p>
             <a:fld id="{A5FF2893-11F5-468B-9C2E-B99862B9133F}" type="slidenum">
               <a:rPr lang="en-US" smtClean="0"/>
+              <a:pPr/>
               <a:t>‹#›</a:t>
             </a:fld>
             <a:endParaRPr lang="en-US"/>
@@ -1034,6 +1043,7 @@
           <a:p>
             <a:fld id="{1C2E6CAD-E44B-47CA-902C-3E943E2AE032}" type="datetimeFigureOut">
               <a:rPr lang="en-US" smtClean="0"/>
+              <a:pPr/>
               <a:t>12/29/2012</a:t>
             </a:fld>
             <a:endParaRPr lang="en-US"/>
@@ -1076,6 +1086,7 @@
           <a:p>
             <a:fld id="{A5FF2893-11F5-468B-9C2E-B99862B9133F}" type="slidenum">
               <a:rPr lang="en-US" smtClean="0"/>
+              <a:pPr/>
               <a:t>‹#›</a:t>
             </a:fld>
             <a:endParaRPr lang="en-US"/>
@@ -1317,6 +1328,7 @@
           <a:p>
             <a:fld id="{1C2E6CAD-E44B-47CA-902C-3E943E2AE032}" type="datetimeFigureOut">
               <a:rPr lang="en-US" smtClean="0"/>
+              <a:pPr/>
               <a:t>12/29/2012</a:t>
             </a:fld>
             <a:endParaRPr lang="en-US"/>
@@ -1359,6 +1371,7 @@
           <a:p>
             <a:fld id="{A5FF2893-11F5-468B-9C2E-B99862B9133F}" type="slidenum">
               <a:rPr lang="en-US" smtClean="0"/>
+              <a:pPr/>
               <a:t>‹#›</a:t>
             </a:fld>
             <a:endParaRPr lang="en-US"/>
@@ -1734,6 +1747,7 @@
           <a:p>
             <a:fld id="{1C2E6CAD-E44B-47CA-902C-3E943E2AE032}" type="datetimeFigureOut">
               <a:rPr lang="en-US" smtClean="0"/>
+              <a:pPr/>
               <a:t>12/29/2012</a:t>
             </a:fld>
             <a:endParaRPr lang="en-US"/>
@@ -1776,6 +1790,7 @@
           <a:p>
             <a:fld id="{A5FF2893-11F5-468B-9C2E-B99862B9133F}" type="slidenum">
               <a:rPr lang="en-US" smtClean="0"/>
+              <a:pPr/>
               <a:t>‹#›</a:t>
             </a:fld>
             <a:endParaRPr lang="en-US"/>
@@ -1847,6 +1862,7 @@
           <a:p>
             <a:fld id="{1C2E6CAD-E44B-47CA-902C-3E943E2AE032}" type="datetimeFigureOut">
               <a:rPr lang="en-US" smtClean="0"/>
+              <a:pPr/>
               <a:t>12/29/2012</a:t>
             </a:fld>
             <a:endParaRPr lang="en-US"/>
@@ -1889,6 +1905,7 @@
           <a:p>
             <a:fld id="{A5FF2893-11F5-468B-9C2E-B99862B9133F}" type="slidenum">
               <a:rPr lang="en-US" smtClean="0"/>
+              <a:pPr/>
               <a:t>‹#›</a:t>
             </a:fld>
             <a:endParaRPr lang="en-US"/>
@@ -1937,6 +1954,7 @@
           <a:p>
             <a:fld id="{1C2E6CAD-E44B-47CA-902C-3E943E2AE032}" type="datetimeFigureOut">
               <a:rPr lang="en-US" smtClean="0"/>
+              <a:pPr/>
               <a:t>12/29/2012</a:t>
             </a:fld>
             <a:endParaRPr lang="en-US"/>
@@ -1979,6 +1997,7 @@
           <a:p>
             <a:fld id="{A5FF2893-11F5-468B-9C2E-B99862B9133F}" type="slidenum">
               <a:rPr lang="en-US" smtClean="0"/>
+              <a:pPr/>
               <a:t>‹#›</a:t>
             </a:fld>
             <a:endParaRPr lang="en-US"/>
@@ -2209,6 +2228,7 @@
           <a:p>
             <a:fld id="{1C2E6CAD-E44B-47CA-902C-3E943E2AE032}" type="datetimeFigureOut">
               <a:rPr lang="en-US" smtClean="0"/>
+              <a:pPr/>
               <a:t>12/29/2012</a:t>
             </a:fld>
             <a:endParaRPr lang="en-US"/>
@@ -2251,6 +2271,7 @@
           <a:p>
             <a:fld id="{A5FF2893-11F5-468B-9C2E-B99862B9133F}" type="slidenum">
               <a:rPr lang="en-US" smtClean="0"/>
+              <a:pPr/>
               <a:t>‹#›</a:t>
             </a:fld>
             <a:endParaRPr lang="en-US"/>
@@ -2457,6 +2478,7 @@
           <a:p>
             <a:fld id="{1C2E6CAD-E44B-47CA-902C-3E943E2AE032}" type="datetimeFigureOut">
               <a:rPr lang="en-US" smtClean="0"/>
+              <a:pPr/>
               <a:t>12/29/2012</a:t>
             </a:fld>
             <a:endParaRPr lang="en-US"/>
@@ -2499,6 +2521,7 @@
           <a:p>
             <a:fld id="{A5FF2893-11F5-468B-9C2E-B99862B9133F}" type="slidenum">
               <a:rPr lang="en-US" smtClean="0"/>
+              <a:pPr/>
               <a:t>‹#›</a:t>
             </a:fld>
             <a:endParaRPr lang="en-US"/>
@@ -2665,6 +2688,7 @@
           <a:p>
             <a:fld id="{1C2E6CAD-E44B-47CA-902C-3E943E2AE032}" type="datetimeFigureOut">
               <a:rPr lang="en-US" smtClean="0"/>
+              <a:pPr/>
               <a:t>12/29/2012</a:t>
             </a:fld>
             <a:endParaRPr lang="en-US"/>
@@ -2743,6 +2767,7 @@
           <a:p>
             <a:fld id="{A5FF2893-11F5-468B-9C2E-B99862B9133F}" type="slidenum">
               <a:rPr lang="en-US" smtClean="0"/>
+              <a:pPr/>
               <a:t>‹#›</a:t>
             </a:fld>
             <a:endParaRPr lang="en-US"/>
@@ -3037,7 +3062,7 @@
       </p:grpSpPr>
       <p:grpSp>
         <p:nvGrpSpPr>
-          <p:cNvPr id="6" name="Group 5"/>
+          <p:cNvPr id="2" name="Group 5"/>
           <p:cNvGrpSpPr/>
           <p:nvPr/>
         </p:nvGrpSpPr>
@@ -3140,7 +3165,7 @@
       </p:grpSp>
       <p:grpSp>
         <p:nvGrpSpPr>
-          <p:cNvPr id="9" name="Group 8"/>
+          <p:cNvPr id="3" name="Group 8"/>
           <p:cNvGrpSpPr/>
           <p:nvPr/>
         </p:nvGrpSpPr>
@@ -3231,7 +3256,7 @@
       </p:grpSp>
       <p:grpSp>
         <p:nvGrpSpPr>
-          <p:cNvPr id="10" name="Group 9"/>
+          <p:cNvPr id="6" name="Group 9"/>
           <p:cNvGrpSpPr/>
           <p:nvPr/>
         </p:nvGrpSpPr>
@@ -3323,7 +3348,7 @@
       </p:grpSp>
       <p:grpSp>
         <p:nvGrpSpPr>
-          <p:cNvPr id="13" name="Group 12"/>
+          <p:cNvPr id="9" name="Group 12"/>
           <p:cNvGrpSpPr/>
           <p:nvPr/>
         </p:nvGrpSpPr>
@@ -3415,7 +3440,7 @@
       </p:grpSp>
       <p:grpSp>
         <p:nvGrpSpPr>
-          <p:cNvPr id="16" name="Group 15"/>
+          <p:cNvPr id="10" name="Group 15"/>
           <p:cNvGrpSpPr/>
           <p:nvPr/>
         </p:nvGrpSpPr>
@@ -3507,7 +3532,7 @@
       </p:grpSp>
       <p:grpSp>
         <p:nvGrpSpPr>
-          <p:cNvPr id="19" name="Group 18"/>
+          <p:cNvPr id="13" name="Group 18"/>
           <p:cNvGrpSpPr/>
           <p:nvPr/>
         </p:nvGrpSpPr>
@@ -4348,6 +4373,3503 @@
               <a:t>Transaction status  </a:t>
             </a:r>
             <a:endParaRPr lang="en-US" sz="1400" dirty="0"/>
+          </a:p>
+        </p:txBody>
+      </p:sp>
+    </p:spTree>
+  </p:cSld>
+  <p:clrMapOvr>
+    <a:masterClrMapping/>
+  </p:clrMapOvr>
+</p:sld>
+</file>
+
+<file path=ppt/slides/slide2.xml><?xml version="1.0" encoding="utf-8"?>
+<p:sld xmlns:a="http://schemas.openxmlformats.org/drawingml/2006/main" xmlns:r="http://schemas.openxmlformats.org/officeDocument/2006/relationships" xmlns:p="http://schemas.openxmlformats.org/presentationml/2006/main">
+  <p:cSld>
+    <p:spTree>
+      <p:nvGrpSpPr>
+        <p:cNvPr id="1" name=""/>
+        <p:cNvGrpSpPr/>
+        <p:nvPr/>
+      </p:nvGrpSpPr>
+      <p:grpSpPr>
+        <a:xfrm>
+          <a:off x="0" y="0"/>
+          <a:ext cx="0" cy="0"/>
+          <a:chOff x="0" y="0"/>
+          <a:chExt cx="0" cy="0"/>
+        </a:xfrm>
+      </p:grpSpPr>
+      <p:grpSp>
+        <p:nvGrpSpPr>
+          <p:cNvPr id="2" name="Group 8"/>
+          <p:cNvGrpSpPr/>
+          <p:nvPr/>
+        </p:nvGrpSpPr>
+        <p:grpSpPr>
+          <a:xfrm>
+            <a:off x="6477000" y="6172200"/>
+            <a:ext cx="1524000" cy="457200"/>
+            <a:chOff x="1219200" y="1371600"/>
+            <a:chExt cx="1524000" cy="457200"/>
+          </a:xfrm>
+        </p:grpSpPr>
+        <p:sp>
+          <p:nvSpPr>
+            <p:cNvPr id="7" name="Rectangle 6"/>
+            <p:cNvSpPr/>
+            <p:nvPr/>
+          </p:nvSpPr>
+          <p:spPr>
+            <a:xfrm>
+              <a:off x="1219200" y="1371600"/>
+              <a:ext cx="1524000" cy="457200"/>
+            </a:xfrm>
+            <a:prstGeom prst="rect">
+              <a:avLst/>
+            </a:prstGeom>
+            <a:noFill/>
+            <a:ln>
+              <a:solidFill>
+                <a:schemeClr val="tx1"/>
+              </a:solidFill>
+            </a:ln>
+          </p:spPr>
+          <p:style>
+            <a:lnRef idx="2">
+              <a:schemeClr val="accent1">
+                <a:shade val="50000"/>
+              </a:schemeClr>
+            </a:lnRef>
+            <a:fillRef idx="1">
+              <a:schemeClr val="accent1"/>
+            </a:fillRef>
+            <a:effectRef idx="0">
+              <a:schemeClr val="accent1"/>
+            </a:effectRef>
+            <a:fontRef idx="minor">
+              <a:schemeClr val="lt1"/>
+            </a:fontRef>
+          </p:style>
+          <p:txBody>
+            <a:bodyPr rtlCol="0" anchor="ctr"/>
+            <a:lstStyle/>
+            <a:p>
+              <a:pPr algn="ctr"/>
+              <a:endParaRPr lang="en-US"/>
+            </a:p>
+          </p:txBody>
+        </p:sp>
+        <p:sp>
+          <p:nvSpPr>
+            <p:cNvPr id="8" name="TextBox 7"/>
+            <p:cNvSpPr txBox="1"/>
+            <p:nvPr/>
+          </p:nvSpPr>
+          <p:spPr>
+            <a:xfrm>
+              <a:off x="1295400" y="1447800"/>
+              <a:ext cx="1414811" cy="307777"/>
+            </a:xfrm>
+            <a:prstGeom prst="rect">
+              <a:avLst/>
+            </a:prstGeom>
+            <a:noFill/>
+          </p:spPr>
+          <p:txBody>
+            <a:bodyPr wrap="none" rtlCol="0">
+              <a:spAutoFit/>
+            </a:bodyPr>
+            <a:lstStyle/>
+            <a:p>
+              <a:r>
+                <a:rPr lang="en-US" sz="1400" dirty="0" smtClean="0"/>
+                <a:t>Online Resource </a:t>
+              </a:r>
+              <a:endParaRPr lang="en-US" sz="1400" dirty="0"/>
+            </a:p>
+          </p:txBody>
+        </p:sp>
+      </p:grpSp>
+      <p:grpSp>
+        <p:nvGrpSpPr>
+          <p:cNvPr id="3" name="Group 9"/>
+          <p:cNvGrpSpPr/>
+          <p:nvPr/>
+        </p:nvGrpSpPr>
+        <p:grpSpPr>
+          <a:xfrm>
+            <a:off x="1143000" y="304800"/>
+            <a:ext cx="1524000" cy="457200"/>
+            <a:chOff x="1219200" y="1371600"/>
+            <a:chExt cx="1524000" cy="457200"/>
+          </a:xfrm>
+        </p:grpSpPr>
+        <p:sp>
+          <p:nvSpPr>
+            <p:cNvPr id="11" name="Rectangle 10"/>
+            <p:cNvSpPr/>
+            <p:nvPr/>
+          </p:nvSpPr>
+          <p:spPr>
+            <a:xfrm>
+              <a:off x="1219200" y="1371600"/>
+              <a:ext cx="1524000" cy="457200"/>
+            </a:xfrm>
+            <a:prstGeom prst="rect">
+              <a:avLst/>
+            </a:prstGeom>
+            <a:noFill/>
+            <a:ln>
+              <a:solidFill>
+                <a:schemeClr val="tx1"/>
+              </a:solidFill>
+            </a:ln>
+          </p:spPr>
+          <p:style>
+            <a:lnRef idx="2">
+              <a:schemeClr val="accent1">
+                <a:shade val="50000"/>
+              </a:schemeClr>
+            </a:lnRef>
+            <a:fillRef idx="1">
+              <a:schemeClr val="accent1"/>
+            </a:fillRef>
+            <a:effectRef idx="0">
+              <a:schemeClr val="accent1"/>
+            </a:effectRef>
+            <a:fontRef idx="minor">
+              <a:schemeClr val="lt1"/>
+            </a:fontRef>
+          </p:style>
+          <p:txBody>
+            <a:bodyPr rtlCol="0" anchor="ctr"/>
+            <a:lstStyle/>
+            <a:p>
+              <a:pPr algn="ctr"/>
+              <a:endParaRPr lang="en-US"/>
+            </a:p>
+          </p:txBody>
+        </p:sp>
+        <p:sp>
+          <p:nvSpPr>
+            <p:cNvPr id="12" name="TextBox 11"/>
+            <p:cNvSpPr txBox="1"/>
+            <p:nvPr/>
+          </p:nvSpPr>
+          <p:spPr>
+            <a:xfrm>
+              <a:off x="1295400" y="1447800"/>
+              <a:ext cx="1371600" cy="307777"/>
+            </a:xfrm>
+            <a:prstGeom prst="rect">
+              <a:avLst/>
+            </a:prstGeom>
+            <a:noFill/>
+          </p:spPr>
+          <p:txBody>
+            <a:bodyPr wrap="square" rtlCol="0">
+              <a:spAutoFit/>
+            </a:bodyPr>
+            <a:lstStyle/>
+            <a:p>
+              <a:pPr algn="ctr"/>
+              <a:r>
+                <a:rPr lang="en-US" sz="1400" dirty="0" smtClean="0"/>
+                <a:t>User</a:t>
+              </a:r>
+              <a:endParaRPr lang="en-US" sz="1400" dirty="0"/>
+            </a:p>
+          </p:txBody>
+        </p:sp>
+      </p:grpSp>
+      <p:grpSp>
+        <p:nvGrpSpPr>
+          <p:cNvPr id="6" name="Group 12"/>
+          <p:cNvGrpSpPr/>
+          <p:nvPr/>
+        </p:nvGrpSpPr>
+        <p:grpSpPr>
+          <a:xfrm>
+            <a:off x="2209800" y="6172200"/>
+            <a:ext cx="1524000" cy="457200"/>
+            <a:chOff x="1219200" y="1371600"/>
+            <a:chExt cx="1524000" cy="457200"/>
+          </a:xfrm>
+        </p:grpSpPr>
+        <p:sp>
+          <p:nvSpPr>
+            <p:cNvPr id="14" name="Rectangle 13"/>
+            <p:cNvSpPr/>
+            <p:nvPr/>
+          </p:nvSpPr>
+          <p:spPr>
+            <a:xfrm>
+              <a:off x="1219200" y="1371600"/>
+              <a:ext cx="1524000" cy="457200"/>
+            </a:xfrm>
+            <a:prstGeom prst="rect">
+              <a:avLst/>
+            </a:prstGeom>
+            <a:noFill/>
+            <a:ln>
+              <a:solidFill>
+                <a:schemeClr val="tx1"/>
+              </a:solidFill>
+            </a:ln>
+          </p:spPr>
+          <p:style>
+            <a:lnRef idx="2">
+              <a:schemeClr val="accent1">
+                <a:shade val="50000"/>
+              </a:schemeClr>
+            </a:lnRef>
+            <a:fillRef idx="1">
+              <a:schemeClr val="accent1"/>
+            </a:fillRef>
+            <a:effectRef idx="0">
+              <a:schemeClr val="accent1"/>
+            </a:effectRef>
+            <a:fontRef idx="minor">
+              <a:schemeClr val="lt1"/>
+            </a:fontRef>
+          </p:style>
+          <p:txBody>
+            <a:bodyPr rtlCol="0" anchor="ctr"/>
+            <a:lstStyle/>
+            <a:p>
+              <a:pPr algn="ctr"/>
+              <a:endParaRPr lang="en-US"/>
+            </a:p>
+          </p:txBody>
+        </p:sp>
+        <p:sp>
+          <p:nvSpPr>
+            <p:cNvPr id="15" name="TextBox 14"/>
+            <p:cNvSpPr txBox="1"/>
+            <p:nvPr/>
+          </p:nvSpPr>
+          <p:spPr>
+            <a:xfrm>
+              <a:off x="1295400" y="1447800"/>
+              <a:ext cx="1371600" cy="307777"/>
+            </a:xfrm>
+            <a:prstGeom prst="rect">
+              <a:avLst/>
+            </a:prstGeom>
+            <a:noFill/>
+          </p:spPr>
+          <p:txBody>
+            <a:bodyPr wrap="square" rtlCol="0">
+              <a:spAutoFit/>
+            </a:bodyPr>
+            <a:lstStyle/>
+            <a:p>
+              <a:pPr algn="ctr"/>
+              <a:r>
+                <a:rPr lang="en-US" sz="1400" dirty="0" smtClean="0"/>
+                <a:t>Exercise</a:t>
+              </a:r>
+              <a:endParaRPr lang="en-US" sz="1400" dirty="0"/>
+            </a:p>
+          </p:txBody>
+        </p:sp>
+      </p:grpSp>
+      <p:grpSp>
+        <p:nvGrpSpPr>
+          <p:cNvPr id="9" name="Group 15"/>
+          <p:cNvGrpSpPr/>
+          <p:nvPr/>
+        </p:nvGrpSpPr>
+        <p:grpSpPr>
+          <a:xfrm>
+            <a:off x="6781800" y="457200"/>
+            <a:ext cx="1676400" cy="457200"/>
+            <a:chOff x="1143000" y="1371600"/>
+            <a:chExt cx="1676400" cy="457200"/>
+          </a:xfrm>
+        </p:grpSpPr>
+        <p:sp>
+          <p:nvSpPr>
+            <p:cNvPr id="17" name="Rectangle 16"/>
+            <p:cNvSpPr/>
+            <p:nvPr/>
+          </p:nvSpPr>
+          <p:spPr>
+            <a:xfrm>
+              <a:off x="1219200" y="1371600"/>
+              <a:ext cx="1524000" cy="457200"/>
+            </a:xfrm>
+            <a:prstGeom prst="rect">
+              <a:avLst/>
+            </a:prstGeom>
+            <a:noFill/>
+            <a:ln>
+              <a:solidFill>
+                <a:schemeClr val="tx1"/>
+              </a:solidFill>
+            </a:ln>
+          </p:spPr>
+          <p:style>
+            <a:lnRef idx="2">
+              <a:schemeClr val="accent1">
+                <a:shade val="50000"/>
+              </a:schemeClr>
+            </a:lnRef>
+            <a:fillRef idx="1">
+              <a:schemeClr val="accent1"/>
+            </a:fillRef>
+            <a:effectRef idx="0">
+              <a:schemeClr val="accent1"/>
+            </a:effectRef>
+            <a:fontRef idx="minor">
+              <a:schemeClr val="lt1"/>
+            </a:fontRef>
+          </p:style>
+          <p:txBody>
+            <a:bodyPr rtlCol="0" anchor="ctr"/>
+            <a:lstStyle/>
+            <a:p>
+              <a:pPr algn="ctr"/>
+              <a:endParaRPr lang="en-US"/>
+            </a:p>
+          </p:txBody>
+        </p:sp>
+        <p:sp>
+          <p:nvSpPr>
+            <p:cNvPr id="18" name="TextBox 17"/>
+            <p:cNvSpPr txBox="1"/>
+            <p:nvPr/>
+          </p:nvSpPr>
+          <p:spPr>
+            <a:xfrm>
+              <a:off x="1143000" y="1447800"/>
+              <a:ext cx="1676400" cy="307777"/>
+            </a:xfrm>
+            <a:prstGeom prst="rect">
+              <a:avLst/>
+            </a:prstGeom>
+            <a:noFill/>
+          </p:spPr>
+          <p:txBody>
+            <a:bodyPr wrap="square" rtlCol="0">
+              <a:spAutoFit/>
+            </a:bodyPr>
+            <a:lstStyle/>
+            <a:p>
+              <a:pPr algn="ctr"/>
+              <a:r>
+                <a:rPr lang="en-US" sz="1400" dirty="0" smtClean="0"/>
+                <a:t>Payment gateway</a:t>
+              </a:r>
+              <a:endParaRPr lang="en-US" sz="1400" dirty="0"/>
+            </a:p>
+          </p:txBody>
+        </p:sp>
+      </p:grpSp>
+      <p:grpSp>
+        <p:nvGrpSpPr>
+          <p:cNvPr id="10" name="Group 18"/>
+          <p:cNvGrpSpPr/>
+          <p:nvPr/>
+        </p:nvGrpSpPr>
+        <p:grpSpPr>
+          <a:xfrm>
+            <a:off x="228600" y="3505200"/>
+            <a:ext cx="1524000" cy="457200"/>
+            <a:chOff x="1219200" y="1371600"/>
+            <a:chExt cx="1524000" cy="457200"/>
+          </a:xfrm>
+        </p:grpSpPr>
+        <p:sp>
+          <p:nvSpPr>
+            <p:cNvPr id="20" name="Rectangle 19"/>
+            <p:cNvSpPr/>
+            <p:nvPr/>
+          </p:nvSpPr>
+          <p:spPr>
+            <a:xfrm>
+              <a:off x="1219200" y="1371600"/>
+              <a:ext cx="1524000" cy="457200"/>
+            </a:xfrm>
+            <a:prstGeom prst="rect">
+              <a:avLst/>
+            </a:prstGeom>
+            <a:noFill/>
+            <a:ln>
+              <a:solidFill>
+                <a:schemeClr val="tx1"/>
+              </a:solidFill>
+            </a:ln>
+          </p:spPr>
+          <p:style>
+            <a:lnRef idx="2">
+              <a:schemeClr val="accent1">
+                <a:shade val="50000"/>
+              </a:schemeClr>
+            </a:lnRef>
+            <a:fillRef idx="1">
+              <a:schemeClr val="accent1"/>
+            </a:fillRef>
+            <a:effectRef idx="0">
+              <a:schemeClr val="accent1"/>
+            </a:effectRef>
+            <a:fontRef idx="minor">
+              <a:schemeClr val="lt1"/>
+            </a:fontRef>
+          </p:style>
+          <p:txBody>
+            <a:bodyPr rtlCol="0" anchor="ctr"/>
+            <a:lstStyle/>
+            <a:p>
+              <a:pPr algn="ctr"/>
+              <a:endParaRPr lang="en-US"/>
+            </a:p>
+          </p:txBody>
+        </p:sp>
+        <p:sp>
+          <p:nvSpPr>
+            <p:cNvPr id="21" name="TextBox 20"/>
+            <p:cNvSpPr txBox="1"/>
+            <p:nvPr/>
+          </p:nvSpPr>
+          <p:spPr>
+            <a:xfrm>
+              <a:off x="1295400" y="1447800"/>
+              <a:ext cx="1371600" cy="307777"/>
+            </a:xfrm>
+            <a:prstGeom prst="rect">
+              <a:avLst/>
+            </a:prstGeom>
+            <a:noFill/>
+          </p:spPr>
+          <p:txBody>
+            <a:bodyPr wrap="square" rtlCol="0">
+              <a:spAutoFit/>
+            </a:bodyPr>
+            <a:lstStyle/>
+            <a:p>
+              <a:pPr algn="ctr"/>
+              <a:r>
+                <a:rPr lang="en-US" sz="1400" dirty="0" smtClean="0"/>
+                <a:t>Lesson  </a:t>
+              </a:r>
+              <a:endParaRPr lang="en-US" sz="1400" dirty="0"/>
+            </a:p>
+          </p:txBody>
+        </p:sp>
+      </p:grpSp>
+      <p:grpSp>
+        <p:nvGrpSpPr>
+          <p:cNvPr id="13" name="Group 55"/>
+          <p:cNvGrpSpPr/>
+          <p:nvPr/>
+        </p:nvGrpSpPr>
+        <p:grpSpPr>
+          <a:xfrm>
+            <a:off x="3505200" y="228600"/>
+            <a:ext cx="1828800" cy="457200"/>
+            <a:chOff x="304800" y="5334000"/>
+            <a:chExt cx="1828800" cy="457200"/>
+          </a:xfrm>
+        </p:grpSpPr>
+        <p:sp>
+          <p:nvSpPr>
+            <p:cNvPr id="47" name="Rectangle 46"/>
+            <p:cNvSpPr/>
+            <p:nvPr/>
+          </p:nvSpPr>
+          <p:spPr>
+            <a:xfrm>
+              <a:off x="304800" y="5334000"/>
+              <a:ext cx="1828800" cy="457200"/>
+            </a:xfrm>
+            <a:prstGeom prst="rect">
+              <a:avLst/>
+            </a:prstGeom>
+            <a:noFill/>
+            <a:ln>
+              <a:solidFill>
+                <a:schemeClr val="tx1"/>
+              </a:solidFill>
+            </a:ln>
+          </p:spPr>
+          <p:style>
+            <a:lnRef idx="2">
+              <a:schemeClr val="accent1">
+                <a:shade val="50000"/>
+              </a:schemeClr>
+            </a:lnRef>
+            <a:fillRef idx="1">
+              <a:schemeClr val="accent1"/>
+            </a:fillRef>
+            <a:effectRef idx="0">
+              <a:schemeClr val="accent1"/>
+            </a:effectRef>
+            <a:fontRef idx="minor">
+              <a:schemeClr val="lt1"/>
+            </a:fontRef>
+          </p:style>
+          <p:txBody>
+            <a:bodyPr rtlCol="0" anchor="ctr"/>
+            <a:lstStyle/>
+            <a:p>
+              <a:pPr algn="ctr"/>
+              <a:endParaRPr lang="en-US"/>
+            </a:p>
+          </p:txBody>
+        </p:sp>
+        <p:cxnSp>
+          <p:nvCxnSpPr>
+            <p:cNvPr id="50" name="Straight Connector 49"/>
+            <p:cNvCxnSpPr/>
+            <p:nvPr/>
+          </p:nvCxnSpPr>
+          <p:spPr>
+            <a:xfrm rot="5400000">
+              <a:off x="457994" y="5561806"/>
+              <a:ext cx="457200" cy="1588"/>
+            </a:xfrm>
+            <a:prstGeom prst="line">
+              <a:avLst/>
+            </a:prstGeom>
+            <a:ln>
+              <a:solidFill>
+                <a:schemeClr val="tx1"/>
+              </a:solidFill>
+            </a:ln>
+          </p:spPr>
+          <p:style>
+            <a:lnRef idx="1">
+              <a:schemeClr val="accent1"/>
+            </a:lnRef>
+            <a:fillRef idx="0">
+              <a:schemeClr val="accent1"/>
+            </a:fillRef>
+            <a:effectRef idx="0">
+              <a:schemeClr val="accent1"/>
+            </a:effectRef>
+            <a:fontRef idx="minor">
+              <a:schemeClr val="tx1"/>
+            </a:fontRef>
+          </p:style>
+        </p:cxnSp>
+        <p:sp>
+          <p:nvSpPr>
+            <p:cNvPr id="53" name="TextBox 52"/>
+            <p:cNvSpPr txBox="1"/>
+            <p:nvPr/>
+          </p:nvSpPr>
+          <p:spPr>
+            <a:xfrm>
+              <a:off x="304800" y="5410200"/>
+              <a:ext cx="386644" cy="307777"/>
+            </a:xfrm>
+            <a:prstGeom prst="rect">
+              <a:avLst/>
+            </a:prstGeom>
+            <a:noFill/>
+          </p:spPr>
+          <p:txBody>
+            <a:bodyPr wrap="none" rtlCol="0">
+              <a:spAutoFit/>
+            </a:bodyPr>
+            <a:lstStyle/>
+            <a:p>
+              <a:r>
+                <a:rPr lang="en-US" sz="1400" dirty="0" smtClean="0"/>
+                <a:t>D1</a:t>
+              </a:r>
+              <a:endParaRPr lang="en-US" sz="1400" dirty="0"/>
+            </a:p>
+          </p:txBody>
+        </p:sp>
+        <p:sp>
+          <p:nvSpPr>
+            <p:cNvPr id="55" name="TextBox 54"/>
+            <p:cNvSpPr txBox="1"/>
+            <p:nvPr/>
+          </p:nvSpPr>
+          <p:spPr>
+            <a:xfrm>
+              <a:off x="914400" y="5410200"/>
+              <a:ext cx="1061573" cy="307777"/>
+            </a:xfrm>
+            <a:prstGeom prst="rect">
+              <a:avLst/>
+            </a:prstGeom>
+            <a:noFill/>
+          </p:spPr>
+          <p:txBody>
+            <a:bodyPr wrap="none" rtlCol="0">
+              <a:spAutoFit/>
+            </a:bodyPr>
+            <a:lstStyle/>
+            <a:p>
+              <a:r>
+                <a:rPr lang="en-US" sz="1400" dirty="0" smtClean="0"/>
+                <a:t>User Details</a:t>
+              </a:r>
+              <a:endParaRPr lang="en-US" dirty="0"/>
+            </a:p>
+          </p:txBody>
+        </p:sp>
+      </p:grpSp>
+      <p:grpSp>
+        <p:nvGrpSpPr>
+          <p:cNvPr id="16" name="Group 57"/>
+          <p:cNvGrpSpPr/>
+          <p:nvPr/>
+        </p:nvGrpSpPr>
+        <p:grpSpPr>
+          <a:xfrm>
+            <a:off x="228600" y="1600200"/>
+            <a:ext cx="1828800" cy="457200"/>
+            <a:chOff x="304800" y="5334000"/>
+            <a:chExt cx="1828800" cy="457200"/>
+          </a:xfrm>
+        </p:grpSpPr>
+        <p:sp>
+          <p:nvSpPr>
+            <p:cNvPr id="59" name="Rectangle 58"/>
+            <p:cNvSpPr/>
+            <p:nvPr/>
+          </p:nvSpPr>
+          <p:spPr>
+            <a:xfrm>
+              <a:off x="304800" y="5334000"/>
+              <a:ext cx="1828800" cy="457200"/>
+            </a:xfrm>
+            <a:prstGeom prst="rect">
+              <a:avLst/>
+            </a:prstGeom>
+            <a:noFill/>
+            <a:ln>
+              <a:solidFill>
+                <a:schemeClr val="tx1"/>
+              </a:solidFill>
+            </a:ln>
+          </p:spPr>
+          <p:style>
+            <a:lnRef idx="2">
+              <a:schemeClr val="accent1">
+                <a:shade val="50000"/>
+              </a:schemeClr>
+            </a:lnRef>
+            <a:fillRef idx="1">
+              <a:schemeClr val="accent1"/>
+            </a:fillRef>
+            <a:effectRef idx="0">
+              <a:schemeClr val="accent1"/>
+            </a:effectRef>
+            <a:fontRef idx="minor">
+              <a:schemeClr val="lt1"/>
+            </a:fontRef>
+          </p:style>
+          <p:txBody>
+            <a:bodyPr rtlCol="0" anchor="ctr"/>
+            <a:lstStyle/>
+            <a:p>
+              <a:pPr algn="ctr"/>
+              <a:endParaRPr lang="en-US"/>
+            </a:p>
+          </p:txBody>
+        </p:sp>
+        <p:cxnSp>
+          <p:nvCxnSpPr>
+            <p:cNvPr id="60" name="Straight Connector 59"/>
+            <p:cNvCxnSpPr/>
+            <p:nvPr/>
+          </p:nvCxnSpPr>
+          <p:spPr>
+            <a:xfrm rot="5400000">
+              <a:off x="457994" y="5561806"/>
+              <a:ext cx="457200" cy="1588"/>
+            </a:xfrm>
+            <a:prstGeom prst="line">
+              <a:avLst/>
+            </a:prstGeom>
+            <a:ln>
+              <a:solidFill>
+                <a:schemeClr val="tx1"/>
+              </a:solidFill>
+            </a:ln>
+          </p:spPr>
+          <p:style>
+            <a:lnRef idx="1">
+              <a:schemeClr val="accent1"/>
+            </a:lnRef>
+            <a:fillRef idx="0">
+              <a:schemeClr val="accent1"/>
+            </a:fillRef>
+            <a:effectRef idx="0">
+              <a:schemeClr val="accent1"/>
+            </a:effectRef>
+            <a:fontRef idx="minor">
+              <a:schemeClr val="tx1"/>
+            </a:fontRef>
+          </p:style>
+        </p:cxnSp>
+        <p:sp>
+          <p:nvSpPr>
+            <p:cNvPr id="61" name="TextBox 60"/>
+            <p:cNvSpPr txBox="1"/>
+            <p:nvPr/>
+          </p:nvSpPr>
+          <p:spPr>
+            <a:xfrm>
+              <a:off x="304800" y="5410200"/>
+              <a:ext cx="386644" cy="307777"/>
+            </a:xfrm>
+            <a:prstGeom prst="rect">
+              <a:avLst/>
+            </a:prstGeom>
+            <a:noFill/>
+          </p:spPr>
+          <p:txBody>
+            <a:bodyPr wrap="none" rtlCol="0">
+              <a:spAutoFit/>
+            </a:bodyPr>
+            <a:lstStyle/>
+            <a:p>
+              <a:r>
+                <a:rPr lang="en-US" sz="1400" dirty="0" smtClean="0"/>
+                <a:t>D2</a:t>
+              </a:r>
+              <a:endParaRPr lang="en-US" sz="1400" dirty="0"/>
+            </a:p>
+          </p:txBody>
+        </p:sp>
+        <p:sp>
+          <p:nvSpPr>
+            <p:cNvPr id="62" name="TextBox 61"/>
+            <p:cNvSpPr txBox="1"/>
+            <p:nvPr/>
+          </p:nvSpPr>
+          <p:spPr>
+            <a:xfrm>
+              <a:off x="838200" y="5410200"/>
+              <a:ext cx="1218667" cy="307777"/>
+            </a:xfrm>
+            <a:prstGeom prst="rect">
+              <a:avLst/>
+            </a:prstGeom>
+            <a:noFill/>
+          </p:spPr>
+          <p:txBody>
+            <a:bodyPr wrap="none" rtlCol="0">
+              <a:spAutoFit/>
+            </a:bodyPr>
+            <a:lstStyle/>
+            <a:p>
+              <a:r>
+                <a:rPr lang="en-US" sz="1400" dirty="0" smtClean="0"/>
+                <a:t>Lesson Details</a:t>
+              </a:r>
+              <a:endParaRPr lang="en-US" dirty="0"/>
+            </a:p>
+          </p:txBody>
+        </p:sp>
+      </p:grpSp>
+      <p:cxnSp>
+        <p:nvCxnSpPr>
+          <p:cNvPr id="64" name="Shape 63"/>
+          <p:cNvCxnSpPr>
+            <a:stCxn id="11" idx="2"/>
+          </p:cNvCxnSpPr>
+          <p:nvPr/>
+        </p:nvCxnSpPr>
+        <p:spPr>
+          <a:xfrm rot="16200000" flipH="1">
+            <a:off x="2628900" y="38100"/>
+            <a:ext cx="457200" cy="1905000"/>
+          </a:xfrm>
+          <a:prstGeom prst="bentConnector2">
+            <a:avLst/>
+          </a:prstGeom>
+          <a:ln>
+            <a:solidFill>
+              <a:schemeClr val="tx1"/>
+            </a:solidFill>
+            <a:tailEnd type="arrow"/>
+          </a:ln>
+        </p:spPr>
+        <p:style>
+          <a:lnRef idx="1">
+            <a:schemeClr val="accent1"/>
+          </a:lnRef>
+          <a:fillRef idx="0">
+            <a:schemeClr val="accent1"/>
+          </a:fillRef>
+          <a:effectRef idx="0">
+            <a:schemeClr val="accent1"/>
+          </a:effectRef>
+          <a:fontRef idx="minor">
+            <a:schemeClr val="tx1"/>
+          </a:fontRef>
+        </p:style>
+      </p:cxnSp>
+      <p:cxnSp>
+        <p:nvCxnSpPr>
+          <p:cNvPr id="66" name="Shape 65"/>
+          <p:cNvCxnSpPr>
+            <a:endCxn id="47" idx="3"/>
+          </p:cNvCxnSpPr>
+          <p:nvPr/>
+        </p:nvCxnSpPr>
+        <p:spPr>
+          <a:xfrm rot="16200000" flipV="1">
+            <a:off x="4991100" y="800100"/>
+            <a:ext cx="838200" cy="152400"/>
+          </a:xfrm>
+          <a:prstGeom prst="bentConnector2">
+            <a:avLst/>
+          </a:prstGeom>
+          <a:ln>
+            <a:solidFill>
+              <a:schemeClr val="tx1"/>
+            </a:solidFill>
+            <a:tailEnd type="arrow"/>
+          </a:ln>
+        </p:spPr>
+        <p:style>
+          <a:lnRef idx="1">
+            <a:schemeClr val="accent1"/>
+          </a:lnRef>
+          <a:fillRef idx="0">
+            <a:schemeClr val="accent1"/>
+          </a:fillRef>
+          <a:effectRef idx="0">
+            <a:schemeClr val="accent1"/>
+          </a:effectRef>
+          <a:fontRef idx="minor">
+            <a:schemeClr val="tx1"/>
+          </a:fontRef>
+        </p:style>
+      </p:cxnSp>
+      <p:cxnSp>
+        <p:nvCxnSpPr>
+          <p:cNvPr id="68" name="Elbow Connector 67"/>
+          <p:cNvCxnSpPr>
+            <a:stCxn id="44" idx="0"/>
+            <a:endCxn id="59" idx="3"/>
+          </p:cNvCxnSpPr>
+          <p:nvPr/>
+        </p:nvCxnSpPr>
+        <p:spPr>
+          <a:xfrm rot="16200000" flipV="1">
+            <a:off x="2286000" y="1600200"/>
+            <a:ext cx="381000" cy="838200"/>
+          </a:xfrm>
+          <a:prstGeom prst="bentConnector2">
+            <a:avLst/>
+          </a:prstGeom>
+          <a:ln>
+            <a:solidFill>
+              <a:schemeClr val="tx1"/>
+            </a:solidFill>
+            <a:tailEnd type="arrow"/>
+          </a:ln>
+        </p:spPr>
+        <p:style>
+          <a:lnRef idx="1">
+            <a:schemeClr val="accent1"/>
+          </a:lnRef>
+          <a:fillRef idx="0">
+            <a:schemeClr val="accent1"/>
+          </a:fillRef>
+          <a:effectRef idx="0">
+            <a:schemeClr val="accent1"/>
+          </a:effectRef>
+          <a:fontRef idx="minor">
+            <a:schemeClr val="tx1"/>
+          </a:fontRef>
+        </p:style>
+      </p:cxnSp>
+      <p:cxnSp>
+        <p:nvCxnSpPr>
+          <p:cNvPr id="75" name="Shape 74"/>
+          <p:cNvCxnSpPr>
+            <a:stCxn id="20" idx="0"/>
+            <a:endCxn id="44" idx="2"/>
+          </p:cNvCxnSpPr>
+          <p:nvPr/>
+        </p:nvCxnSpPr>
+        <p:spPr>
+          <a:xfrm rot="5400000" flipH="1" flipV="1">
+            <a:off x="1066800" y="2590800"/>
+            <a:ext cx="838200" cy="990600"/>
+          </a:xfrm>
+          <a:prstGeom prst="bentConnector2">
+            <a:avLst/>
+          </a:prstGeom>
+          <a:ln>
+            <a:solidFill>
+              <a:schemeClr val="tx1"/>
+            </a:solidFill>
+            <a:tailEnd type="arrow"/>
+          </a:ln>
+        </p:spPr>
+        <p:style>
+          <a:lnRef idx="1">
+            <a:schemeClr val="accent1"/>
+          </a:lnRef>
+          <a:fillRef idx="0">
+            <a:schemeClr val="accent1"/>
+          </a:fillRef>
+          <a:effectRef idx="0">
+            <a:schemeClr val="accent1"/>
+          </a:effectRef>
+          <a:fontRef idx="minor">
+            <a:schemeClr val="tx1"/>
+          </a:fontRef>
+        </p:style>
+      </p:cxnSp>
+      <p:grpSp>
+        <p:nvGrpSpPr>
+          <p:cNvPr id="19" name="Group 75"/>
+          <p:cNvGrpSpPr/>
+          <p:nvPr/>
+        </p:nvGrpSpPr>
+        <p:grpSpPr>
+          <a:xfrm>
+            <a:off x="228600" y="5181600"/>
+            <a:ext cx="1828800" cy="457200"/>
+            <a:chOff x="304800" y="5334000"/>
+            <a:chExt cx="1828800" cy="457200"/>
+          </a:xfrm>
+        </p:grpSpPr>
+        <p:sp>
+          <p:nvSpPr>
+            <p:cNvPr id="77" name="Rectangle 76"/>
+            <p:cNvSpPr/>
+            <p:nvPr/>
+          </p:nvSpPr>
+          <p:spPr>
+            <a:xfrm>
+              <a:off x="304800" y="5334000"/>
+              <a:ext cx="1828800" cy="457200"/>
+            </a:xfrm>
+            <a:prstGeom prst="rect">
+              <a:avLst/>
+            </a:prstGeom>
+            <a:noFill/>
+            <a:ln>
+              <a:solidFill>
+                <a:schemeClr val="tx1"/>
+              </a:solidFill>
+            </a:ln>
+          </p:spPr>
+          <p:style>
+            <a:lnRef idx="2">
+              <a:schemeClr val="accent1">
+                <a:shade val="50000"/>
+              </a:schemeClr>
+            </a:lnRef>
+            <a:fillRef idx="1">
+              <a:schemeClr val="accent1"/>
+            </a:fillRef>
+            <a:effectRef idx="0">
+              <a:schemeClr val="accent1"/>
+            </a:effectRef>
+            <a:fontRef idx="minor">
+              <a:schemeClr val="lt1"/>
+            </a:fontRef>
+          </p:style>
+          <p:txBody>
+            <a:bodyPr rtlCol="0" anchor="ctr"/>
+            <a:lstStyle/>
+            <a:p>
+              <a:pPr algn="ctr"/>
+              <a:endParaRPr lang="en-US"/>
+            </a:p>
+          </p:txBody>
+        </p:sp>
+        <p:cxnSp>
+          <p:nvCxnSpPr>
+            <p:cNvPr id="78" name="Straight Connector 77"/>
+            <p:cNvCxnSpPr/>
+            <p:nvPr/>
+          </p:nvCxnSpPr>
+          <p:spPr>
+            <a:xfrm rot="5400000">
+              <a:off x="457994" y="5561806"/>
+              <a:ext cx="457200" cy="1588"/>
+            </a:xfrm>
+            <a:prstGeom prst="line">
+              <a:avLst/>
+            </a:prstGeom>
+            <a:ln>
+              <a:solidFill>
+                <a:schemeClr val="tx1"/>
+              </a:solidFill>
+            </a:ln>
+          </p:spPr>
+          <p:style>
+            <a:lnRef idx="1">
+              <a:schemeClr val="accent1"/>
+            </a:lnRef>
+            <a:fillRef idx="0">
+              <a:schemeClr val="accent1"/>
+            </a:fillRef>
+            <a:effectRef idx="0">
+              <a:schemeClr val="accent1"/>
+            </a:effectRef>
+            <a:fontRef idx="minor">
+              <a:schemeClr val="tx1"/>
+            </a:fontRef>
+          </p:style>
+        </p:cxnSp>
+        <p:sp>
+          <p:nvSpPr>
+            <p:cNvPr id="79" name="TextBox 78"/>
+            <p:cNvSpPr txBox="1"/>
+            <p:nvPr/>
+          </p:nvSpPr>
+          <p:spPr>
+            <a:xfrm>
+              <a:off x="304800" y="5410200"/>
+              <a:ext cx="386644" cy="307777"/>
+            </a:xfrm>
+            <a:prstGeom prst="rect">
+              <a:avLst/>
+            </a:prstGeom>
+            <a:noFill/>
+          </p:spPr>
+          <p:txBody>
+            <a:bodyPr wrap="none" rtlCol="0">
+              <a:spAutoFit/>
+            </a:bodyPr>
+            <a:lstStyle/>
+            <a:p>
+              <a:r>
+                <a:rPr lang="en-US" sz="1400" dirty="0" smtClean="0"/>
+                <a:t>D3</a:t>
+              </a:r>
+              <a:endParaRPr lang="en-US" sz="1400" dirty="0"/>
+            </a:p>
+          </p:txBody>
+        </p:sp>
+        <p:sp>
+          <p:nvSpPr>
+            <p:cNvPr id="80" name="TextBox 79"/>
+            <p:cNvSpPr txBox="1"/>
+            <p:nvPr/>
+          </p:nvSpPr>
+          <p:spPr>
+            <a:xfrm>
+              <a:off x="762000" y="5410200"/>
+              <a:ext cx="1312282" cy="307777"/>
+            </a:xfrm>
+            <a:prstGeom prst="rect">
+              <a:avLst/>
+            </a:prstGeom>
+            <a:noFill/>
+          </p:spPr>
+          <p:txBody>
+            <a:bodyPr wrap="none" rtlCol="0">
+              <a:spAutoFit/>
+            </a:bodyPr>
+            <a:lstStyle/>
+            <a:p>
+              <a:r>
+                <a:rPr lang="en-US" sz="1400" dirty="0" smtClean="0"/>
+                <a:t>Exercise Details</a:t>
+              </a:r>
+              <a:endParaRPr lang="en-US" dirty="0"/>
+            </a:p>
+          </p:txBody>
+        </p:sp>
+      </p:grpSp>
+      <p:cxnSp>
+        <p:nvCxnSpPr>
+          <p:cNvPr id="82" name="Shape 81"/>
+          <p:cNvCxnSpPr>
+            <a:stCxn id="42" idx="2"/>
+            <a:endCxn id="77" idx="0"/>
+          </p:cNvCxnSpPr>
+          <p:nvPr/>
+        </p:nvCxnSpPr>
+        <p:spPr>
+          <a:xfrm rot="10800000" flipV="1">
+            <a:off x="1143000" y="4876800"/>
+            <a:ext cx="1219200" cy="304800"/>
+          </a:xfrm>
+          <a:prstGeom prst="bentConnector2">
+            <a:avLst/>
+          </a:prstGeom>
+          <a:ln>
+            <a:solidFill>
+              <a:schemeClr val="tx1"/>
+            </a:solidFill>
+            <a:tailEnd type="arrow"/>
+          </a:ln>
+        </p:spPr>
+        <p:style>
+          <a:lnRef idx="1">
+            <a:schemeClr val="accent1"/>
+          </a:lnRef>
+          <a:fillRef idx="0">
+            <a:schemeClr val="accent1"/>
+          </a:fillRef>
+          <a:effectRef idx="0">
+            <a:schemeClr val="accent1"/>
+          </a:effectRef>
+          <a:fontRef idx="minor">
+            <a:schemeClr val="tx1"/>
+          </a:fontRef>
+        </p:style>
+      </p:cxnSp>
+      <p:cxnSp>
+        <p:nvCxnSpPr>
+          <p:cNvPr id="84" name="Shape 83"/>
+          <p:cNvCxnSpPr/>
+          <p:nvPr/>
+        </p:nvCxnSpPr>
+        <p:spPr>
+          <a:xfrm rot="5400000" flipH="1" flipV="1">
+            <a:off x="2782094" y="5752306"/>
+            <a:ext cx="838200" cy="1588"/>
+          </a:xfrm>
+          <a:prstGeom prst="bentConnector3">
+            <a:avLst>
+              <a:gd name="adj1" fmla="val 50000"/>
+            </a:avLst>
+          </a:prstGeom>
+          <a:ln>
+            <a:solidFill>
+              <a:schemeClr val="tx1"/>
+            </a:solidFill>
+            <a:tailEnd type="arrow"/>
+          </a:ln>
+        </p:spPr>
+        <p:style>
+          <a:lnRef idx="1">
+            <a:schemeClr val="accent1"/>
+          </a:lnRef>
+          <a:fillRef idx="0">
+            <a:schemeClr val="accent1"/>
+          </a:fillRef>
+          <a:effectRef idx="0">
+            <a:schemeClr val="accent1"/>
+          </a:effectRef>
+          <a:fontRef idx="minor">
+            <a:schemeClr val="tx1"/>
+          </a:fontRef>
+        </p:style>
+      </p:cxnSp>
+      <p:cxnSp>
+        <p:nvCxnSpPr>
+          <p:cNvPr id="94" name="Elbow Connector 93"/>
+          <p:cNvCxnSpPr/>
+          <p:nvPr/>
+        </p:nvCxnSpPr>
+        <p:spPr>
+          <a:xfrm rot="5400000" flipH="1" flipV="1">
+            <a:off x="6514306" y="5828506"/>
+            <a:ext cx="685800" cy="1588"/>
+          </a:xfrm>
+          <a:prstGeom prst="bentConnector3">
+            <a:avLst>
+              <a:gd name="adj1" fmla="val 50000"/>
+            </a:avLst>
+          </a:prstGeom>
+          <a:ln>
+            <a:solidFill>
+              <a:schemeClr val="tx1"/>
+            </a:solidFill>
+            <a:tailEnd type="arrow"/>
+          </a:ln>
+        </p:spPr>
+        <p:style>
+          <a:lnRef idx="1">
+            <a:schemeClr val="accent1"/>
+          </a:lnRef>
+          <a:fillRef idx="0">
+            <a:schemeClr val="accent1"/>
+          </a:fillRef>
+          <a:effectRef idx="0">
+            <a:schemeClr val="accent1"/>
+          </a:effectRef>
+          <a:fontRef idx="minor">
+            <a:schemeClr val="tx1"/>
+          </a:fontRef>
+        </p:style>
+      </p:cxnSp>
+      <p:grpSp>
+        <p:nvGrpSpPr>
+          <p:cNvPr id="22" name="Group 100"/>
+          <p:cNvGrpSpPr/>
+          <p:nvPr/>
+        </p:nvGrpSpPr>
+        <p:grpSpPr>
+          <a:xfrm>
+            <a:off x="7162800" y="4038600"/>
+            <a:ext cx="1981200" cy="523220"/>
+            <a:chOff x="304800" y="5334000"/>
+            <a:chExt cx="1981200" cy="523220"/>
+          </a:xfrm>
+        </p:grpSpPr>
+        <p:sp>
+          <p:nvSpPr>
+            <p:cNvPr id="102" name="Rectangle 101"/>
+            <p:cNvSpPr/>
+            <p:nvPr/>
+          </p:nvSpPr>
+          <p:spPr>
+            <a:xfrm>
+              <a:off x="304800" y="5334000"/>
+              <a:ext cx="1828800" cy="457200"/>
+            </a:xfrm>
+            <a:prstGeom prst="rect">
+              <a:avLst/>
+            </a:prstGeom>
+            <a:noFill/>
+            <a:ln>
+              <a:solidFill>
+                <a:schemeClr val="tx1"/>
+              </a:solidFill>
+            </a:ln>
+          </p:spPr>
+          <p:style>
+            <a:lnRef idx="2">
+              <a:schemeClr val="accent1">
+                <a:shade val="50000"/>
+              </a:schemeClr>
+            </a:lnRef>
+            <a:fillRef idx="1">
+              <a:schemeClr val="accent1"/>
+            </a:fillRef>
+            <a:effectRef idx="0">
+              <a:schemeClr val="accent1"/>
+            </a:effectRef>
+            <a:fontRef idx="minor">
+              <a:schemeClr val="lt1"/>
+            </a:fontRef>
+          </p:style>
+          <p:txBody>
+            <a:bodyPr rtlCol="0" anchor="ctr"/>
+            <a:lstStyle/>
+            <a:p>
+              <a:pPr algn="ctr"/>
+              <a:endParaRPr lang="en-US"/>
+            </a:p>
+          </p:txBody>
+        </p:sp>
+        <p:cxnSp>
+          <p:nvCxnSpPr>
+            <p:cNvPr id="103" name="Straight Connector 102"/>
+            <p:cNvCxnSpPr/>
+            <p:nvPr/>
+          </p:nvCxnSpPr>
+          <p:spPr>
+            <a:xfrm rot="5400000">
+              <a:off x="457994" y="5561806"/>
+              <a:ext cx="457200" cy="1588"/>
+            </a:xfrm>
+            <a:prstGeom prst="line">
+              <a:avLst/>
+            </a:prstGeom>
+            <a:ln>
+              <a:solidFill>
+                <a:schemeClr val="tx1"/>
+              </a:solidFill>
+            </a:ln>
+          </p:spPr>
+          <p:style>
+            <a:lnRef idx="1">
+              <a:schemeClr val="accent1"/>
+            </a:lnRef>
+            <a:fillRef idx="0">
+              <a:schemeClr val="accent1"/>
+            </a:fillRef>
+            <a:effectRef idx="0">
+              <a:schemeClr val="accent1"/>
+            </a:effectRef>
+            <a:fontRef idx="minor">
+              <a:schemeClr val="tx1"/>
+            </a:fontRef>
+          </p:style>
+        </p:cxnSp>
+        <p:sp>
+          <p:nvSpPr>
+            <p:cNvPr id="104" name="TextBox 103"/>
+            <p:cNvSpPr txBox="1"/>
+            <p:nvPr/>
+          </p:nvSpPr>
+          <p:spPr>
+            <a:xfrm>
+              <a:off x="304800" y="5410200"/>
+              <a:ext cx="386644" cy="307777"/>
+            </a:xfrm>
+            <a:prstGeom prst="rect">
+              <a:avLst/>
+            </a:prstGeom>
+            <a:noFill/>
+          </p:spPr>
+          <p:txBody>
+            <a:bodyPr wrap="none" rtlCol="0">
+              <a:spAutoFit/>
+            </a:bodyPr>
+            <a:lstStyle/>
+            <a:p>
+              <a:r>
+                <a:rPr lang="en-US" sz="1400" dirty="0" smtClean="0"/>
+                <a:t>D4</a:t>
+              </a:r>
+              <a:endParaRPr lang="en-US" sz="1400" dirty="0"/>
+            </a:p>
+          </p:txBody>
+        </p:sp>
+        <p:sp>
+          <p:nvSpPr>
+            <p:cNvPr id="105" name="TextBox 104"/>
+            <p:cNvSpPr txBox="1"/>
+            <p:nvPr/>
+          </p:nvSpPr>
+          <p:spPr>
+            <a:xfrm>
+              <a:off x="685800" y="5334000"/>
+              <a:ext cx="1600200" cy="523220"/>
+            </a:xfrm>
+            <a:prstGeom prst="rect">
+              <a:avLst/>
+            </a:prstGeom>
+            <a:noFill/>
+          </p:spPr>
+          <p:txBody>
+            <a:bodyPr wrap="square" rtlCol="0">
+              <a:spAutoFit/>
+            </a:bodyPr>
+            <a:lstStyle/>
+            <a:p>
+              <a:r>
+                <a:rPr lang="en-US" sz="1400" dirty="0" smtClean="0"/>
+                <a:t>Online </a:t>
+              </a:r>
+            </a:p>
+            <a:p>
+              <a:r>
+                <a:rPr lang="en-US" sz="1400" dirty="0" smtClean="0"/>
+                <a:t>Resource Details</a:t>
+              </a:r>
+              <a:endParaRPr lang="en-US" dirty="0"/>
+            </a:p>
+          </p:txBody>
+        </p:sp>
+      </p:grpSp>
+      <p:grpSp>
+        <p:nvGrpSpPr>
+          <p:cNvPr id="23" name="Group 116"/>
+          <p:cNvGrpSpPr/>
+          <p:nvPr/>
+        </p:nvGrpSpPr>
+        <p:grpSpPr>
+          <a:xfrm>
+            <a:off x="7162800" y="2971800"/>
+            <a:ext cx="1828800" cy="457200"/>
+            <a:chOff x="304800" y="5334000"/>
+            <a:chExt cx="1828800" cy="457200"/>
+          </a:xfrm>
+        </p:grpSpPr>
+        <p:sp>
+          <p:nvSpPr>
+            <p:cNvPr id="118" name="Rectangle 117"/>
+            <p:cNvSpPr/>
+            <p:nvPr/>
+          </p:nvSpPr>
+          <p:spPr>
+            <a:xfrm>
+              <a:off x="304800" y="5334000"/>
+              <a:ext cx="1828800" cy="457200"/>
+            </a:xfrm>
+            <a:prstGeom prst="rect">
+              <a:avLst/>
+            </a:prstGeom>
+            <a:noFill/>
+            <a:ln>
+              <a:solidFill>
+                <a:schemeClr val="tx1"/>
+              </a:solidFill>
+            </a:ln>
+          </p:spPr>
+          <p:style>
+            <a:lnRef idx="2">
+              <a:schemeClr val="accent1">
+                <a:shade val="50000"/>
+              </a:schemeClr>
+            </a:lnRef>
+            <a:fillRef idx="1">
+              <a:schemeClr val="accent1"/>
+            </a:fillRef>
+            <a:effectRef idx="0">
+              <a:schemeClr val="accent1"/>
+            </a:effectRef>
+            <a:fontRef idx="minor">
+              <a:schemeClr val="lt1"/>
+            </a:fontRef>
+          </p:style>
+          <p:txBody>
+            <a:bodyPr rtlCol="0" anchor="ctr"/>
+            <a:lstStyle/>
+            <a:p>
+              <a:pPr algn="ctr"/>
+              <a:endParaRPr lang="en-US"/>
+            </a:p>
+          </p:txBody>
+        </p:sp>
+        <p:cxnSp>
+          <p:nvCxnSpPr>
+            <p:cNvPr id="119" name="Straight Connector 118"/>
+            <p:cNvCxnSpPr/>
+            <p:nvPr/>
+          </p:nvCxnSpPr>
+          <p:spPr>
+            <a:xfrm rot="5400000">
+              <a:off x="457994" y="5561806"/>
+              <a:ext cx="457200" cy="1588"/>
+            </a:xfrm>
+            <a:prstGeom prst="line">
+              <a:avLst/>
+            </a:prstGeom>
+            <a:ln>
+              <a:solidFill>
+                <a:schemeClr val="tx1"/>
+              </a:solidFill>
+            </a:ln>
+          </p:spPr>
+          <p:style>
+            <a:lnRef idx="1">
+              <a:schemeClr val="accent1"/>
+            </a:lnRef>
+            <a:fillRef idx="0">
+              <a:schemeClr val="accent1"/>
+            </a:fillRef>
+            <a:effectRef idx="0">
+              <a:schemeClr val="accent1"/>
+            </a:effectRef>
+            <a:fontRef idx="minor">
+              <a:schemeClr val="tx1"/>
+            </a:fontRef>
+          </p:style>
+        </p:cxnSp>
+        <p:sp>
+          <p:nvSpPr>
+            <p:cNvPr id="120" name="TextBox 119"/>
+            <p:cNvSpPr txBox="1"/>
+            <p:nvPr/>
+          </p:nvSpPr>
+          <p:spPr>
+            <a:xfrm>
+              <a:off x="304800" y="5410200"/>
+              <a:ext cx="386644" cy="307777"/>
+            </a:xfrm>
+            <a:prstGeom prst="rect">
+              <a:avLst/>
+            </a:prstGeom>
+            <a:noFill/>
+          </p:spPr>
+          <p:txBody>
+            <a:bodyPr wrap="none" rtlCol="0">
+              <a:spAutoFit/>
+            </a:bodyPr>
+            <a:lstStyle/>
+            <a:p>
+              <a:r>
+                <a:rPr lang="en-US" sz="1400" dirty="0" smtClean="0"/>
+                <a:t>D5</a:t>
+              </a:r>
+              <a:endParaRPr lang="en-US" sz="1400" dirty="0"/>
+            </a:p>
+          </p:txBody>
+        </p:sp>
+        <p:sp>
+          <p:nvSpPr>
+            <p:cNvPr id="121" name="TextBox 120"/>
+            <p:cNvSpPr txBox="1"/>
+            <p:nvPr/>
+          </p:nvSpPr>
+          <p:spPr>
+            <a:xfrm>
+              <a:off x="762000" y="5410200"/>
+              <a:ext cx="1363707" cy="307777"/>
+            </a:xfrm>
+            <a:prstGeom prst="rect">
+              <a:avLst/>
+            </a:prstGeom>
+            <a:noFill/>
+          </p:spPr>
+          <p:txBody>
+            <a:bodyPr wrap="none" rtlCol="0">
+              <a:spAutoFit/>
+            </a:bodyPr>
+            <a:lstStyle/>
+            <a:p>
+              <a:r>
+                <a:rPr lang="en-US" sz="1400" dirty="0" smtClean="0"/>
+                <a:t>Payment Details</a:t>
+              </a:r>
+              <a:endParaRPr lang="en-US" dirty="0"/>
+            </a:p>
+          </p:txBody>
+        </p:sp>
+      </p:grpSp>
+      <p:cxnSp>
+        <p:nvCxnSpPr>
+          <p:cNvPr id="124" name="Shape 123"/>
+          <p:cNvCxnSpPr/>
+          <p:nvPr/>
+        </p:nvCxnSpPr>
+        <p:spPr>
+          <a:xfrm flipV="1">
+            <a:off x="7315200" y="4495800"/>
+            <a:ext cx="1028700" cy="543580"/>
+          </a:xfrm>
+          <a:prstGeom prst="bentConnector2">
+            <a:avLst/>
+          </a:prstGeom>
+          <a:ln>
+            <a:solidFill>
+              <a:schemeClr val="tx1"/>
+            </a:solidFill>
+            <a:tailEnd type="arrow"/>
+          </a:ln>
+        </p:spPr>
+        <p:style>
+          <a:lnRef idx="1">
+            <a:schemeClr val="accent1"/>
+          </a:lnRef>
+          <a:fillRef idx="0">
+            <a:schemeClr val="accent1"/>
+          </a:fillRef>
+          <a:effectRef idx="0">
+            <a:schemeClr val="accent1"/>
+          </a:effectRef>
+          <a:fontRef idx="minor">
+            <a:schemeClr val="tx1"/>
+          </a:fontRef>
+        </p:style>
+      </p:cxnSp>
+      <p:cxnSp>
+        <p:nvCxnSpPr>
+          <p:cNvPr id="126" name="Shape 125"/>
+          <p:cNvCxnSpPr>
+            <a:stCxn id="18" idx="1"/>
+            <a:endCxn id="45" idx="1"/>
+          </p:cNvCxnSpPr>
+          <p:nvPr/>
+        </p:nvCxnSpPr>
+        <p:spPr>
+          <a:xfrm rot="10800000" flipV="1">
+            <a:off x="6440022" y="687289"/>
+            <a:ext cx="341778" cy="970622"/>
+          </a:xfrm>
+          <a:prstGeom prst="bentConnector2">
+            <a:avLst/>
+          </a:prstGeom>
+          <a:ln>
+            <a:solidFill>
+              <a:schemeClr val="tx1"/>
+            </a:solidFill>
+            <a:tailEnd type="arrow"/>
+          </a:ln>
+        </p:spPr>
+        <p:style>
+          <a:lnRef idx="1">
+            <a:schemeClr val="accent1"/>
+          </a:lnRef>
+          <a:fillRef idx="0">
+            <a:schemeClr val="accent1"/>
+          </a:fillRef>
+          <a:effectRef idx="0">
+            <a:schemeClr val="accent1"/>
+          </a:effectRef>
+          <a:fontRef idx="minor">
+            <a:schemeClr val="tx1"/>
+          </a:fontRef>
+        </p:style>
+      </p:cxnSp>
+      <p:cxnSp>
+        <p:nvCxnSpPr>
+          <p:cNvPr id="128" name="Shape 127"/>
+          <p:cNvCxnSpPr>
+            <a:stCxn id="45" idx="6"/>
+          </p:cNvCxnSpPr>
+          <p:nvPr/>
+        </p:nvCxnSpPr>
+        <p:spPr>
+          <a:xfrm>
+            <a:off x="8001000" y="1981200"/>
+            <a:ext cx="304800" cy="990600"/>
+          </a:xfrm>
+          <a:prstGeom prst="bentConnector2">
+            <a:avLst/>
+          </a:prstGeom>
+          <a:ln>
+            <a:solidFill>
+              <a:schemeClr val="tx1"/>
+            </a:solidFill>
+            <a:tailEnd type="arrow"/>
+          </a:ln>
+        </p:spPr>
+        <p:style>
+          <a:lnRef idx="1">
+            <a:schemeClr val="accent1"/>
+          </a:lnRef>
+          <a:fillRef idx="0">
+            <a:schemeClr val="accent1"/>
+          </a:fillRef>
+          <a:effectRef idx="0">
+            <a:schemeClr val="accent1"/>
+          </a:effectRef>
+          <a:fontRef idx="minor">
+            <a:schemeClr val="tx1"/>
+          </a:fontRef>
+        </p:style>
+      </p:cxnSp>
+      <p:grpSp>
+        <p:nvGrpSpPr>
+          <p:cNvPr id="24" name="Group 136"/>
+          <p:cNvGrpSpPr/>
+          <p:nvPr/>
+        </p:nvGrpSpPr>
+        <p:grpSpPr>
+          <a:xfrm>
+            <a:off x="3733800" y="990600"/>
+            <a:ext cx="1828800" cy="914400"/>
+            <a:chOff x="3733800" y="990600"/>
+            <a:chExt cx="1828800" cy="914400"/>
+          </a:xfrm>
+        </p:grpSpPr>
+        <p:sp>
+          <p:nvSpPr>
+            <p:cNvPr id="43" name="Oval 42"/>
+            <p:cNvSpPr/>
+            <p:nvPr/>
+          </p:nvSpPr>
+          <p:spPr>
+            <a:xfrm>
+              <a:off x="3733800" y="990600"/>
+              <a:ext cx="1828800" cy="914400"/>
+            </a:xfrm>
+            <a:prstGeom prst="ellipse">
+              <a:avLst/>
+            </a:prstGeom>
+            <a:noFill/>
+            <a:ln>
+              <a:solidFill>
+                <a:schemeClr val="tx1"/>
+              </a:solidFill>
+            </a:ln>
+          </p:spPr>
+          <p:style>
+            <a:lnRef idx="2">
+              <a:schemeClr val="accent1">
+                <a:shade val="50000"/>
+              </a:schemeClr>
+            </a:lnRef>
+            <a:fillRef idx="1">
+              <a:schemeClr val="accent1"/>
+            </a:fillRef>
+            <a:effectRef idx="0">
+              <a:schemeClr val="accent1"/>
+            </a:effectRef>
+            <a:fontRef idx="minor">
+              <a:schemeClr val="lt1"/>
+            </a:fontRef>
+          </p:style>
+          <p:txBody>
+            <a:bodyPr rtlCol="0" anchor="ctr"/>
+            <a:lstStyle/>
+            <a:p>
+              <a:pPr algn="ctr"/>
+              <a:endParaRPr lang="en-US"/>
+            </a:p>
+          </p:txBody>
+        </p:sp>
+        <p:grpSp>
+          <p:nvGrpSpPr>
+            <p:cNvPr id="25" name="Group 135"/>
+            <p:cNvGrpSpPr/>
+            <p:nvPr/>
+          </p:nvGrpSpPr>
+          <p:grpSpPr>
+            <a:xfrm>
+              <a:off x="4114800" y="990600"/>
+              <a:ext cx="1165768" cy="828020"/>
+              <a:chOff x="4114800" y="990600"/>
+              <a:chExt cx="1165768" cy="828020"/>
+            </a:xfrm>
+          </p:grpSpPr>
+          <p:sp>
+            <p:nvSpPr>
+              <p:cNvPr id="129" name="TextBox 128"/>
+              <p:cNvSpPr txBox="1"/>
+              <p:nvPr/>
+            </p:nvSpPr>
+            <p:spPr>
+              <a:xfrm>
+                <a:off x="4114800" y="1295400"/>
+                <a:ext cx="1165768" cy="523220"/>
+              </a:xfrm>
+              <a:prstGeom prst="rect">
+                <a:avLst/>
+              </a:prstGeom>
+              <a:noFill/>
+            </p:spPr>
+            <p:txBody>
+              <a:bodyPr wrap="none" rtlCol="0">
+                <a:spAutoFit/>
+              </a:bodyPr>
+              <a:lstStyle/>
+              <a:p>
+                <a:r>
+                  <a:rPr lang="en-US" sz="1400" dirty="0" smtClean="0"/>
+                  <a:t>User </a:t>
+                </a:r>
+              </a:p>
+              <a:p>
+                <a:r>
+                  <a:rPr lang="en-US" sz="1400" dirty="0" smtClean="0"/>
+                  <a:t>Management</a:t>
+                </a:r>
+                <a:endParaRPr lang="en-US" sz="1400" dirty="0"/>
+              </a:p>
+            </p:txBody>
+          </p:sp>
+          <p:sp>
+            <p:nvSpPr>
+              <p:cNvPr id="135" name="TextBox 134"/>
+              <p:cNvSpPr txBox="1"/>
+              <p:nvPr/>
+            </p:nvSpPr>
+            <p:spPr>
+              <a:xfrm>
+                <a:off x="4495800" y="990600"/>
+                <a:ext cx="301686" cy="369332"/>
+              </a:xfrm>
+              <a:prstGeom prst="rect">
+                <a:avLst/>
+              </a:prstGeom>
+              <a:noFill/>
+            </p:spPr>
+            <p:txBody>
+              <a:bodyPr wrap="none" rtlCol="0">
+                <a:spAutoFit/>
+              </a:bodyPr>
+              <a:lstStyle/>
+              <a:p>
+                <a:r>
+                  <a:rPr lang="en-US" dirty="0" smtClean="0"/>
+                  <a:t>2</a:t>
+                </a:r>
+                <a:endParaRPr lang="en-US" dirty="0"/>
+              </a:p>
+            </p:txBody>
+          </p:sp>
+        </p:grpSp>
+      </p:grpSp>
+      <p:grpSp>
+        <p:nvGrpSpPr>
+          <p:cNvPr id="26" name="Group 140"/>
+          <p:cNvGrpSpPr/>
+          <p:nvPr/>
+        </p:nvGrpSpPr>
+        <p:grpSpPr>
+          <a:xfrm>
+            <a:off x="1981200" y="2209800"/>
+            <a:ext cx="1828800" cy="914400"/>
+            <a:chOff x="1981200" y="2209800"/>
+            <a:chExt cx="1828800" cy="914400"/>
+          </a:xfrm>
+        </p:grpSpPr>
+        <p:sp>
+          <p:nvSpPr>
+            <p:cNvPr id="44" name="Oval 43"/>
+            <p:cNvSpPr/>
+            <p:nvPr/>
+          </p:nvSpPr>
+          <p:spPr>
+            <a:xfrm>
+              <a:off x="1981200" y="2209800"/>
+              <a:ext cx="1828800" cy="914400"/>
+            </a:xfrm>
+            <a:prstGeom prst="ellipse">
+              <a:avLst/>
+            </a:prstGeom>
+            <a:noFill/>
+            <a:ln>
+              <a:solidFill>
+                <a:schemeClr val="tx1"/>
+              </a:solidFill>
+            </a:ln>
+          </p:spPr>
+          <p:style>
+            <a:lnRef idx="2">
+              <a:schemeClr val="accent1">
+                <a:shade val="50000"/>
+              </a:schemeClr>
+            </a:lnRef>
+            <a:fillRef idx="1">
+              <a:schemeClr val="accent1"/>
+            </a:fillRef>
+            <a:effectRef idx="0">
+              <a:schemeClr val="accent1"/>
+            </a:effectRef>
+            <a:fontRef idx="minor">
+              <a:schemeClr val="lt1"/>
+            </a:fontRef>
+          </p:style>
+          <p:txBody>
+            <a:bodyPr rtlCol="0" anchor="ctr"/>
+            <a:lstStyle/>
+            <a:p>
+              <a:pPr algn="ctr"/>
+              <a:endParaRPr lang="en-US"/>
+            </a:p>
+          </p:txBody>
+        </p:sp>
+        <p:sp>
+          <p:nvSpPr>
+            <p:cNvPr id="130" name="TextBox 129"/>
+            <p:cNvSpPr txBox="1"/>
+            <p:nvPr/>
+          </p:nvSpPr>
+          <p:spPr>
+            <a:xfrm>
+              <a:off x="2286000" y="2438400"/>
+              <a:ext cx="1165768" cy="523220"/>
+            </a:xfrm>
+            <a:prstGeom prst="rect">
+              <a:avLst/>
+            </a:prstGeom>
+            <a:noFill/>
+          </p:spPr>
+          <p:txBody>
+            <a:bodyPr wrap="none" rtlCol="0">
+              <a:spAutoFit/>
+            </a:bodyPr>
+            <a:lstStyle/>
+            <a:p>
+              <a:r>
+                <a:rPr lang="en-US" sz="1400" dirty="0" smtClean="0"/>
+                <a:t>Lesson</a:t>
+              </a:r>
+            </a:p>
+            <a:p>
+              <a:r>
+                <a:rPr lang="en-US" sz="1400" dirty="0" smtClean="0"/>
+                <a:t>Management</a:t>
+              </a:r>
+              <a:endParaRPr lang="en-US" sz="1400" dirty="0"/>
+            </a:p>
+          </p:txBody>
+        </p:sp>
+        <p:sp>
+          <p:nvSpPr>
+            <p:cNvPr id="138" name="TextBox 137"/>
+            <p:cNvSpPr txBox="1"/>
+            <p:nvPr/>
+          </p:nvSpPr>
+          <p:spPr>
+            <a:xfrm>
+              <a:off x="2743200" y="2209800"/>
+              <a:ext cx="301686" cy="369332"/>
+            </a:xfrm>
+            <a:prstGeom prst="rect">
+              <a:avLst/>
+            </a:prstGeom>
+            <a:noFill/>
+          </p:spPr>
+          <p:txBody>
+            <a:bodyPr wrap="none" rtlCol="0">
+              <a:spAutoFit/>
+            </a:bodyPr>
+            <a:lstStyle/>
+            <a:p>
+              <a:r>
+                <a:rPr lang="en-US" dirty="0" smtClean="0"/>
+                <a:t>3</a:t>
+              </a:r>
+              <a:endParaRPr lang="en-US" dirty="0"/>
+            </a:p>
+          </p:txBody>
+        </p:sp>
+      </p:grpSp>
+      <p:grpSp>
+        <p:nvGrpSpPr>
+          <p:cNvPr id="27" name="Group 139"/>
+          <p:cNvGrpSpPr/>
+          <p:nvPr/>
+        </p:nvGrpSpPr>
+        <p:grpSpPr>
+          <a:xfrm>
+            <a:off x="4038600" y="2819400"/>
+            <a:ext cx="1905000" cy="1412796"/>
+            <a:chOff x="4038600" y="2819400"/>
+            <a:chExt cx="1905000" cy="1412796"/>
+          </a:xfrm>
+        </p:grpSpPr>
+        <p:grpSp>
+          <p:nvGrpSpPr>
+            <p:cNvPr id="28" name="Group 5"/>
+            <p:cNvGrpSpPr/>
+            <p:nvPr/>
+          </p:nvGrpSpPr>
+          <p:grpSpPr>
+            <a:xfrm>
+              <a:off x="4038600" y="2819400"/>
+              <a:ext cx="1905000" cy="1412796"/>
+              <a:chOff x="3581400" y="3048000"/>
+              <a:chExt cx="1676400" cy="1059597"/>
+            </a:xfrm>
+          </p:grpSpPr>
+          <p:sp>
+            <p:nvSpPr>
+              <p:cNvPr id="4" name="Oval 3"/>
+              <p:cNvSpPr/>
+              <p:nvPr/>
+            </p:nvSpPr>
+            <p:spPr>
+              <a:xfrm>
+                <a:off x="3581400" y="3048000"/>
+                <a:ext cx="1676400" cy="914400"/>
+              </a:xfrm>
+              <a:prstGeom prst="ellipse">
+                <a:avLst/>
+              </a:prstGeom>
+              <a:noFill/>
+              <a:ln>
+                <a:solidFill>
+                  <a:schemeClr val="tx1"/>
+                </a:solidFill>
+              </a:ln>
+            </p:spPr>
+            <p:style>
+              <a:lnRef idx="2">
+                <a:schemeClr val="accent1">
+                  <a:shade val="50000"/>
+                </a:schemeClr>
+              </a:lnRef>
+              <a:fillRef idx="1">
+                <a:schemeClr val="accent1"/>
+              </a:fillRef>
+              <a:effectRef idx="0">
+                <a:schemeClr val="accent1"/>
+              </a:effectRef>
+              <a:fontRef idx="minor">
+                <a:schemeClr val="lt1"/>
+              </a:fontRef>
+            </p:style>
+            <p:txBody>
+              <a:bodyPr rtlCol="0" anchor="ctr"/>
+              <a:lstStyle/>
+              <a:p>
+                <a:pPr algn="ctr"/>
+                <a:endParaRPr lang="en-US" dirty="0"/>
+              </a:p>
+            </p:txBody>
+          </p:sp>
+          <p:sp>
+            <p:nvSpPr>
+              <p:cNvPr id="5" name="TextBox 4"/>
+              <p:cNvSpPr txBox="1"/>
+              <p:nvPr/>
+            </p:nvSpPr>
+            <p:spPr>
+              <a:xfrm>
+                <a:off x="4050792" y="3276600"/>
+                <a:ext cx="1056443" cy="830997"/>
+              </a:xfrm>
+              <a:prstGeom prst="rect">
+                <a:avLst/>
+              </a:prstGeom>
+              <a:noFill/>
+            </p:spPr>
+            <p:txBody>
+              <a:bodyPr wrap="none" rtlCol="0">
+                <a:spAutoFit/>
+              </a:bodyPr>
+              <a:lstStyle/>
+              <a:p>
+                <a:r>
+                  <a:rPr lang="en-US" sz="1600" dirty="0" smtClean="0"/>
+                  <a:t>Child </a:t>
+                </a:r>
+              </a:p>
+              <a:p>
+                <a:r>
+                  <a:rPr lang="en-US" sz="1600" dirty="0" smtClean="0"/>
+                  <a:t>Education </a:t>
+                </a:r>
+              </a:p>
+              <a:p>
+                <a:r>
+                  <a:rPr lang="en-US" sz="1600" dirty="0" smtClean="0"/>
+                  <a:t>System</a:t>
+                </a:r>
+                <a:endParaRPr lang="en-US" sz="1600" dirty="0"/>
+              </a:p>
+            </p:txBody>
+          </p:sp>
+        </p:grpSp>
+        <p:sp>
+          <p:nvSpPr>
+            <p:cNvPr id="139" name="TextBox 138"/>
+            <p:cNvSpPr txBox="1"/>
+            <p:nvPr/>
+          </p:nvSpPr>
+          <p:spPr>
+            <a:xfrm>
+              <a:off x="4876800" y="2819400"/>
+              <a:ext cx="301686" cy="369332"/>
+            </a:xfrm>
+            <a:prstGeom prst="rect">
+              <a:avLst/>
+            </a:prstGeom>
+            <a:noFill/>
+          </p:spPr>
+          <p:txBody>
+            <a:bodyPr wrap="none" rtlCol="0">
+              <a:spAutoFit/>
+            </a:bodyPr>
+            <a:lstStyle/>
+            <a:p>
+              <a:r>
+                <a:rPr lang="en-US" dirty="0" smtClean="0"/>
+                <a:t>1</a:t>
+              </a:r>
+              <a:endParaRPr lang="en-US" dirty="0"/>
+            </a:p>
+          </p:txBody>
+        </p:sp>
+      </p:grpSp>
+      <p:grpSp>
+        <p:nvGrpSpPr>
+          <p:cNvPr id="29" name="Group 142"/>
+          <p:cNvGrpSpPr/>
+          <p:nvPr/>
+        </p:nvGrpSpPr>
+        <p:grpSpPr>
+          <a:xfrm>
+            <a:off x="2362200" y="4419600"/>
+            <a:ext cx="1828800" cy="914400"/>
+            <a:chOff x="2362200" y="4419600"/>
+            <a:chExt cx="1828800" cy="914400"/>
+          </a:xfrm>
+        </p:grpSpPr>
+        <p:sp>
+          <p:nvSpPr>
+            <p:cNvPr id="42" name="Oval 41"/>
+            <p:cNvSpPr/>
+            <p:nvPr/>
+          </p:nvSpPr>
+          <p:spPr>
+            <a:xfrm>
+              <a:off x="2362200" y="4419600"/>
+              <a:ext cx="1828800" cy="914400"/>
+            </a:xfrm>
+            <a:prstGeom prst="ellipse">
+              <a:avLst/>
+            </a:prstGeom>
+            <a:noFill/>
+            <a:ln>
+              <a:solidFill>
+                <a:schemeClr val="tx1"/>
+              </a:solidFill>
+            </a:ln>
+          </p:spPr>
+          <p:style>
+            <a:lnRef idx="2">
+              <a:schemeClr val="accent1">
+                <a:shade val="50000"/>
+              </a:schemeClr>
+            </a:lnRef>
+            <a:fillRef idx="1">
+              <a:schemeClr val="accent1"/>
+            </a:fillRef>
+            <a:effectRef idx="0">
+              <a:schemeClr val="accent1"/>
+            </a:effectRef>
+            <a:fontRef idx="minor">
+              <a:schemeClr val="lt1"/>
+            </a:fontRef>
+          </p:style>
+          <p:txBody>
+            <a:bodyPr rtlCol="0" anchor="ctr"/>
+            <a:lstStyle/>
+            <a:p>
+              <a:pPr algn="ctr"/>
+              <a:endParaRPr lang="en-US"/>
+            </a:p>
+          </p:txBody>
+        </p:sp>
+        <p:sp>
+          <p:nvSpPr>
+            <p:cNvPr id="131" name="TextBox 130"/>
+            <p:cNvSpPr txBox="1"/>
+            <p:nvPr/>
+          </p:nvSpPr>
+          <p:spPr>
+            <a:xfrm>
+              <a:off x="2667000" y="4648200"/>
+              <a:ext cx="1165768" cy="523220"/>
+            </a:xfrm>
+            <a:prstGeom prst="rect">
+              <a:avLst/>
+            </a:prstGeom>
+            <a:noFill/>
+          </p:spPr>
+          <p:txBody>
+            <a:bodyPr wrap="none" rtlCol="0">
+              <a:spAutoFit/>
+            </a:bodyPr>
+            <a:lstStyle/>
+            <a:p>
+              <a:r>
+                <a:rPr lang="en-US" sz="1400" dirty="0" smtClean="0"/>
+                <a:t>Exercise</a:t>
+              </a:r>
+            </a:p>
+            <a:p>
+              <a:r>
+                <a:rPr lang="en-US" sz="1400" dirty="0" smtClean="0"/>
+                <a:t>Management</a:t>
+              </a:r>
+              <a:endParaRPr lang="en-US" sz="1400" dirty="0"/>
+            </a:p>
+          </p:txBody>
+        </p:sp>
+        <p:sp>
+          <p:nvSpPr>
+            <p:cNvPr id="142" name="TextBox 141"/>
+            <p:cNvSpPr txBox="1"/>
+            <p:nvPr/>
+          </p:nvSpPr>
+          <p:spPr>
+            <a:xfrm>
+              <a:off x="3124200" y="4419600"/>
+              <a:ext cx="301686" cy="369332"/>
+            </a:xfrm>
+            <a:prstGeom prst="rect">
+              <a:avLst/>
+            </a:prstGeom>
+            <a:noFill/>
+          </p:spPr>
+          <p:txBody>
+            <a:bodyPr wrap="none" rtlCol="0">
+              <a:spAutoFit/>
+            </a:bodyPr>
+            <a:lstStyle/>
+            <a:p>
+              <a:r>
+                <a:rPr lang="en-US" dirty="0" smtClean="0"/>
+                <a:t>4</a:t>
+              </a:r>
+              <a:endParaRPr lang="en-US" dirty="0"/>
+            </a:p>
+          </p:txBody>
+        </p:sp>
+      </p:grpSp>
+      <p:grpSp>
+        <p:nvGrpSpPr>
+          <p:cNvPr id="30" name="Group 145"/>
+          <p:cNvGrpSpPr/>
+          <p:nvPr/>
+        </p:nvGrpSpPr>
+        <p:grpSpPr>
+          <a:xfrm>
+            <a:off x="5486400" y="4648200"/>
+            <a:ext cx="1828800" cy="914400"/>
+            <a:chOff x="5486400" y="4648200"/>
+            <a:chExt cx="1828800" cy="914400"/>
+          </a:xfrm>
+        </p:grpSpPr>
+        <p:sp>
+          <p:nvSpPr>
+            <p:cNvPr id="46" name="Oval 45"/>
+            <p:cNvSpPr/>
+            <p:nvPr/>
+          </p:nvSpPr>
+          <p:spPr>
+            <a:xfrm>
+              <a:off x="5486400" y="4648200"/>
+              <a:ext cx="1828800" cy="914400"/>
+            </a:xfrm>
+            <a:prstGeom prst="ellipse">
+              <a:avLst/>
+            </a:prstGeom>
+            <a:noFill/>
+            <a:ln>
+              <a:solidFill>
+                <a:schemeClr val="tx1"/>
+              </a:solidFill>
+            </a:ln>
+          </p:spPr>
+          <p:style>
+            <a:lnRef idx="2">
+              <a:schemeClr val="accent1">
+                <a:shade val="50000"/>
+              </a:schemeClr>
+            </a:lnRef>
+            <a:fillRef idx="1">
+              <a:schemeClr val="accent1"/>
+            </a:fillRef>
+            <a:effectRef idx="0">
+              <a:schemeClr val="accent1"/>
+            </a:effectRef>
+            <a:fontRef idx="minor">
+              <a:schemeClr val="lt1"/>
+            </a:fontRef>
+          </p:style>
+          <p:txBody>
+            <a:bodyPr rtlCol="0" anchor="ctr"/>
+            <a:lstStyle/>
+            <a:p>
+              <a:pPr algn="ctr"/>
+              <a:endParaRPr lang="en-US"/>
+            </a:p>
+          </p:txBody>
+        </p:sp>
+        <p:sp>
+          <p:nvSpPr>
+            <p:cNvPr id="134" name="TextBox 133"/>
+            <p:cNvSpPr txBox="1"/>
+            <p:nvPr/>
+          </p:nvSpPr>
+          <p:spPr>
+            <a:xfrm>
+              <a:off x="5867400" y="4876800"/>
+              <a:ext cx="1414811" cy="523220"/>
+            </a:xfrm>
+            <a:prstGeom prst="rect">
+              <a:avLst/>
+            </a:prstGeom>
+            <a:noFill/>
+          </p:spPr>
+          <p:txBody>
+            <a:bodyPr wrap="none" rtlCol="0">
+              <a:spAutoFit/>
+            </a:bodyPr>
+            <a:lstStyle/>
+            <a:p>
+              <a:r>
+                <a:rPr lang="en-US" sz="1400" dirty="0" smtClean="0"/>
+                <a:t>Online Resource </a:t>
+              </a:r>
+            </a:p>
+            <a:p>
+              <a:r>
+                <a:rPr lang="en-US" sz="1400" dirty="0" smtClean="0"/>
+                <a:t>Management</a:t>
+              </a:r>
+              <a:endParaRPr lang="en-US" sz="1400" dirty="0"/>
+            </a:p>
+          </p:txBody>
+        </p:sp>
+        <p:sp>
+          <p:nvSpPr>
+            <p:cNvPr id="144" name="TextBox 143"/>
+            <p:cNvSpPr txBox="1"/>
+            <p:nvPr/>
+          </p:nvSpPr>
+          <p:spPr>
+            <a:xfrm>
+              <a:off x="6248400" y="4648200"/>
+              <a:ext cx="301686" cy="369332"/>
+            </a:xfrm>
+            <a:prstGeom prst="rect">
+              <a:avLst/>
+            </a:prstGeom>
+            <a:noFill/>
+          </p:spPr>
+          <p:txBody>
+            <a:bodyPr wrap="none" rtlCol="0">
+              <a:spAutoFit/>
+            </a:bodyPr>
+            <a:lstStyle/>
+            <a:p>
+              <a:r>
+                <a:rPr lang="en-US" dirty="0" smtClean="0"/>
+                <a:t>5</a:t>
+              </a:r>
+              <a:endParaRPr lang="en-US" dirty="0"/>
+            </a:p>
+          </p:txBody>
+        </p:sp>
+      </p:grpSp>
+      <p:grpSp>
+        <p:nvGrpSpPr>
+          <p:cNvPr id="31" name="Group 146"/>
+          <p:cNvGrpSpPr/>
+          <p:nvPr/>
+        </p:nvGrpSpPr>
+        <p:grpSpPr>
+          <a:xfrm>
+            <a:off x="6172200" y="1524000"/>
+            <a:ext cx="1828800" cy="914400"/>
+            <a:chOff x="6172200" y="1524000"/>
+            <a:chExt cx="1828800" cy="914400"/>
+          </a:xfrm>
+        </p:grpSpPr>
+        <p:sp>
+          <p:nvSpPr>
+            <p:cNvPr id="45" name="Oval 44"/>
+            <p:cNvSpPr/>
+            <p:nvPr/>
+          </p:nvSpPr>
+          <p:spPr>
+            <a:xfrm>
+              <a:off x="6172200" y="1524000"/>
+              <a:ext cx="1828800" cy="914400"/>
+            </a:xfrm>
+            <a:prstGeom prst="ellipse">
+              <a:avLst/>
+            </a:prstGeom>
+            <a:noFill/>
+            <a:ln>
+              <a:solidFill>
+                <a:schemeClr val="tx1"/>
+              </a:solidFill>
+            </a:ln>
+          </p:spPr>
+          <p:style>
+            <a:lnRef idx="2">
+              <a:schemeClr val="accent1">
+                <a:shade val="50000"/>
+              </a:schemeClr>
+            </a:lnRef>
+            <a:fillRef idx="1">
+              <a:schemeClr val="accent1"/>
+            </a:fillRef>
+            <a:effectRef idx="0">
+              <a:schemeClr val="accent1"/>
+            </a:effectRef>
+            <a:fontRef idx="minor">
+              <a:schemeClr val="lt1"/>
+            </a:fontRef>
+          </p:style>
+          <p:txBody>
+            <a:bodyPr rtlCol="0" anchor="ctr"/>
+            <a:lstStyle/>
+            <a:p>
+              <a:pPr algn="ctr"/>
+              <a:endParaRPr lang="en-US"/>
+            </a:p>
+          </p:txBody>
+        </p:sp>
+        <p:sp>
+          <p:nvSpPr>
+            <p:cNvPr id="132" name="TextBox 131"/>
+            <p:cNvSpPr txBox="1"/>
+            <p:nvPr/>
+          </p:nvSpPr>
+          <p:spPr>
+            <a:xfrm>
+              <a:off x="6477000" y="1828800"/>
+              <a:ext cx="1165768" cy="523220"/>
+            </a:xfrm>
+            <a:prstGeom prst="rect">
+              <a:avLst/>
+            </a:prstGeom>
+            <a:noFill/>
+          </p:spPr>
+          <p:txBody>
+            <a:bodyPr wrap="none" rtlCol="0">
+              <a:spAutoFit/>
+            </a:bodyPr>
+            <a:lstStyle/>
+            <a:p>
+              <a:r>
+                <a:rPr lang="en-US" sz="1400" dirty="0" smtClean="0"/>
+                <a:t>Payment</a:t>
+              </a:r>
+            </a:p>
+            <a:p>
+              <a:r>
+                <a:rPr lang="en-US" sz="1400" dirty="0" smtClean="0"/>
+                <a:t>Management</a:t>
+              </a:r>
+              <a:endParaRPr lang="en-US" sz="1400" dirty="0"/>
+            </a:p>
+          </p:txBody>
+        </p:sp>
+        <p:sp>
+          <p:nvSpPr>
+            <p:cNvPr id="145" name="TextBox 144"/>
+            <p:cNvSpPr txBox="1"/>
+            <p:nvPr/>
+          </p:nvSpPr>
+          <p:spPr>
+            <a:xfrm>
+              <a:off x="6934200" y="1524000"/>
+              <a:ext cx="301686" cy="369332"/>
+            </a:xfrm>
+            <a:prstGeom prst="rect">
+              <a:avLst/>
+            </a:prstGeom>
+            <a:noFill/>
+          </p:spPr>
+          <p:txBody>
+            <a:bodyPr wrap="none" rtlCol="0">
+              <a:spAutoFit/>
+            </a:bodyPr>
+            <a:lstStyle/>
+            <a:p>
+              <a:r>
+                <a:rPr lang="en-US" dirty="0" smtClean="0"/>
+                <a:t>6</a:t>
+              </a:r>
+              <a:endParaRPr lang="en-US" dirty="0"/>
+            </a:p>
+          </p:txBody>
+        </p:sp>
+      </p:grpSp>
+      <p:sp>
+        <p:nvSpPr>
+          <p:cNvPr id="148" name="TextBox 147"/>
+          <p:cNvSpPr txBox="1"/>
+          <p:nvPr/>
+        </p:nvSpPr>
+        <p:spPr>
+          <a:xfrm>
+            <a:off x="2133600" y="914400"/>
+            <a:ext cx="1425455" cy="307777"/>
+          </a:xfrm>
+          <a:prstGeom prst="rect">
+            <a:avLst/>
+          </a:prstGeom>
+          <a:noFill/>
+        </p:spPr>
+        <p:txBody>
+          <a:bodyPr wrap="none" rtlCol="0">
+            <a:spAutoFit/>
+          </a:bodyPr>
+          <a:lstStyle/>
+          <a:p>
+            <a:r>
+              <a:rPr lang="en-US" sz="1400" dirty="0" smtClean="0"/>
+              <a:t>Send user details</a:t>
+            </a:r>
+            <a:endParaRPr lang="en-US" dirty="0"/>
+          </a:p>
+        </p:txBody>
+      </p:sp>
+      <p:sp>
+        <p:nvSpPr>
+          <p:cNvPr id="149" name="TextBox 148"/>
+          <p:cNvSpPr txBox="1"/>
+          <p:nvPr/>
+        </p:nvSpPr>
+        <p:spPr>
+          <a:xfrm>
+            <a:off x="457200" y="2362200"/>
+            <a:ext cx="1603388" cy="307777"/>
+          </a:xfrm>
+          <a:prstGeom prst="rect">
+            <a:avLst/>
+          </a:prstGeom>
+          <a:noFill/>
+        </p:spPr>
+        <p:txBody>
+          <a:bodyPr wrap="none" rtlCol="0">
+            <a:spAutoFit/>
+          </a:bodyPr>
+          <a:lstStyle/>
+          <a:p>
+            <a:r>
+              <a:rPr lang="en-US" sz="1400" dirty="0" smtClean="0"/>
+              <a:t>Send Lesson details</a:t>
+            </a:r>
+            <a:endParaRPr lang="en-US" dirty="0"/>
+          </a:p>
+        </p:txBody>
+      </p:sp>
+      <p:sp>
+        <p:nvSpPr>
+          <p:cNvPr id="150" name="TextBox 149"/>
+          <p:cNvSpPr txBox="1"/>
+          <p:nvPr/>
+        </p:nvSpPr>
+        <p:spPr>
+          <a:xfrm>
+            <a:off x="3200400" y="5638800"/>
+            <a:ext cx="1697003" cy="307777"/>
+          </a:xfrm>
+          <a:prstGeom prst="rect">
+            <a:avLst/>
+          </a:prstGeom>
+          <a:noFill/>
+        </p:spPr>
+        <p:txBody>
+          <a:bodyPr wrap="none" rtlCol="0">
+            <a:spAutoFit/>
+          </a:bodyPr>
+          <a:lstStyle/>
+          <a:p>
+            <a:r>
+              <a:rPr lang="en-US" sz="1400" dirty="0" smtClean="0"/>
+              <a:t>Send Exercise details</a:t>
+            </a:r>
+            <a:endParaRPr lang="en-US" dirty="0"/>
+          </a:p>
+        </p:txBody>
+      </p:sp>
+      <p:sp>
+        <p:nvSpPr>
+          <p:cNvPr id="151" name="TextBox 150"/>
+          <p:cNvSpPr txBox="1"/>
+          <p:nvPr/>
+        </p:nvSpPr>
+        <p:spPr>
+          <a:xfrm>
+            <a:off x="6858000" y="5562600"/>
+            <a:ext cx="1815562" cy="523220"/>
+          </a:xfrm>
+          <a:prstGeom prst="rect">
+            <a:avLst/>
+          </a:prstGeom>
+          <a:noFill/>
+        </p:spPr>
+        <p:txBody>
+          <a:bodyPr wrap="none" rtlCol="0">
+            <a:spAutoFit/>
+          </a:bodyPr>
+          <a:lstStyle/>
+          <a:p>
+            <a:r>
+              <a:rPr lang="en-US" sz="1400" dirty="0" smtClean="0"/>
+              <a:t>Send Online Resource </a:t>
+            </a:r>
+          </a:p>
+          <a:p>
+            <a:r>
+              <a:rPr lang="en-US" sz="1400" dirty="0" smtClean="0"/>
+              <a:t>details</a:t>
+            </a:r>
+            <a:endParaRPr lang="en-US" dirty="0"/>
+          </a:p>
+        </p:txBody>
+      </p:sp>
+      <p:sp>
+        <p:nvSpPr>
+          <p:cNvPr id="152" name="TextBox 151"/>
+          <p:cNvSpPr txBox="1"/>
+          <p:nvPr/>
+        </p:nvSpPr>
+        <p:spPr>
+          <a:xfrm>
+            <a:off x="6400800" y="1066800"/>
+            <a:ext cx="1748427" cy="307777"/>
+          </a:xfrm>
+          <a:prstGeom prst="rect">
+            <a:avLst/>
+          </a:prstGeom>
+          <a:noFill/>
+        </p:spPr>
+        <p:txBody>
+          <a:bodyPr wrap="none" rtlCol="0">
+            <a:spAutoFit/>
+          </a:bodyPr>
+          <a:lstStyle/>
+          <a:p>
+            <a:r>
+              <a:rPr lang="en-US" sz="1400" dirty="0" smtClean="0"/>
+              <a:t>Send Payment details</a:t>
+            </a:r>
+            <a:endParaRPr lang="en-US" dirty="0"/>
+          </a:p>
+        </p:txBody>
+      </p:sp>
+      <p:sp>
+        <p:nvSpPr>
+          <p:cNvPr id="153" name="TextBox 152"/>
+          <p:cNvSpPr txBox="1"/>
+          <p:nvPr/>
+        </p:nvSpPr>
+        <p:spPr>
+          <a:xfrm>
+            <a:off x="4267200" y="685800"/>
+            <a:ext cx="1328312" cy="307777"/>
+          </a:xfrm>
+          <a:prstGeom prst="rect">
+            <a:avLst/>
+          </a:prstGeom>
+          <a:noFill/>
+        </p:spPr>
+        <p:txBody>
+          <a:bodyPr wrap="none" rtlCol="0">
+            <a:spAutoFit/>
+          </a:bodyPr>
+          <a:lstStyle/>
+          <a:p>
+            <a:r>
+              <a:rPr lang="en-US" sz="1400" dirty="0" smtClean="0"/>
+              <a:t>Get user details</a:t>
+            </a:r>
+            <a:endParaRPr lang="en-US" dirty="0"/>
+          </a:p>
+        </p:txBody>
+      </p:sp>
+      <p:sp>
+        <p:nvSpPr>
+          <p:cNvPr id="154" name="TextBox 153"/>
+          <p:cNvSpPr txBox="1"/>
+          <p:nvPr/>
+        </p:nvSpPr>
+        <p:spPr>
+          <a:xfrm>
+            <a:off x="2057400" y="1524000"/>
+            <a:ext cx="1506246" cy="307777"/>
+          </a:xfrm>
+          <a:prstGeom prst="rect">
+            <a:avLst/>
+          </a:prstGeom>
+          <a:noFill/>
+        </p:spPr>
+        <p:txBody>
+          <a:bodyPr wrap="none" rtlCol="0">
+            <a:spAutoFit/>
+          </a:bodyPr>
+          <a:lstStyle/>
+          <a:p>
+            <a:r>
+              <a:rPr lang="en-US" sz="1400" dirty="0" smtClean="0"/>
+              <a:t>Get Lesson details</a:t>
+            </a:r>
+            <a:endParaRPr lang="en-US" dirty="0"/>
+          </a:p>
+        </p:txBody>
+      </p:sp>
+      <p:sp>
+        <p:nvSpPr>
+          <p:cNvPr id="155" name="TextBox 154"/>
+          <p:cNvSpPr txBox="1"/>
+          <p:nvPr/>
+        </p:nvSpPr>
+        <p:spPr>
+          <a:xfrm>
+            <a:off x="685800" y="4572000"/>
+            <a:ext cx="1599862" cy="307777"/>
+          </a:xfrm>
+          <a:prstGeom prst="rect">
+            <a:avLst/>
+          </a:prstGeom>
+          <a:noFill/>
+        </p:spPr>
+        <p:txBody>
+          <a:bodyPr wrap="none" rtlCol="0">
+            <a:spAutoFit/>
+          </a:bodyPr>
+          <a:lstStyle/>
+          <a:p>
+            <a:r>
+              <a:rPr lang="en-US" sz="1400" dirty="0" smtClean="0"/>
+              <a:t>Get Exercise details</a:t>
+            </a:r>
+            <a:endParaRPr lang="en-US" dirty="0"/>
+          </a:p>
+        </p:txBody>
+      </p:sp>
+      <p:sp>
+        <p:nvSpPr>
+          <p:cNvPr id="156" name="TextBox 155"/>
+          <p:cNvSpPr txBox="1"/>
+          <p:nvPr/>
+        </p:nvSpPr>
+        <p:spPr>
+          <a:xfrm>
+            <a:off x="7328438" y="5029200"/>
+            <a:ext cx="1718419" cy="523220"/>
+          </a:xfrm>
+          <a:prstGeom prst="rect">
+            <a:avLst/>
+          </a:prstGeom>
+          <a:noFill/>
+        </p:spPr>
+        <p:txBody>
+          <a:bodyPr wrap="none" rtlCol="0">
+            <a:spAutoFit/>
+          </a:bodyPr>
+          <a:lstStyle/>
+          <a:p>
+            <a:r>
+              <a:rPr lang="en-US" sz="1400" dirty="0" smtClean="0"/>
+              <a:t>Get Online Resource </a:t>
+            </a:r>
+          </a:p>
+          <a:p>
+            <a:r>
+              <a:rPr lang="en-US" sz="1400" dirty="0" smtClean="0"/>
+              <a:t>details</a:t>
+            </a:r>
+            <a:endParaRPr lang="en-US" dirty="0"/>
+          </a:p>
+        </p:txBody>
+      </p:sp>
+      <p:sp>
+        <p:nvSpPr>
+          <p:cNvPr id="157" name="TextBox 156"/>
+          <p:cNvSpPr txBox="1"/>
+          <p:nvPr/>
+        </p:nvSpPr>
+        <p:spPr>
+          <a:xfrm>
+            <a:off x="8269786" y="1905000"/>
+            <a:ext cx="865109" cy="738664"/>
+          </a:xfrm>
+          <a:prstGeom prst="rect">
+            <a:avLst/>
+          </a:prstGeom>
+          <a:noFill/>
+        </p:spPr>
+        <p:txBody>
+          <a:bodyPr wrap="none" rtlCol="0">
+            <a:spAutoFit/>
+          </a:bodyPr>
+          <a:lstStyle/>
+          <a:p>
+            <a:r>
+              <a:rPr lang="en-US" sz="1400" dirty="0" smtClean="0"/>
+              <a:t>Get </a:t>
+            </a:r>
+          </a:p>
+          <a:p>
+            <a:r>
+              <a:rPr lang="en-US" sz="1400" dirty="0" smtClean="0"/>
+              <a:t>Payment </a:t>
+            </a:r>
+          </a:p>
+          <a:p>
+            <a:r>
+              <a:rPr lang="en-US" sz="1400" dirty="0" smtClean="0"/>
+              <a:t>details</a:t>
+            </a:r>
+            <a:endParaRPr lang="en-US" dirty="0"/>
+          </a:p>
+        </p:txBody>
+      </p:sp>
+      <p:cxnSp>
+        <p:nvCxnSpPr>
+          <p:cNvPr id="159" name="Elbow Connector 158"/>
+          <p:cNvCxnSpPr/>
+          <p:nvPr/>
+        </p:nvCxnSpPr>
+        <p:spPr>
+          <a:xfrm rot="5400000">
+            <a:off x="4000500" y="2400300"/>
+            <a:ext cx="990600" cy="1588"/>
+          </a:xfrm>
+          <a:prstGeom prst="bentConnector3">
+            <a:avLst>
+              <a:gd name="adj1" fmla="val 50000"/>
+            </a:avLst>
+          </a:prstGeom>
+          <a:ln>
+            <a:solidFill>
+              <a:schemeClr val="tx1"/>
+            </a:solidFill>
+            <a:tailEnd type="arrow"/>
+          </a:ln>
+        </p:spPr>
+        <p:style>
+          <a:lnRef idx="1">
+            <a:schemeClr val="accent1"/>
+          </a:lnRef>
+          <a:fillRef idx="0">
+            <a:schemeClr val="accent1"/>
+          </a:fillRef>
+          <a:effectRef idx="0">
+            <a:schemeClr val="accent1"/>
+          </a:effectRef>
+          <a:fontRef idx="minor">
+            <a:schemeClr val="tx1"/>
+          </a:fontRef>
+        </p:style>
+      </p:cxnSp>
+      <p:cxnSp>
+        <p:nvCxnSpPr>
+          <p:cNvPr id="163" name="Straight Arrow Connector 162"/>
+          <p:cNvCxnSpPr/>
+          <p:nvPr/>
+        </p:nvCxnSpPr>
+        <p:spPr>
+          <a:xfrm rot="5400000" flipH="1" flipV="1">
+            <a:off x="4495801" y="2362199"/>
+            <a:ext cx="914400" cy="2"/>
+          </a:xfrm>
+          <a:prstGeom prst="straightConnector1">
+            <a:avLst/>
+          </a:prstGeom>
+          <a:ln>
+            <a:solidFill>
+              <a:schemeClr val="tx1"/>
+            </a:solidFill>
+            <a:tailEnd type="arrow"/>
+          </a:ln>
+        </p:spPr>
+        <p:style>
+          <a:lnRef idx="1">
+            <a:schemeClr val="accent1"/>
+          </a:lnRef>
+          <a:fillRef idx="0">
+            <a:schemeClr val="accent1"/>
+          </a:fillRef>
+          <a:effectRef idx="0">
+            <a:schemeClr val="accent1"/>
+          </a:effectRef>
+          <a:fontRef idx="minor">
+            <a:schemeClr val="tx1"/>
+          </a:fontRef>
+        </p:style>
+      </p:cxnSp>
+      <p:cxnSp>
+        <p:nvCxnSpPr>
+          <p:cNvPr id="166" name="Shape 165"/>
+          <p:cNvCxnSpPr>
+            <a:stCxn id="45" idx="2"/>
+          </p:cNvCxnSpPr>
+          <p:nvPr/>
+        </p:nvCxnSpPr>
+        <p:spPr>
+          <a:xfrm rot="10800000" flipV="1">
+            <a:off x="5486400" y="1981200"/>
+            <a:ext cx="685800" cy="914400"/>
+          </a:xfrm>
+          <a:prstGeom prst="bentConnector2">
+            <a:avLst/>
+          </a:prstGeom>
+          <a:ln>
+            <a:solidFill>
+              <a:schemeClr val="tx1"/>
+            </a:solidFill>
+            <a:tailEnd type="arrow"/>
+          </a:ln>
+        </p:spPr>
+        <p:style>
+          <a:lnRef idx="1">
+            <a:schemeClr val="accent1"/>
+          </a:lnRef>
+          <a:fillRef idx="0">
+            <a:schemeClr val="accent1"/>
+          </a:fillRef>
+          <a:effectRef idx="0">
+            <a:schemeClr val="accent1"/>
+          </a:effectRef>
+          <a:fontRef idx="minor">
+            <a:schemeClr val="tx1"/>
+          </a:fontRef>
+        </p:style>
+      </p:cxnSp>
+      <p:cxnSp>
+        <p:nvCxnSpPr>
+          <p:cNvPr id="168" name="Shape 167"/>
+          <p:cNvCxnSpPr>
+            <a:stCxn id="4" idx="6"/>
+          </p:cNvCxnSpPr>
+          <p:nvPr/>
+        </p:nvCxnSpPr>
+        <p:spPr>
+          <a:xfrm flipV="1">
+            <a:off x="5943600" y="2362200"/>
+            <a:ext cx="609600" cy="1066800"/>
+          </a:xfrm>
+          <a:prstGeom prst="bentConnector2">
+            <a:avLst/>
+          </a:prstGeom>
+          <a:ln>
+            <a:solidFill>
+              <a:schemeClr val="tx1"/>
+            </a:solidFill>
+            <a:tailEnd type="arrow"/>
+          </a:ln>
+        </p:spPr>
+        <p:style>
+          <a:lnRef idx="1">
+            <a:schemeClr val="accent1"/>
+          </a:lnRef>
+          <a:fillRef idx="0">
+            <a:schemeClr val="accent1"/>
+          </a:fillRef>
+          <a:effectRef idx="0">
+            <a:schemeClr val="accent1"/>
+          </a:effectRef>
+          <a:fontRef idx="minor">
+            <a:schemeClr val="tx1"/>
+          </a:fontRef>
+        </p:style>
+      </p:cxnSp>
+      <p:cxnSp>
+        <p:nvCxnSpPr>
+          <p:cNvPr id="170" name="Shape 169"/>
+          <p:cNvCxnSpPr/>
+          <p:nvPr/>
+        </p:nvCxnSpPr>
+        <p:spPr>
+          <a:xfrm rot="16200000" flipV="1">
+            <a:off x="5695769" y="3829231"/>
+            <a:ext cx="970002" cy="626740"/>
+          </a:xfrm>
+          <a:prstGeom prst="bentConnector2">
+            <a:avLst/>
+          </a:prstGeom>
+          <a:ln>
+            <a:solidFill>
+              <a:schemeClr val="tx1"/>
+            </a:solidFill>
+            <a:tailEnd type="arrow"/>
+          </a:ln>
+        </p:spPr>
+        <p:style>
+          <a:lnRef idx="1">
+            <a:schemeClr val="accent1"/>
+          </a:lnRef>
+          <a:fillRef idx="0">
+            <a:schemeClr val="accent1"/>
+          </a:fillRef>
+          <a:effectRef idx="0">
+            <a:schemeClr val="accent1"/>
+          </a:effectRef>
+          <a:fontRef idx="minor">
+            <a:schemeClr val="tx1"/>
+          </a:fontRef>
+        </p:style>
+      </p:cxnSp>
+      <p:cxnSp>
+        <p:nvCxnSpPr>
+          <p:cNvPr id="196" name="Elbow Connector 195"/>
+          <p:cNvCxnSpPr/>
+          <p:nvPr/>
+        </p:nvCxnSpPr>
+        <p:spPr>
+          <a:xfrm rot="5400000">
+            <a:off x="5181600" y="4343400"/>
+            <a:ext cx="914400" cy="1588"/>
+          </a:xfrm>
+          <a:prstGeom prst="bentConnector3">
+            <a:avLst>
+              <a:gd name="adj1" fmla="val 50000"/>
+            </a:avLst>
+          </a:prstGeom>
+          <a:ln>
+            <a:solidFill>
+              <a:schemeClr val="tx1"/>
+            </a:solidFill>
+            <a:tailEnd type="arrow"/>
+          </a:ln>
+        </p:spPr>
+        <p:style>
+          <a:lnRef idx="1">
+            <a:schemeClr val="accent1"/>
+          </a:lnRef>
+          <a:fillRef idx="0">
+            <a:schemeClr val="accent1"/>
+          </a:fillRef>
+          <a:effectRef idx="0">
+            <a:schemeClr val="accent1"/>
+          </a:effectRef>
+          <a:fontRef idx="minor">
+            <a:schemeClr val="tx1"/>
+          </a:fontRef>
+        </p:style>
+      </p:cxnSp>
+      <p:cxnSp>
+        <p:nvCxnSpPr>
+          <p:cNvPr id="198" name="Shape 197"/>
+          <p:cNvCxnSpPr>
+            <a:endCxn id="42" idx="6"/>
+          </p:cNvCxnSpPr>
+          <p:nvPr/>
+        </p:nvCxnSpPr>
+        <p:spPr>
+          <a:xfrm rot="5400000">
+            <a:off x="4191000" y="4038600"/>
+            <a:ext cx="838200" cy="838200"/>
+          </a:xfrm>
+          <a:prstGeom prst="bentConnector2">
+            <a:avLst/>
+          </a:prstGeom>
+          <a:ln>
+            <a:solidFill>
+              <a:schemeClr val="tx1"/>
+            </a:solidFill>
+            <a:tailEnd type="arrow"/>
+          </a:ln>
+        </p:spPr>
+        <p:style>
+          <a:lnRef idx="1">
+            <a:schemeClr val="accent1"/>
+          </a:lnRef>
+          <a:fillRef idx="0">
+            <a:schemeClr val="accent1"/>
+          </a:fillRef>
+          <a:effectRef idx="0">
+            <a:schemeClr val="accent1"/>
+          </a:effectRef>
+          <a:fontRef idx="minor">
+            <a:schemeClr val="tx1"/>
+          </a:fontRef>
+        </p:style>
+      </p:cxnSp>
+      <p:cxnSp>
+        <p:nvCxnSpPr>
+          <p:cNvPr id="200" name="Shape 199"/>
+          <p:cNvCxnSpPr/>
+          <p:nvPr/>
+        </p:nvCxnSpPr>
+        <p:spPr>
+          <a:xfrm rot="5400000" flipH="1" flipV="1">
+            <a:off x="3620279" y="3694921"/>
+            <a:ext cx="533400" cy="915957"/>
+          </a:xfrm>
+          <a:prstGeom prst="bentConnector2">
+            <a:avLst/>
+          </a:prstGeom>
+          <a:ln>
+            <a:solidFill>
+              <a:schemeClr val="tx1"/>
+            </a:solidFill>
+            <a:tailEnd type="arrow"/>
+          </a:ln>
+        </p:spPr>
+        <p:style>
+          <a:lnRef idx="1">
+            <a:schemeClr val="accent1"/>
+          </a:lnRef>
+          <a:fillRef idx="0">
+            <a:schemeClr val="accent1"/>
+          </a:fillRef>
+          <a:effectRef idx="0">
+            <a:schemeClr val="accent1"/>
+          </a:effectRef>
+          <a:fontRef idx="minor">
+            <a:schemeClr val="tx1"/>
+          </a:fontRef>
+        </p:style>
+      </p:cxnSp>
+      <p:cxnSp>
+        <p:nvCxnSpPr>
+          <p:cNvPr id="202" name="Shape 201"/>
+          <p:cNvCxnSpPr>
+            <a:stCxn id="4" idx="2"/>
+            <a:endCxn id="44" idx="4"/>
+          </p:cNvCxnSpPr>
+          <p:nvPr/>
+        </p:nvCxnSpPr>
+        <p:spPr>
+          <a:xfrm rot="10800000">
+            <a:off x="2895600" y="3124200"/>
+            <a:ext cx="1143000" cy="304800"/>
+          </a:xfrm>
+          <a:prstGeom prst="bentConnector2">
+            <a:avLst/>
+          </a:prstGeom>
+          <a:ln>
+            <a:solidFill>
+              <a:schemeClr val="tx1"/>
+            </a:solidFill>
+            <a:tailEnd type="arrow"/>
+          </a:ln>
+        </p:spPr>
+        <p:style>
+          <a:lnRef idx="1">
+            <a:schemeClr val="accent1"/>
+          </a:lnRef>
+          <a:fillRef idx="0">
+            <a:schemeClr val="accent1"/>
+          </a:fillRef>
+          <a:effectRef idx="0">
+            <a:schemeClr val="accent1"/>
+          </a:effectRef>
+          <a:fontRef idx="minor">
+            <a:schemeClr val="tx1"/>
+          </a:fontRef>
+        </p:style>
+      </p:cxnSp>
+      <p:cxnSp>
+        <p:nvCxnSpPr>
+          <p:cNvPr id="204" name="Elbow Connector 203"/>
+          <p:cNvCxnSpPr/>
+          <p:nvPr/>
+        </p:nvCxnSpPr>
+        <p:spPr>
+          <a:xfrm rot="16200000" flipH="1">
+            <a:off x="3162300" y="2247900"/>
+            <a:ext cx="990600" cy="914400"/>
+          </a:xfrm>
+          <a:prstGeom prst="bentConnector3">
+            <a:avLst>
+              <a:gd name="adj1" fmla="val 402"/>
+            </a:avLst>
+          </a:prstGeom>
+          <a:ln>
+            <a:solidFill>
+              <a:schemeClr val="tx1"/>
+            </a:solidFill>
+            <a:tailEnd type="arrow"/>
+          </a:ln>
+        </p:spPr>
+        <p:style>
+          <a:lnRef idx="1">
+            <a:schemeClr val="accent1"/>
+          </a:lnRef>
+          <a:fillRef idx="0">
+            <a:schemeClr val="accent1"/>
+          </a:fillRef>
+          <a:effectRef idx="0">
+            <a:schemeClr val="accent1"/>
+          </a:effectRef>
+          <a:fontRef idx="minor">
+            <a:schemeClr val="tx1"/>
+          </a:fontRef>
+        </p:style>
+      </p:cxnSp>
+      <p:sp>
+        <p:nvSpPr>
+          <p:cNvPr id="211" name="TextBox 210"/>
+          <p:cNvSpPr txBox="1"/>
+          <p:nvPr/>
+        </p:nvSpPr>
+        <p:spPr>
+          <a:xfrm>
+            <a:off x="1905000" y="4038600"/>
+            <a:ext cx="1517338" cy="307777"/>
+          </a:xfrm>
+          <a:prstGeom prst="rect">
+            <a:avLst/>
+          </a:prstGeom>
+          <a:noFill/>
+        </p:spPr>
+        <p:txBody>
+          <a:bodyPr wrap="none" rtlCol="0">
+            <a:spAutoFit/>
+          </a:bodyPr>
+          <a:lstStyle/>
+          <a:p>
+            <a:r>
+              <a:rPr lang="en-US" sz="1400" dirty="0" smtClean="0"/>
+              <a:t>Apply for exercise </a:t>
+            </a:r>
+            <a:endParaRPr lang="en-US" dirty="0"/>
+          </a:p>
+        </p:txBody>
+      </p:sp>
+      <p:sp>
+        <p:nvSpPr>
+          <p:cNvPr id="212" name="TextBox 211"/>
+          <p:cNvSpPr txBox="1"/>
+          <p:nvPr/>
+        </p:nvSpPr>
+        <p:spPr>
+          <a:xfrm>
+            <a:off x="4191000" y="4114800"/>
+            <a:ext cx="923714" cy="738664"/>
+          </a:xfrm>
+          <a:prstGeom prst="rect">
+            <a:avLst/>
+          </a:prstGeom>
+          <a:noFill/>
+        </p:spPr>
+        <p:txBody>
+          <a:bodyPr wrap="none" rtlCol="0">
+            <a:spAutoFit/>
+          </a:bodyPr>
+          <a:lstStyle/>
+          <a:p>
+            <a:r>
+              <a:rPr lang="en-US" sz="1400" dirty="0" smtClean="0"/>
+              <a:t>Get </a:t>
+            </a:r>
+          </a:p>
+          <a:p>
+            <a:r>
+              <a:rPr lang="en-US" sz="1400" dirty="0" smtClean="0"/>
+              <a:t>exercise </a:t>
+            </a:r>
+          </a:p>
+          <a:p>
+            <a:r>
+              <a:rPr lang="en-US" sz="1400" dirty="0" smtClean="0"/>
+              <a:t>Response </a:t>
+            </a:r>
+            <a:endParaRPr lang="en-US" dirty="0"/>
+          </a:p>
+        </p:txBody>
+      </p:sp>
+      <p:sp>
+        <p:nvSpPr>
+          <p:cNvPr id="213" name="TextBox 212"/>
+          <p:cNvSpPr txBox="1"/>
+          <p:nvPr/>
+        </p:nvSpPr>
+        <p:spPr>
+          <a:xfrm>
+            <a:off x="6477000" y="3581400"/>
+            <a:ext cx="893834" cy="523220"/>
+          </a:xfrm>
+          <a:prstGeom prst="rect">
+            <a:avLst/>
+          </a:prstGeom>
+          <a:noFill/>
+        </p:spPr>
+        <p:txBody>
+          <a:bodyPr wrap="none" rtlCol="0">
+            <a:spAutoFit/>
+          </a:bodyPr>
+          <a:lstStyle/>
+          <a:p>
+            <a:r>
+              <a:rPr lang="en-US" sz="1400" dirty="0" smtClean="0"/>
+              <a:t>Request</a:t>
+            </a:r>
+          </a:p>
+          <a:p>
+            <a:r>
+              <a:rPr lang="en-US" sz="1400" dirty="0" smtClean="0"/>
+              <a:t>Resource </a:t>
+            </a:r>
+          </a:p>
+        </p:txBody>
+      </p:sp>
+      <p:sp>
+        <p:nvSpPr>
+          <p:cNvPr id="214" name="TextBox 213"/>
+          <p:cNvSpPr txBox="1"/>
+          <p:nvPr/>
+        </p:nvSpPr>
+        <p:spPr>
+          <a:xfrm>
+            <a:off x="5638800" y="3962400"/>
+            <a:ext cx="893834" cy="523220"/>
+          </a:xfrm>
+          <a:prstGeom prst="rect">
+            <a:avLst/>
+          </a:prstGeom>
+          <a:noFill/>
+        </p:spPr>
+        <p:txBody>
+          <a:bodyPr wrap="none" rtlCol="0">
+            <a:spAutoFit/>
+          </a:bodyPr>
+          <a:lstStyle/>
+          <a:p>
+            <a:r>
+              <a:rPr lang="en-US" sz="1400" dirty="0" smtClean="0"/>
+              <a:t>System </a:t>
+            </a:r>
+          </a:p>
+          <a:p>
+            <a:r>
+              <a:rPr lang="en-US" sz="1400" dirty="0" smtClean="0"/>
+              <a:t>Response</a:t>
+            </a:r>
+          </a:p>
+        </p:txBody>
+      </p:sp>
+      <p:sp>
+        <p:nvSpPr>
+          <p:cNvPr id="215" name="TextBox 214"/>
+          <p:cNvSpPr txBox="1"/>
+          <p:nvPr/>
+        </p:nvSpPr>
+        <p:spPr>
+          <a:xfrm>
+            <a:off x="5486400" y="2133600"/>
+            <a:ext cx="825034" cy="523220"/>
+          </a:xfrm>
+          <a:prstGeom prst="rect">
+            <a:avLst/>
+          </a:prstGeom>
+          <a:noFill/>
+        </p:spPr>
+        <p:txBody>
+          <a:bodyPr wrap="none" rtlCol="0">
+            <a:spAutoFit/>
+          </a:bodyPr>
+          <a:lstStyle/>
+          <a:p>
+            <a:r>
+              <a:rPr lang="en-US" sz="1400" dirty="0" smtClean="0"/>
+              <a:t>Ask for</a:t>
+            </a:r>
+          </a:p>
+          <a:p>
+            <a:r>
+              <a:rPr lang="en-US" sz="1400" dirty="0" smtClean="0"/>
+              <a:t>Payment</a:t>
+            </a:r>
+          </a:p>
+        </p:txBody>
+      </p:sp>
+      <p:sp>
+        <p:nvSpPr>
+          <p:cNvPr id="216" name="TextBox 215"/>
+          <p:cNvSpPr txBox="1"/>
+          <p:nvPr/>
+        </p:nvSpPr>
+        <p:spPr>
+          <a:xfrm>
+            <a:off x="6553200" y="2514600"/>
+            <a:ext cx="825034" cy="738664"/>
+          </a:xfrm>
+          <a:prstGeom prst="rect">
+            <a:avLst/>
+          </a:prstGeom>
+          <a:noFill/>
+        </p:spPr>
+        <p:txBody>
+          <a:bodyPr wrap="none" rtlCol="0">
+            <a:spAutoFit/>
+          </a:bodyPr>
+          <a:lstStyle/>
+          <a:p>
+            <a:r>
+              <a:rPr lang="en-US" sz="1400" dirty="0" smtClean="0"/>
+              <a:t>Get </a:t>
+            </a:r>
+          </a:p>
+          <a:p>
+            <a:r>
+              <a:rPr lang="en-US" sz="1400" dirty="0" smtClean="0"/>
+              <a:t>Payment</a:t>
+            </a:r>
+          </a:p>
+          <a:p>
+            <a:r>
+              <a:rPr lang="en-US" sz="1400" dirty="0" smtClean="0"/>
+              <a:t>notice</a:t>
+            </a:r>
+          </a:p>
+        </p:txBody>
+      </p:sp>
+      <p:sp>
+        <p:nvSpPr>
+          <p:cNvPr id="220" name="TextBox 219"/>
+          <p:cNvSpPr txBox="1"/>
+          <p:nvPr/>
+        </p:nvSpPr>
+        <p:spPr>
+          <a:xfrm>
+            <a:off x="3048000" y="1905000"/>
+            <a:ext cx="1224438" cy="307777"/>
+          </a:xfrm>
+          <a:prstGeom prst="rect">
+            <a:avLst/>
+          </a:prstGeom>
+          <a:noFill/>
+        </p:spPr>
+        <p:txBody>
+          <a:bodyPr wrap="none" rtlCol="0">
+            <a:spAutoFit/>
+          </a:bodyPr>
+          <a:lstStyle/>
+          <a:p>
+            <a:r>
+              <a:rPr lang="en-US" sz="1400" dirty="0" smtClean="0"/>
+              <a:t>Ask for Lesson</a:t>
+            </a:r>
+            <a:endParaRPr lang="en-US" dirty="0"/>
+          </a:p>
+        </p:txBody>
+      </p:sp>
+      <p:sp>
+        <p:nvSpPr>
+          <p:cNvPr id="221" name="TextBox 220"/>
+          <p:cNvSpPr txBox="1"/>
+          <p:nvPr/>
+        </p:nvSpPr>
+        <p:spPr>
+          <a:xfrm>
+            <a:off x="2971800" y="3429000"/>
+            <a:ext cx="983603" cy="307777"/>
+          </a:xfrm>
+          <a:prstGeom prst="rect">
+            <a:avLst/>
+          </a:prstGeom>
+          <a:noFill/>
+        </p:spPr>
+        <p:txBody>
+          <a:bodyPr wrap="none" rtlCol="0">
+            <a:spAutoFit/>
+          </a:bodyPr>
+          <a:lstStyle/>
+          <a:p>
+            <a:r>
+              <a:rPr lang="en-US" sz="1400" dirty="0" smtClean="0"/>
+              <a:t>Get Lesson</a:t>
+            </a:r>
+            <a:endParaRPr lang="en-US" dirty="0"/>
+          </a:p>
+        </p:txBody>
+      </p:sp>
+      <p:sp>
+        <p:nvSpPr>
+          <p:cNvPr id="227" name="TextBox 226"/>
+          <p:cNvSpPr txBox="1"/>
+          <p:nvPr/>
+        </p:nvSpPr>
+        <p:spPr>
+          <a:xfrm rot="16200000">
+            <a:off x="3996100" y="2099900"/>
+            <a:ext cx="1065420" cy="523220"/>
+          </a:xfrm>
+          <a:prstGeom prst="rect">
+            <a:avLst/>
+          </a:prstGeom>
+          <a:noFill/>
+        </p:spPr>
+        <p:txBody>
+          <a:bodyPr wrap="none" rtlCol="0">
+            <a:spAutoFit/>
+          </a:bodyPr>
+          <a:lstStyle/>
+          <a:p>
+            <a:r>
+              <a:rPr lang="en-US" sz="1400" dirty="0" smtClean="0"/>
+              <a:t>Request for </a:t>
+            </a:r>
+          </a:p>
+          <a:p>
+            <a:r>
+              <a:rPr lang="en-US" sz="1400" dirty="0" smtClean="0"/>
+              <a:t>participant  </a:t>
+            </a:r>
+          </a:p>
+        </p:txBody>
+      </p:sp>
+      <p:sp>
+        <p:nvSpPr>
+          <p:cNvPr id="229" name="TextBox 228"/>
+          <p:cNvSpPr txBox="1"/>
+          <p:nvPr/>
+        </p:nvSpPr>
+        <p:spPr>
+          <a:xfrm rot="16200000">
+            <a:off x="4752753" y="2105247"/>
+            <a:ext cx="923714" cy="523220"/>
+          </a:xfrm>
+          <a:prstGeom prst="rect">
+            <a:avLst/>
+          </a:prstGeom>
+          <a:noFill/>
+        </p:spPr>
+        <p:txBody>
+          <a:bodyPr wrap="none" rtlCol="0">
+            <a:spAutoFit/>
+          </a:bodyPr>
+          <a:lstStyle/>
+          <a:p>
+            <a:r>
+              <a:rPr lang="en-US" sz="1400" dirty="0" smtClean="0"/>
+              <a:t>Response </a:t>
+            </a:r>
+          </a:p>
+          <a:p>
+            <a:r>
+              <a:rPr lang="en-US" sz="1400" dirty="0" smtClean="0"/>
+              <a:t>request </a:t>
+            </a:r>
           </a:p>
         </p:txBody>
       </p:sp>

</xml_diff>

<commit_message>
one 1 level dfd added
</commit_message>
<xml_diff>
--- a/report/Child education Diagrams.pptx
+++ b/report/Child education Diagrams.pptx
@@ -7,6 +7,7 @@
   <p:sldIdLst>
     <p:sldId id="256" r:id="rId2"/>
     <p:sldId id="257" r:id="rId3"/>
+    <p:sldId id="259" r:id="rId4"/>
   </p:sldIdLst>
   <p:sldSz cx="9144000" cy="6858000" type="screen4x3"/>
   <p:notesSz cx="6858000" cy="9144000"/>
@@ -7881,6 +7882,1896 @@
 </p:sld>
 </file>
 
+<file path=ppt/slides/slide3.xml><?xml version="1.0" encoding="utf-8"?>
+<p:sld xmlns:a="http://schemas.openxmlformats.org/drawingml/2006/main" xmlns:r="http://schemas.openxmlformats.org/officeDocument/2006/relationships" xmlns:p="http://schemas.openxmlformats.org/presentationml/2006/main">
+  <p:cSld>
+    <p:spTree>
+      <p:nvGrpSpPr>
+        <p:cNvPr id="1" name=""/>
+        <p:cNvGrpSpPr/>
+        <p:nvPr/>
+      </p:nvGrpSpPr>
+      <p:grpSpPr>
+        <a:xfrm>
+          <a:off x="0" y="0"/>
+          <a:ext cx="0" cy="0"/>
+          <a:chOff x="0" y="0"/>
+          <a:chExt cx="0" cy="0"/>
+        </a:xfrm>
+      </p:grpSpPr>
+      <p:grpSp>
+        <p:nvGrpSpPr>
+          <p:cNvPr id="3" name="Group 14"/>
+          <p:cNvGrpSpPr/>
+          <p:nvPr/>
+        </p:nvGrpSpPr>
+        <p:grpSpPr>
+          <a:xfrm>
+            <a:off x="6324600" y="4191000"/>
+            <a:ext cx="2438400" cy="1219200"/>
+            <a:chOff x="3962400" y="3505200"/>
+            <a:chExt cx="2438400" cy="1219200"/>
+          </a:xfrm>
+        </p:grpSpPr>
+        <p:sp>
+          <p:nvSpPr>
+            <p:cNvPr id="2" name="Oval 1"/>
+            <p:cNvSpPr/>
+            <p:nvPr/>
+          </p:nvSpPr>
+          <p:spPr>
+            <a:xfrm>
+              <a:off x="3962400" y="3505200"/>
+              <a:ext cx="1828800" cy="1219200"/>
+            </a:xfrm>
+            <a:prstGeom prst="ellipse">
+              <a:avLst/>
+            </a:prstGeom>
+            <a:noFill/>
+            <a:ln>
+              <a:solidFill>
+                <a:schemeClr val="tx1"/>
+              </a:solidFill>
+            </a:ln>
+          </p:spPr>
+          <p:style>
+            <a:lnRef idx="2">
+              <a:schemeClr val="accent1">
+                <a:shade val="50000"/>
+              </a:schemeClr>
+            </a:lnRef>
+            <a:fillRef idx="1">
+              <a:schemeClr val="accent1"/>
+            </a:fillRef>
+            <a:effectRef idx="0">
+              <a:schemeClr val="accent1"/>
+            </a:effectRef>
+            <a:fontRef idx="minor">
+              <a:schemeClr val="lt1"/>
+            </a:fontRef>
+          </p:style>
+          <p:txBody>
+            <a:bodyPr rtlCol="0" anchor="ctr"/>
+            <a:lstStyle/>
+            <a:p>
+              <a:pPr algn="ctr"/>
+              <a:endParaRPr lang="en-US"/>
+            </a:p>
+          </p:txBody>
+        </p:sp>
+        <p:sp>
+          <p:nvSpPr>
+            <p:cNvPr id="4" name="Rectangle 3"/>
+            <p:cNvSpPr/>
+            <p:nvPr/>
+          </p:nvSpPr>
+          <p:spPr>
+            <a:xfrm>
+              <a:off x="4572000" y="3886200"/>
+              <a:ext cx="1828800" cy="738664"/>
+            </a:xfrm>
+            <a:prstGeom prst="rect">
+              <a:avLst/>
+            </a:prstGeom>
+          </p:spPr>
+          <p:txBody>
+            <a:bodyPr wrap="square">
+              <a:spAutoFit/>
+            </a:bodyPr>
+            <a:lstStyle/>
+            <a:p>
+              <a:r>
+                <a:rPr lang="en-US" sz="1400" dirty="0" smtClean="0"/>
+                <a:t>Child </a:t>
+              </a:r>
+            </a:p>
+            <a:p>
+              <a:r>
+                <a:rPr lang="en-US" sz="1400" dirty="0" smtClean="0"/>
+                <a:t>Education </a:t>
+              </a:r>
+            </a:p>
+            <a:p>
+              <a:r>
+                <a:rPr lang="en-US" sz="1400" dirty="0" smtClean="0"/>
+                <a:t>System</a:t>
+              </a:r>
+              <a:endParaRPr lang="en-US" sz="1400" dirty="0"/>
+            </a:p>
+          </p:txBody>
+        </p:sp>
+        <p:sp>
+          <p:nvSpPr>
+            <p:cNvPr id="5" name="TextBox 4"/>
+            <p:cNvSpPr txBox="1"/>
+            <p:nvPr/>
+          </p:nvSpPr>
+          <p:spPr>
+            <a:xfrm>
+              <a:off x="4724400" y="3581400"/>
+              <a:ext cx="301686" cy="369332"/>
+            </a:xfrm>
+            <a:prstGeom prst="rect">
+              <a:avLst/>
+            </a:prstGeom>
+            <a:noFill/>
+          </p:spPr>
+          <p:txBody>
+            <a:bodyPr wrap="none" rtlCol="0">
+              <a:spAutoFit/>
+            </a:bodyPr>
+            <a:lstStyle/>
+            <a:p>
+              <a:r>
+                <a:rPr lang="en-US" dirty="0" smtClean="0"/>
+                <a:t>1</a:t>
+              </a:r>
+              <a:endParaRPr lang="en-US" dirty="0"/>
+            </a:p>
+          </p:txBody>
+        </p:sp>
+      </p:grpSp>
+      <p:grpSp>
+        <p:nvGrpSpPr>
+          <p:cNvPr id="6" name="Group 5"/>
+          <p:cNvGrpSpPr/>
+          <p:nvPr/>
+        </p:nvGrpSpPr>
+        <p:grpSpPr>
+          <a:xfrm>
+            <a:off x="1828800" y="685800"/>
+            <a:ext cx="1066800" cy="381000"/>
+            <a:chOff x="4495800" y="914400"/>
+            <a:chExt cx="1066800" cy="381000"/>
+          </a:xfrm>
+        </p:grpSpPr>
+        <p:sp>
+          <p:nvSpPr>
+            <p:cNvPr id="7" name="TextBox 6"/>
+            <p:cNvSpPr txBox="1"/>
+            <p:nvPr/>
+          </p:nvSpPr>
+          <p:spPr>
+            <a:xfrm>
+              <a:off x="4724400" y="914400"/>
+              <a:ext cx="522900" cy="307777"/>
+            </a:xfrm>
+            <a:prstGeom prst="rect">
+              <a:avLst/>
+            </a:prstGeom>
+            <a:noFill/>
+          </p:spPr>
+          <p:txBody>
+            <a:bodyPr wrap="none" rtlCol="0">
+              <a:spAutoFit/>
+            </a:bodyPr>
+            <a:lstStyle/>
+            <a:p>
+              <a:r>
+                <a:rPr lang="en-US" sz="1400" dirty="0" smtClean="0"/>
+                <a:t>User</a:t>
+              </a:r>
+              <a:endParaRPr lang="en-US" sz="1400" dirty="0"/>
+            </a:p>
+          </p:txBody>
+        </p:sp>
+        <p:sp>
+          <p:nvSpPr>
+            <p:cNvPr id="8" name="Rectangle 7"/>
+            <p:cNvSpPr/>
+            <p:nvPr/>
+          </p:nvSpPr>
+          <p:spPr>
+            <a:xfrm>
+              <a:off x="4495800" y="914400"/>
+              <a:ext cx="1066800" cy="381000"/>
+            </a:xfrm>
+            <a:prstGeom prst="rect">
+              <a:avLst/>
+            </a:prstGeom>
+            <a:noFill/>
+            <a:ln>
+              <a:solidFill>
+                <a:schemeClr val="tx1"/>
+              </a:solidFill>
+            </a:ln>
+          </p:spPr>
+          <p:style>
+            <a:lnRef idx="2">
+              <a:schemeClr val="accent1">
+                <a:shade val="50000"/>
+              </a:schemeClr>
+            </a:lnRef>
+            <a:fillRef idx="1">
+              <a:schemeClr val="accent1"/>
+            </a:fillRef>
+            <a:effectRef idx="0">
+              <a:schemeClr val="accent1"/>
+            </a:effectRef>
+            <a:fontRef idx="minor">
+              <a:schemeClr val="lt1"/>
+            </a:fontRef>
+          </p:style>
+          <p:txBody>
+            <a:bodyPr rtlCol="0" anchor="ctr"/>
+            <a:lstStyle/>
+            <a:p>
+              <a:pPr algn="ctr"/>
+              <a:endParaRPr lang="en-US"/>
+            </a:p>
+          </p:txBody>
+        </p:sp>
+      </p:grpSp>
+      <p:grpSp>
+        <p:nvGrpSpPr>
+          <p:cNvPr id="10" name="Group 9"/>
+          <p:cNvGrpSpPr/>
+          <p:nvPr/>
+        </p:nvGrpSpPr>
+        <p:grpSpPr>
+          <a:xfrm>
+            <a:off x="3276600" y="3581400"/>
+            <a:ext cx="1676400" cy="457200"/>
+            <a:chOff x="304800" y="1676400"/>
+            <a:chExt cx="1676400" cy="457200"/>
+          </a:xfrm>
+        </p:grpSpPr>
+        <p:sp>
+          <p:nvSpPr>
+            <p:cNvPr id="11" name="Rectangle 10"/>
+            <p:cNvSpPr/>
+            <p:nvPr/>
+          </p:nvSpPr>
+          <p:spPr>
+            <a:xfrm>
+              <a:off x="304800" y="1676400"/>
+              <a:ext cx="1676400" cy="457200"/>
+            </a:xfrm>
+            <a:prstGeom prst="rect">
+              <a:avLst/>
+            </a:prstGeom>
+            <a:noFill/>
+            <a:ln>
+              <a:solidFill>
+                <a:schemeClr val="tx1"/>
+              </a:solidFill>
+            </a:ln>
+          </p:spPr>
+          <p:style>
+            <a:lnRef idx="2">
+              <a:schemeClr val="accent1">
+                <a:shade val="50000"/>
+              </a:schemeClr>
+            </a:lnRef>
+            <a:fillRef idx="1">
+              <a:schemeClr val="accent1"/>
+            </a:fillRef>
+            <a:effectRef idx="0">
+              <a:schemeClr val="accent1"/>
+            </a:effectRef>
+            <a:fontRef idx="minor">
+              <a:schemeClr val="lt1"/>
+            </a:fontRef>
+          </p:style>
+          <p:txBody>
+            <a:bodyPr rtlCol="0" anchor="ctr"/>
+            <a:lstStyle/>
+            <a:p>
+              <a:pPr algn="ctr"/>
+              <a:endParaRPr lang="en-US"/>
+            </a:p>
+          </p:txBody>
+        </p:sp>
+        <p:sp>
+          <p:nvSpPr>
+            <p:cNvPr id="12" name="TextBox 11"/>
+            <p:cNvSpPr txBox="1"/>
+            <p:nvPr/>
+          </p:nvSpPr>
+          <p:spPr>
+            <a:xfrm>
+              <a:off x="762000" y="1752600"/>
+              <a:ext cx="1061573" cy="307777"/>
+            </a:xfrm>
+            <a:prstGeom prst="rect">
+              <a:avLst/>
+            </a:prstGeom>
+            <a:noFill/>
+          </p:spPr>
+          <p:txBody>
+            <a:bodyPr wrap="none" rtlCol="0">
+              <a:spAutoFit/>
+            </a:bodyPr>
+            <a:lstStyle/>
+            <a:p>
+              <a:r>
+                <a:rPr lang="en-US" sz="1400" dirty="0" smtClean="0"/>
+                <a:t>User Details</a:t>
+              </a:r>
+              <a:endParaRPr lang="en-US" sz="1400" dirty="0"/>
+            </a:p>
+          </p:txBody>
+        </p:sp>
+        <p:cxnSp>
+          <p:nvCxnSpPr>
+            <p:cNvPr id="13" name="Straight Connector 12"/>
+            <p:cNvCxnSpPr/>
+            <p:nvPr/>
+          </p:nvCxnSpPr>
+          <p:spPr>
+            <a:xfrm rot="5400000">
+              <a:off x="457994" y="1904206"/>
+              <a:ext cx="456406" cy="794"/>
+            </a:xfrm>
+            <a:prstGeom prst="line">
+              <a:avLst/>
+            </a:prstGeom>
+            <a:ln>
+              <a:solidFill>
+                <a:schemeClr val="tx1"/>
+              </a:solidFill>
+            </a:ln>
+          </p:spPr>
+          <p:style>
+            <a:lnRef idx="1">
+              <a:schemeClr val="accent1"/>
+            </a:lnRef>
+            <a:fillRef idx="0">
+              <a:schemeClr val="accent1"/>
+            </a:fillRef>
+            <a:effectRef idx="0">
+              <a:schemeClr val="accent1"/>
+            </a:effectRef>
+            <a:fontRef idx="minor">
+              <a:schemeClr val="tx1"/>
+            </a:fontRef>
+          </p:style>
+        </p:cxnSp>
+        <p:sp>
+          <p:nvSpPr>
+            <p:cNvPr id="14" name="TextBox 13"/>
+            <p:cNvSpPr txBox="1"/>
+            <p:nvPr/>
+          </p:nvSpPr>
+          <p:spPr>
+            <a:xfrm>
+              <a:off x="304800" y="1752600"/>
+              <a:ext cx="386644" cy="307777"/>
+            </a:xfrm>
+            <a:prstGeom prst="rect">
+              <a:avLst/>
+            </a:prstGeom>
+            <a:noFill/>
+          </p:spPr>
+          <p:txBody>
+            <a:bodyPr wrap="none" rtlCol="0">
+              <a:spAutoFit/>
+            </a:bodyPr>
+            <a:lstStyle/>
+            <a:p>
+              <a:r>
+                <a:rPr lang="en-US" sz="1400" dirty="0" smtClean="0"/>
+                <a:t>D1</a:t>
+              </a:r>
+              <a:endParaRPr lang="en-US" sz="1400" dirty="0"/>
+            </a:p>
+          </p:txBody>
+        </p:sp>
+      </p:grpSp>
+      <p:grpSp>
+        <p:nvGrpSpPr>
+          <p:cNvPr id="15" name="Group 16"/>
+          <p:cNvGrpSpPr/>
+          <p:nvPr/>
+        </p:nvGrpSpPr>
+        <p:grpSpPr>
+          <a:xfrm>
+            <a:off x="1828800" y="4572000"/>
+            <a:ext cx="990600" cy="838200"/>
+            <a:chOff x="1219200" y="5029200"/>
+            <a:chExt cx="990600" cy="838200"/>
+          </a:xfrm>
+        </p:grpSpPr>
+        <p:sp>
+          <p:nvSpPr>
+            <p:cNvPr id="9" name="Oval 31"/>
+            <p:cNvSpPr>
+              <a:spLocks noChangeArrowheads="1"/>
+            </p:cNvSpPr>
+            <p:nvPr/>
+          </p:nvSpPr>
+          <p:spPr bwMode="auto">
+            <a:xfrm>
+              <a:off x="1219200" y="5029200"/>
+              <a:ext cx="990600" cy="838200"/>
+            </a:xfrm>
+            <a:prstGeom prst="ellipse">
+              <a:avLst/>
+            </a:prstGeom>
+            <a:noFill/>
+            <a:ln w="9525">
+              <a:solidFill>
+                <a:schemeClr val="tx1"/>
+              </a:solidFill>
+              <a:round/>
+              <a:headEnd/>
+              <a:tailEnd/>
+            </a:ln>
+            <a:effectLst/>
+          </p:spPr>
+          <p:txBody>
+            <a:bodyPr wrap="none" anchor="ctr"/>
+            <a:lstStyle/>
+            <a:p>
+              <a:pPr algn="ctr"/>
+              <a:endParaRPr lang="en-US" sz="1400" dirty="0" smtClean="0"/>
+            </a:p>
+            <a:p>
+              <a:pPr algn="ctr"/>
+              <a:r>
+                <a:rPr lang="en-US" sz="1400" dirty="0" smtClean="0"/>
+                <a:t>Free User</a:t>
+              </a:r>
+              <a:endParaRPr lang="en-US" sz="1400" dirty="0" smtClean="0"/>
+            </a:p>
+          </p:txBody>
+        </p:sp>
+        <p:sp>
+          <p:nvSpPr>
+            <p:cNvPr id="16" name="TextBox 15"/>
+            <p:cNvSpPr txBox="1"/>
+            <p:nvPr/>
+          </p:nvSpPr>
+          <p:spPr>
+            <a:xfrm>
+              <a:off x="1447800" y="5105400"/>
+              <a:ext cx="476412" cy="369332"/>
+            </a:xfrm>
+            <a:prstGeom prst="rect">
+              <a:avLst/>
+            </a:prstGeom>
+            <a:noFill/>
+          </p:spPr>
+          <p:txBody>
+            <a:bodyPr wrap="none" rtlCol="0">
+              <a:spAutoFit/>
+            </a:bodyPr>
+            <a:lstStyle/>
+            <a:p>
+              <a:r>
+                <a:rPr lang="en-US" dirty="0" smtClean="0"/>
+                <a:t>2.3</a:t>
+              </a:r>
+              <a:endParaRPr lang="en-US" dirty="0"/>
+            </a:p>
+          </p:txBody>
+        </p:sp>
+      </p:grpSp>
+      <p:grpSp>
+        <p:nvGrpSpPr>
+          <p:cNvPr id="17" name="Group 17"/>
+          <p:cNvGrpSpPr/>
+          <p:nvPr/>
+        </p:nvGrpSpPr>
+        <p:grpSpPr>
+          <a:xfrm>
+            <a:off x="3962400" y="1981200"/>
+            <a:ext cx="990600" cy="838200"/>
+            <a:chOff x="1219200" y="5029200"/>
+            <a:chExt cx="990600" cy="838200"/>
+          </a:xfrm>
+        </p:grpSpPr>
+        <p:sp>
+          <p:nvSpPr>
+            <p:cNvPr id="19" name="Oval 31"/>
+            <p:cNvSpPr>
+              <a:spLocks noChangeArrowheads="1"/>
+            </p:cNvSpPr>
+            <p:nvPr/>
+          </p:nvSpPr>
+          <p:spPr bwMode="auto">
+            <a:xfrm>
+              <a:off x="1219200" y="5029200"/>
+              <a:ext cx="990600" cy="838200"/>
+            </a:xfrm>
+            <a:prstGeom prst="ellipse">
+              <a:avLst/>
+            </a:prstGeom>
+            <a:noFill/>
+            <a:ln w="9525">
+              <a:solidFill>
+                <a:schemeClr val="tx1"/>
+              </a:solidFill>
+              <a:round/>
+              <a:headEnd/>
+              <a:tailEnd/>
+            </a:ln>
+            <a:effectLst/>
+          </p:spPr>
+          <p:txBody>
+            <a:bodyPr wrap="none" anchor="ctr"/>
+            <a:lstStyle/>
+            <a:p>
+              <a:pPr algn="ctr"/>
+              <a:endParaRPr lang="en-US" sz="1400" dirty="0" smtClean="0"/>
+            </a:p>
+            <a:p>
+              <a:pPr algn="ctr"/>
+              <a:r>
+                <a:rPr lang="en-US" sz="1400" dirty="0" smtClean="0"/>
+                <a:t>Apply</a:t>
+              </a:r>
+            </a:p>
+            <a:p>
+              <a:pPr algn="ctr"/>
+              <a:r>
+                <a:rPr lang="en-US" sz="1400" dirty="0" smtClean="0"/>
+                <a:t>request</a:t>
+              </a:r>
+              <a:endParaRPr lang="en-US" sz="1400" dirty="0" smtClean="0"/>
+            </a:p>
+          </p:txBody>
+        </p:sp>
+        <p:sp>
+          <p:nvSpPr>
+            <p:cNvPr id="20" name="TextBox 19"/>
+            <p:cNvSpPr txBox="1"/>
+            <p:nvPr/>
+          </p:nvSpPr>
+          <p:spPr>
+            <a:xfrm>
+              <a:off x="1447800" y="5029200"/>
+              <a:ext cx="476412" cy="369332"/>
+            </a:xfrm>
+            <a:prstGeom prst="rect">
+              <a:avLst/>
+            </a:prstGeom>
+            <a:noFill/>
+          </p:spPr>
+          <p:txBody>
+            <a:bodyPr wrap="none" rtlCol="0">
+              <a:spAutoFit/>
+            </a:bodyPr>
+            <a:lstStyle/>
+            <a:p>
+              <a:r>
+                <a:rPr lang="en-US" dirty="0" smtClean="0"/>
+                <a:t>2.1</a:t>
+              </a:r>
+              <a:endParaRPr lang="en-US" dirty="0"/>
+            </a:p>
+          </p:txBody>
+        </p:sp>
+      </p:grpSp>
+      <p:grpSp>
+        <p:nvGrpSpPr>
+          <p:cNvPr id="18" name="Group 20"/>
+          <p:cNvGrpSpPr/>
+          <p:nvPr/>
+        </p:nvGrpSpPr>
+        <p:grpSpPr>
+          <a:xfrm>
+            <a:off x="6553200" y="1981200"/>
+            <a:ext cx="990600" cy="838200"/>
+            <a:chOff x="1219200" y="5029200"/>
+            <a:chExt cx="990600" cy="838200"/>
+          </a:xfrm>
+        </p:grpSpPr>
+        <p:sp>
+          <p:nvSpPr>
+            <p:cNvPr id="22" name="Oval 31"/>
+            <p:cNvSpPr>
+              <a:spLocks noChangeArrowheads="1"/>
+            </p:cNvSpPr>
+            <p:nvPr/>
+          </p:nvSpPr>
+          <p:spPr bwMode="auto">
+            <a:xfrm>
+              <a:off x="1219200" y="5029200"/>
+              <a:ext cx="990600" cy="838200"/>
+            </a:xfrm>
+            <a:prstGeom prst="ellipse">
+              <a:avLst/>
+            </a:prstGeom>
+            <a:noFill/>
+            <a:ln w="9525">
+              <a:solidFill>
+                <a:schemeClr val="tx1"/>
+              </a:solidFill>
+              <a:round/>
+              <a:headEnd/>
+              <a:tailEnd/>
+            </a:ln>
+            <a:effectLst/>
+          </p:spPr>
+          <p:txBody>
+            <a:bodyPr wrap="none" anchor="ctr"/>
+            <a:lstStyle/>
+            <a:p>
+              <a:pPr algn="ctr"/>
+              <a:endParaRPr lang="en-US" sz="1400" dirty="0" smtClean="0"/>
+            </a:p>
+            <a:p>
+              <a:pPr algn="ctr"/>
+              <a:r>
+                <a:rPr lang="en-US" sz="1400" dirty="0" smtClean="0"/>
+                <a:t>Verify </a:t>
+              </a:r>
+              <a:endParaRPr lang="en-US" sz="1400" dirty="0" smtClean="0"/>
+            </a:p>
+            <a:p>
+              <a:pPr algn="ctr"/>
+              <a:r>
+                <a:rPr lang="en-US" sz="1400" dirty="0" smtClean="0"/>
+                <a:t>request</a:t>
+              </a:r>
+              <a:endParaRPr lang="en-US" sz="1400" dirty="0" smtClean="0"/>
+            </a:p>
+          </p:txBody>
+        </p:sp>
+        <p:sp>
+          <p:nvSpPr>
+            <p:cNvPr id="23" name="TextBox 22"/>
+            <p:cNvSpPr txBox="1"/>
+            <p:nvPr/>
+          </p:nvSpPr>
+          <p:spPr>
+            <a:xfrm>
+              <a:off x="1447800" y="5029200"/>
+              <a:ext cx="476412" cy="369332"/>
+            </a:xfrm>
+            <a:prstGeom prst="rect">
+              <a:avLst/>
+            </a:prstGeom>
+            <a:noFill/>
+          </p:spPr>
+          <p:txBody>
+            <a:bodyPr wrap="none" rtlCol="0">
+              <a:spAutoFit/>
+            </a:bodyPr>
+            <a:lstStyle/>
+            <a:p>
+              <a:r>
+                <a:rPr lang="en-US" dirty="0" smtClean="0"/>
+                <a:t>2.2</a:t>
+              </a:r>
+              <a:endParaRPr lang="en-US" dirty="0"/>
+            </a:p>
+          </p:txBody>
+        </p:sp>
+      </p:grpSp>
+      <p:sp>
+        <p:nvSpPr>
+          <p:cNvPr id="26" name="TextBox 25"/>
+          <p:cNvSpPr txBox="1"/>
+          <p:nvPr/>
+        </p:nvSpPr>
+        <p:spPr>
+          <a:xfrm>
+            <a:off x="2895600" y="838200"/>
+            <a:ext cx="1564083" cy="307777"/>
+          </a:xfrm>
+          <a:prstGeom prst="rect">
+            <a:avLst/>
+          </a:prstGeom>
+          <a:noFill/>
+        </p:spPr>
+        <p:txBody>
+          <a:bodyPr wrap="none" rtlCol="0">
+            <a:spAutoFit/>
+          </a:bodyPr>
+          <a:lstStyle/>
+          <a:p>
+            <a:r>
+              <a:rPr lang="en-US" sz="1400" dirty="0" smtClean="0"/>
+              <a:t>Apply for resource </a:t>
+            </a:r>
+            <a:endParaRPr lang="en-US" dirty="0"/>
+          </a:p>
+        </p:txBody>
+      </p:sp>
+      <p:cxnSp>
+        <p:nvCxnSpPr>
+          <p:cNvPr id="33" name="Shape 32"/>
+          <p:cNvCxnSpPr>
+            <a:stCxn id="8" idx="3"/>
+            <a:endCxn id="19" idx="0"/>
+          </p:cNvCxnSpPr>
+          <p:nvPr/>
+        </p:nvCxnSpPr>
+        <p:spPr>
+          <a:xfrm>
+            <a:off x="2895600" y="876300"/>
+            <a:ext cx="1562100" cy="1104900"/>
+          </a:xfrm>
+          <a:prstGeom prst="bentConnector2">
+            <a:avLst/>
+          </a:prstGeom>
+          <a:ln>
+            <a:solidFill>
+              <a:schemeClr val="tx1"/>
+            </a:solidFill>
+            <a:tailEnd type="arrow"/>
+          </a:ln>
+        </p:spPr>
+        <p:style>
+          <a:lnRef idx="1">
+            <a:schemeClr val="accent1"/>
+          </a:lnRef>
+          <a:fillRef idx="0">
+            <a:schemeClr val="accent1"/>
+          </a:fillRef>
+          <a:effectRef idx="0">
+            <a:schemeClr val="accent1"/>
+          </a:effectRef>
+          <a:fontRef idx="minor">
+            <a:schemeClr val="tx1"/>
+          </a:fontRef>
+        </p:style>
+      </p:cxnSp>
+      <p:cxnSp>
+        <p:nvCxnSpPr>
+          <p:cNvPr id="35" name="Elbow Connector 34"/>
+          <p:cNvCxnSpPr>
+            <a:stCxn id="19" idx="7"/>
+            <a:endCxn id="22" idx="1"/>
+          </p:cNvCxnSpPr>
+          <p:nvPr/>
+        </p:nvCxnSpPr>
+        <p:spPr>
+          <a:xfrm rot="5400000" flipH="1" flipV="1">
+            <a:off x="5753100" y="1158781"/>
+            <a:ext cx="1588" cy="1890340"/>
+          </a:xfrm>
+          <a:prstGeom prst="bentConnector3">
+            <a:avLst>
+              <a:gd name="adj1" fmla="val 22125378"/>
+            </a:avLst>
+          </a:prstGeom>
+          <a:ln>
+            <a:solidFill>
+              <a:schemeClr val="tx1"/>
+            </a:solidFill>
+            <a:tailEnd type="arrow"/>
+          </a:ln>
+        </p:spPr>
+        <p:style>
+          <a:lnRef idx="1">
+            <a:schemeClr val="accent1"/>
+          </a:lnRef>
+          <a:fillRef idx="0">
+            <a:schemeClr val="accent1"/>
+          </a:fillRef>
+          <a:effectRef idx="0">
+            <a:schemeClr val="accent1"/>
+          </a:effectRef>
+          <a:fontRef idx="minor">
+            <a:schemeClr val="tx1"/>
+          </a:fontRef>
+        </p:style>
+      </p:cxnSp>
+      <p:sp>
+        <p:nvSpPr>
+          <p:cNvPr id="36" name="TextBox 35"/>
+          <p:cNvSpPr txBox="1"/>
+          <p:nvPr/>
+        </p:nvSpPr>
+        <p:spPr>
+          <a:xfrm>
+            <a:off x="4953000" y="1447800"/>
+            <a:ext cx="1631216" cy="307777"/>
+          </a:xfrm>
+          <a:prstGeom prst="rect">
+            <a:avLst/>
+          </a:prstGeom>
+          <a:noFill/>
+        </p:spPr>
+        <p:txBody>
+          <a:bodyPr wrap="none" rtlCol="0">
+            <a:spAutoFit/>
+          </a:bodyPr>
+          <a:lstStyle/>
+          <a:p>
+            <a:r>
+              <a:rPr lang="en-US" sz="1400" dirty="0" smtClean="0"/>
+              <a:t>Resource info check</a:t>
+            </a:r>
+            <a:endParaRPr lang="en-US" dirty="0"/>
+          </a:p>
+        </p:txBody>
+      </p:sp>
+      <p:sp>
+        <p:nvSpPr>
+          <p:cNvPr id="39" name="TextBox 38"/>
+          <p:cNvSpPr txBox="1"/>
+          <p:nvPr/>
+        </p:nvSpPr>
+        <p:spPr>
+          <a:xfrm>
+            <a:off x="7391400" y="2971800"/>
+            <a:ext cx="1297150" cy="738664"/>
+          </a:xfrm>
+          <a:prstGeom prst="rect">
+            <a:avLst/>
+          </a:prstGeom>
+          <a:noFill/>
+        </p:spPr>
+        <p:txBody>
+          <a:bodyPr wrap="none" rtlCol="0">
+            <a:spAutoFit/>
+          </a:bodyPr>
+          <a:lstStyle/>
+          <a:p>
+            <a:r>
+              <a:rPr lang="en-US" sz="1400" dirty="0" smtClean="0"/>
+              <a:t>Use </a:t>
+            </a:r>
+          </a:p>
+          <a:p>
+            <a:r>
+              <a:rPr lang="en-US" sz="1400" dirty="0" smtClean="0"/>
+              <a:t>authentication </a:t>
+            </a:r>
+          </a:p>
+          <a:p>
+            <a:r>
+              <a:rPr lang="en-US" sz="1400" dirty="0" smtClean="0"/>
+              <a:t>info</a:t>
+            </a:r>
+            <a:endParaRPr lang="en-US" sz="1400" dirty="0"/>
+          </a:p>
+        </p:txBody>
+      </p:sp>
+      <p:cxnSp>
+        <p:nvCxnSpPr>
+          <p:cNvPr id="45" name="Straight Arrow Connector 44"/>
+          <p:cNvCxnSpPr>
+            <a:endCxn id="22" idx="5"/>
+          </p:cNvCxnSpPr>
+          <p:nvPr/>
+        </p:nvCxnSpPr>
+        <p:spPr>
+          <a:xfrm rot="5400000" flipH="1" flipV="1">
+            <a:off x="6647096" y="3440160"/>
+            <a:ext cx="1495145" cy="8124"/>
+          </a:xfrm>
+          <a:prstGeom prst="straightConnector1">
+            <a:avLst/>
+          </a:prstGeom>
+          <a:ln>
+            <a:solidFill>
+              <a:schemeClr val="tx1"/>
+            </a:solidFill>
+            <a:tailEnd type="arrow"/>
+          </a:ln>
+        </p:spPr>
+        <p:style>
+          <a:lnRef idx="1">
+            <a:schemeClr val="accent1"/>
+          </a:lnRef>
+          <a:fillRef idx="0">
+            <a:schemeClr val="accent1"/>
+          </a:fillRef>
+          <a:effectRef idx="0">
+            <a:schemeClr val="accent1"/>
+          </a:effectRef>
+          <a:fontRef idx="minor">
+            <a:schemeClr val="tx1"/>
+          </a:fontRef>
+        </p:style>
+      </p:cxnSp>
+      <p:cxnSp>
+        <p:nvCxnSpPr>
+          <p:cNvPr id="51" name="Straight Arrow Connector 50"/>
+          <p:cNvCxnSpPr>
+            <a:stCxn id="22" idx="3"/>
+          </p:cNvCxnSpPr>
+          <p:nvPr/>
+        </p:nvCxnSpPr>
+        <p:spPr>
+          <a:xfrm rot="16200000" flipH="1">
+            <a:off x="5916660" y="3478259"/>
+            <a:ext cx="1570553" cy="7332"/>
+          </a:xfrm>
+          <a:prstGeom prst="straightConnector1">
+            <a:avLst/>
+          </a:prstGeom>
+          <a:ln>
+            <a:solidFill>
+              <a:schemeClr val="tx1"/>
+            </a:solidFill>
+            <a:tailEnd type="arrow"/>
+          </a:ln>
+        </p:spPr>
+        <p:style>
+          <a:lnRef idx="1">
+            <a:schemeClr val="accent1"/>
+          </a:lnRef>
+          <a:fillRef idx="0">
+            <a:schemeClr val="accent1"/>
+          </a:fillRef>
+          <a:effectRef idx="0">
+            <a:schemeClr val="accent1"/>
+          </a:effectRef>
+          <a:fontRef idx="minor">
+            <a:schemeClr val="tx1"/>
+          </a:fontRef>
+        </p:style>
+      </p:cxnSp>
+      <p:sp>
+        <p:nvSpPr>
+          <p:cNvPr id="53" name="TextBox 52"/>
+          <p:cNvSpPr txBox="1"/>
+          <p:nvPr/>
+        </p:nvSpPr>
+        <p:spPr>
+          <a:xfrm>
+            <a:off x="6019800" y="3048000"/>
+            <a:ext cx="681597" cy="738664"/>
+          </a:xfrm>
+          <a:prstGeom prst="rect">
+            <a:avLst/>
+          </a:prstGeom>
+          <a:noFill/>
+        </p:spPr>
+        <p:txBody>
+          <a:bodyPr wrap="none" rtlCol="0">
+            <a:spAutoFit/>
+          </a:bodyPr>
+          <a:lstStyle/>
+          <a:p>
+            <a:r>
+              <a:rPr lang="en-US" sz="1400" dirty="0" smtClean="0"/>
+              <a:t>User </a:t>
+            </a:r>
+            <a:endParaRPr lang="en-US" sz="1400" dirty="0" smtClean="0"/>
+          </a:p>
+          <a:p>
+            <a:r>
+              <a:rPr lang="en-US" sz="1400" dirty="0" smtClean="0"/>
+              <a:t>Status </a:t>
+            </a:r>
+          </a:p>
+          <a:p>
+            <a:r>
+              <a:rPr lang="en-US" sz="1400" dirty="0" smtClean="0"/>
+              <a:t>Info</a:t>
+            </a:r>
+            <a:endParaRPr lang="en-US" sz="1400" dirty="0"/>
+          </a:p>
+        </p:txBody>
+      </p:sp>
+      <p:cxnSp>
+        <p:nvCxnSpPr>
+          <p:cNvPr id="55" name="Straight Arrow Connector 54"/>
+          <p:cNvCxnSpPr/>
+          <p:nvPr/>
+        </p:nvCxnSpPr>
+        <p:spPr>
+          <a:xfrm rot="5400000">
+            <a:off x="533400" y="2819400"/>
+            <a:ext cx="3505200" cy="1588"/>
+          </a:xfrm>
+          <a:prstGeom prst="straightConnector1">
+            <a:avLst/>
+          </a:prstGeom>
+          <a:ln>
+            <a:solidFill>
+              <a:schemeClr val="tx1"/>
+            </a:solidFill>
+            <a:tailEnd type="arrow"/>
+          </a:ln>
+        </p:spPr>
+        <p:style>
+          <a:lnRef idx="1">
+            <a:schemeClr val="accent1"/>
+          </a:lnRef>
+          <a:fillRef idx="0">
+            <a:schemeClr val="accent1"/>
+          </a:fillRef>
+          <a:effectRef idx="0">
+            <a:schemeClr val="accent1"/>
+          </a:effectRef>
+          <a:fontRef idx="minor">
+            <a:schemeClr val="tx1"/>
+          </a:fontRef>
+        </p:style>
+      </p:cxnSp>
+      <p:sp>
+        <p:nvSpPr>
+          <p:cNvPr id="75" name="TextBox 74"/>
+          <p:cNvSpPr txBox="1"/>
+          <p:nvPr/>
+        </p:nvSpPr>
+        <p:spPr>
+          <a:xfrm rot="16200000">
+            <a:off x="1569651" y="2271306"/>
+            <a:ext cx="1740476" cy="307777"/>
+          </a:xfrm>
+          <a:prstGeom prst="rect">
+            <a:avLst/>
+          </a:prstGeom>
+          <a:noFill/>
+        </p:spPr>
+        <p:txBody>
+          <a:bodyPr wrap="none" rtlCol="0">
+            <a:spAutoFit/>
+          </a:bodyPr>
+          <a:lstStyle/>
+          <a:p>
+            <a:r>
+              <a:rPr lang="en-US" sz="1400" dirty="0" smtClean="0"/>
+              <a:t>Add </a:t>
+            </a:r>
+            <a:r>
+              <a:rPr lang="en-US" sz="1400" dirty="0" smtClean="0"/>
+              <a:t>Free </a:t>
+            </a:r>
+            <a:r>
+              <a:rPr lang="en-US" sz="1400" dirty="0" smtClean="0"/>
+              <a:t>User </a:t>
+            </a:r>
+            <a:r>
+              <a:rPr lang="en-US" sz="1400" dirty="0" smtClean="0"/>
+              <a:t>details</a:t>
+            </a:r>
+            <a:endParaRPr lang="en-US" sz="1400" dirty="0"/>
+          </a:p>
+        </p:txBody>
+      </p:sp>
+      <p:cxnSp>
+        <p:nvCxnSpPr>
+          <p:cNvPr id="78" name="Shape 77"/>
+          <p:cNvCxnSpPr>
+            <a:stCxn id="9" idx="6"/>
+            <a:endCxn id="11" idx="2"/>
+          </p:cNvCxnSpPr>
+          <p:nvPr/>
+        </p:nvCxnSpPr>
+        <p:spPr>
+          <a:xfrm flipV="1">
+            <a:off x="2819400" y="4038600"/>
+            <a:ext cx="1295400" cy="952500"/>
+          </a:xfrm>
+          <a:prstGeom prst="bentConnector2">
+            <a:avLst/>
+          </a:prstGeom>
+          <a:ln>
+            <a:solidFill>
+              <a:schemeClr val="tx1"/>
+            </a:solidFill>
+            <a:tailEnd type="arrow"/>
+          </a:ln>
+        </p:spPr>
+        <p:style>
+          <a:lnRef idx="1">
+            <a:schemeClr val="accent1"/>
+          </a:lnRef>
+          <a:fillRef idx="0">
+            <a:schemeClr val="accent1"/>
+          </a:fillRef>
+          <a:effectRef idx="0">
+            <a:schemeClr val="accent1"/>
+          </a:effectRef>
+          <a:fontRef idx="minor">
+            <a:schemeClr val="tx1"/>
+          </a:fontRef>
+        </p:style>
+      </p:cxnSp>
+      <p:sp>
+        <p:nvSpPr>
+          <p:cNvPr id="79" name="TextBox 78"/>
+          <p:cNvSpPr txBox="1"/>
+          <p:nvPr/>
+        </p:nvSpPr>
+        <p:spPr>
+          <a:xfrm>
+            <a:off x="2895600" y="5029200"/>
+            <a:ext cx="1710661" cy="307777"/>
+          </a:xfrm>
+          <a:prstGeom prst="rect">
+            <a:avLst/>
+          </a:prstGeom>
+          <a:noFill/>
+        </p:spPr>
+        <p:txBody>
+          <a:bodyPr wrap="none" rtlCol="0">
+            <a:spAutoFit/>
+          </a:bodyPr>
+          <a:lstStyle/>
+          <a:p>
+            <a:r>
+              <a:rPr lang="en-US" sz="1400" dirty="0" smtClean="0"/>
+              <a:t>Get </a:t>
+            </a:r>
+            <a:r>
+              <a:rPr lang="en-US" sz="1400" dirty="0" smtClean="0"/>
+              <a:t>Free </a:t>
+            </a:r>
+            <a:r>
+              <a:rPr lang="en-US" sz="1400" dirty="0" smtClean="0"/>
+              <a:t>User </a:t>
+            </a:r>
+            <a:r>
+              <a:rPr lang="en-US" sz="1400" dirty="0" smtClean="0"/>
+              <a:t>details</a:t>
+            </a:r>
+            <a:endParaRPr lang="en-US" sz="1400" dirty="0"/>
+          </a:p>
+        </p:txBody>
+      </p:sp>
+      <p:sp>
+        <p:nvSpPr>
+          <p:cNvPr id="82" name="TextBox 81"/>
+          <p:cNvSpPr txBox="1"/>
+          <p:nvPr/>
+        </p:nvSpPr>
+        <p:spPr>
+          <a:xfrm rot="16200000">
+            <a:off x="1034566" y="2481973"/>
+            <a:ext cx="1439048" cy="307777"/>
+          </a:xfrm>
+          <a:prstGeom prst="rect">
+            <a:avLst/>
+          </a:prstGeom>
+          <a:noFill/>
+        </p:spPr>
+        <p:txBody>
+          <a:bodyPr wrap="none" rtlCol="0">
+            <a:spAutoFit/>
+          </a:bodyPr>
+          <a:lstStyle/>
+          <a:p>
+            <a:r>
+              <a:rPr lang="en-US" sz="1400" dirty="0" smtClean="0"/>
+              <a:t>Adding </a:t>
+            </a:r>
+            <a:r>
+              <a:rPr lang="en-US" sz="1400" dirty="0" smtClean="0"/>
+              <a:t>Free </a:t>
+            </a:r>
+            <a:r>
+              <a:rPr lang="en-US" sz="1400" dirty="0" smtClean="0"/>
+              <a:t>User</a:t>
+            </a:r>
+            <a:endParaRPr lang="en-US" sz="1400" dirty="0" smtClean="0"/>
+          </a:p>
+        </p:txBody>
+      </p:sp>
+      <p:cxnSp>
+        <p:nvCxnSpPr>
+          <p:cNvPr id="84" name="Elbow Connector 83"/>
+          <p:cNvCxnSpPr>
+            <a:stCxn id="9" idx="2"/>
+            <a:endCxn id="8" idx="1"/>
+          </p:cNvCxnSpPr>
+          <p:nvPr/>
+        </p:nvCxnSpPr>
+        <p:spPr>
+          <a:xfrm rot="10800000">
+            <a:off x="1828800" y="876300"/>
+            <a:ext cx="1588" cy="4114800"/>
+          </a:xfrm>
+          <a:prstGeom prst="bentConnector3">
+            <a:avLst>
+              <a:gd name="adj1" fmla="val 14395466"/>
+            </a:avLst>
+          </a:prstGeom>
+          <a:ln>
+            <a:solidFill>
+              <a:schemeClr val="tx1"/>
+            </a:solidFill>
+            <a:tailEnd type="arrow"/>
+          </a:ln>
+        </p:spPr>
+        <p:style>
+          <a:lnRef idx="1">
+            <a:schemeClr val="accent1"/>
+          </a:lnRef>
+          <a:fillRef idx="0">
+            <a:schemeClr val="accent1"/>
+          </a:fillRef>
+          <a:effectRef idx="0">
+            <a:schemeClr val="accent1"/>
+          </a:effectRef>
+          <a:fontRef idx="minor">
+            <a:schemeClr val="tx1"/>
+          </a:fontRef>
+        </p:style>
+      </p:cxnSp>
+      <p:cxnSp>
+        <p:nvCxnSpPr>
+          <p:cNvPr id="86" name="Shape 85"/>
+          <p:cNvCxnSpPr>
+            <a:stCxn id="19" idx="2"/>
+          </p:cNvCxnSpPr>
+          <p:nvPr/>
+        </p:nvCxnSpPr>
+        <p:spPr>
+          <a:xfrm rot="10800000">
+            <a:off x="2743200" y="1066800"/>
+            <a:ext cx="1219200" cy="1333500"/>
+          </a:xfrm>
+          <a:prstGeom prst="bentConnector2">
+            <a:avLst/>
+          </a:prstGeom>
+          <a:ln>
+            <a:solidFill>
+              <a:schemeClr val="tx1"/>
+            </a:solidFill>
+            <a:tailEnd type="arrow"/>
+          </a:ln>
+        </p:spPr>
+        <p:style>
+          <a:lnRef idx="1">
+            <a:schemeClr val="accent1"/>
+          </a:lnRef>
+          <a:fillRef idx="0">
+            <a:schemeClr val="accent1"/>
+          </a:fillRef>
+          <a:effectRef idx="0">
+            <a:schemeClr val="accent1"/>
+          </a:effectRef>
+          <a:fontRef idx="minor">
+            <a:schemeClr val="tx1"/>
+          </a:fontRef>
+        </p:style>
+      </p:cxnSp>
+      <p:sp>
+        <p:nvSpPr>
+          <p:cNvPr id="87" name="TextBox 86"/>
+          <p:cNvSpPr txBox="1"/>
+          <p:nvPr/>
+        </p:nvSpPr>
+        <p:spPr>
+          <a:xfrm>
+            <a:off x="2743200" y="2057400"/>
+            <a:ext cx="1235146" cy="307777"/>
+          </a:xfrm>
+          <a:prstGeom prst="rect">
+            <a:avLst/>
+          </a:prstGeom>
+          <a:noFill/>
+        </p:spPr>
+        <p:txBody>
+          <a:bodyPr wrap="none" rtlCol="0">
+            <a:spAutoFit/>
+          </a:bodyPr>
+          <a:lstStyle/>
+          <a:p>
+            <a:r>
+              <a:rPr lang="en-US" sz="1400" dirty="0" smtClean="0"/>
+              <a:t>Request result</a:t>
+            </a:r>
+            <a:endParaRPr lang="en-US" dirty="0"/>
+          </a:p>
+        </p:txBody>
+      </p:sp>
+      <p:cxnSp>
+        <p:nvCxnSpPr>
+          <p:cNvPr id="92" name="Elbow Connector 91"/>
+          <p:cNvCxnSpPr/>
+          <p:nvPr/>
+        </p:nvCxnSpPr>
+        <p:spPr>
+          <a:xfrm rot="16200000" flipV="1">
+            <a:off x="4095750" y="3181351"/>
+            <a:ext cx="762000" cy="38100"/>
+          </a:xfrm>
+          <a:prstGeom prst="bentConnector3">
+            <a:avLst>
+              <a:gd name="adj1" fmla="val 2558"/>
+            </a:avLst>
+          </a:prstGeom>
+          <a:ln>
+            <a:solidFill>
+              <a:schemeClr val="tx1"/>
+            </a:solidFill>
+            <a:tailEnd type="arrow"/>
+          </a:ln>
+        </p:spPr>
+        <p:style>
+          <a:lnRef idx="1">
+            <a:schemeClr val="accent1"/>
+          </a:lnRef>
+          <a:fillRef idx="0">
+            <a:schemeClr val="accent1"/>
+          </a:fillRef>
+          <a:effectRef idx="0">
+            <a:schemeClr val="accent1"/>
+          </a:effectRef>
+          <a:fontRef idx="minor">
+            <a:schemeClr val="tx1"/>
+          </a:fontRef>
+        </p:style>
+      </p:cxnSp>
+      <p:sp>
+        <p:nvSpPr>
+          <p:cNvPr id="98" name="TextBox 97"/>
+          <p:cNvSpPr txBox="1"/>
+          <p:nvPr/>
+        </p:nvSpPr>
+        <p:spPr>
+          <a:xfrm>
+            <a:off x="3352800" y="3048000"/>
+            <a:ext cx="1061573" cy="307777"/>
+          </a:xfrm>
+          <a:prstGeom prst="rect">
+            <a:avLst/>
+          </a:prstGeom>
+          <a:noFill/>
+        </p:spPr>
+        <p:txBody>
+          <a:bodyPr wrap="none" rtlCol="0">
+            <a:spAutoFit/>
+          </a:bodyPr>
+          <a:lstStyle/>
+          <a:p>
+            <a:r>
+              <a:rPr lang="en-US" sz="1400" dirty="0" smtClean="0"/>
+              <a:t>User Details</a:t>
+            </a:r>
+            <a:endParaRPr lang="en-US" sz="1400" dirty="0" smtClean="0"/>
+          </a:p>
+        </p:txBody>
+      </p:sp>
+      <p:grpSp>
+        <p:nvGrpSpPr>
+          <p:cNvPr id="21" name="Group 99"/>
+          <p:cNvGrpSpPr/>
+          <p:nvPr/>
+        </p:nvGrpSpPr>
+        <p:grpSpPr>
+          <a:xfrm>
+            <a:off x="838200" y="5334000"/>
+            <a:ext cx="1066800" cy="914400"/>
+            <a:chOff x="1219200" y="5105400"/>
+            <a:chExt cx="1066800" cy="914400"/>
+          </a:xfrm>
+        </p:grpSpPr>
+        <p:sp>
+          <p:nvSpPr>
+            <p:cNvPr id="101" name="Oval 31"/>
+            <p:cNvSpPr>
+              <a:spLocks noChangeArrowheads="1"/>
+            </p:cNvSpPr>
+            <p:nvPr/>
+          </p:nvSpPr>
+          <p:spPr bwMode="auto">
+            <a:xfrm>
+              <a:off x="1219200" y="5105400"/>
+              <a:ext cx="1066800" cy="914400"/>
+            </a:xfrm>
+            <a:prstGeom prst="ellipse">
+              <a:avLst/>
+            </a:prstGeom>
+            <a:noFill/>
+            <a:ln w="9525">
+              <a:solidFill>
+                <a:schemeClr val="tx1"/>
+              </a:solidFill>
+              <a:round/>
+              <a:headEnd/>
+              <a:tailEnd/>
+            </a:ln>
+            <a:effectLst/>
+          </p:spPr>
+          <p:txBody>
+            <a:bodyPr wrap="none" anchor="ctr"/>
+            <a:lstStyle/>
+            <a:p>
+              <a:pPr algn="ctr"/>
+              <a:endParaRPr lang="en-US" sz="1400" dirty="0" smtClean="0"/>
+            </a:p>
+            <a:p>
+              <a:pPr algn="ctr"/>
+              <a:r>
+                <a:rPr lang="en-US" sz="1400" dirty="0" smtClean="0"/>
+                <a:t> </a:t>
+              </a:r>
+              <a:r>
+                <a:rPr lang="en-US" sz="1400" dirty="0" smtClean="0"/>
+                <a:t>Paid User</a:t>
+              </a:r>
+              <a:endParaRPr lang="en-US" sz="1400" dirty="0" smtClean="0"/>
+            </a:p>
+          </p:txBody>
+        </p:sp>
+        <p:sp>
+          <p:nvSpPr>
+            <p:cNvPr id="102" name="TextBox 101"/>
+            <p:cNvSpPr txBox="1"/>
+            <p:nvPr/>
+          </p:nvSpPr>
+          <p:spPr>
+            <a:xfrm>
+              <a:off x="1524000" y="5257800"/>
+              <a:ext cx="476412" cy="369332"/>
+            </a:xfrm>
+            <a:prstGeom prst="rect">
+              <a:avLst/>
+            </a:prstGeom>
+            <a:noFill/>
+          </p:spPr>
+          <p:txBody>
+            <a:bodyPr wrap="none" rtlCol="0">
+              <a:spAutoFit/>
+            </a:bodyPr>
+            <a:lstStyle/>
+            <a:p>
+              <a:r>
+                <a:rPr lang="en-US" dirty="0" smtClean="0"/>
+                <a:t>2.4</a:t>
+              </a:r>
+              <a:endParaRPr lang="en-US" dirty="0"/>
+            </a:p>
+          </p:txBody>
+        </p:sp>
+      </p:grpSp>
+      <p:cxnSp>
+        <p:nvCxnSpPr>
+          <p:cNvPr id="104" name="Elbow Connector 103"/>
+          <p:cNvCxnSpPr>
+            <a:stCxn id="8" idx="0"/>
+            <a:endCxn id="101" idx="1"/>
+          </p:cNvCxnSpPr>
+          <p:nvPr/>
+        </p:nvCxnSpPr>
+        <p:spPr>
+          <a:xfrm rot="16200000" flipH="1" flipV="1">
+            <a:off x="-712741" y="2392969"/>
+            <a:ext cx="4782111" cy="1367771"/>
+          </a:xfrm>
+          <a:prstGeom prst="bentConnector3">
+            <a:avLst>
+              <a:gd name="adj1" fmla="val -4780"/>
+            </a:avLst>
+          </a:prstGeom>
+          <a:ln>
+            <a:solidFill>
+              <a:schemeClr val="tx1"/>
+            </a:solidFill>
+            <a:tailEnd type="arrow"/>
+          </a:ln>
+        </p:spPr>
+        <p:style>
+          <a:lnRef idx="1">
+            <a:schemeClr val="accent1"/>
+          </a:lnRef>
+          <a:fillRef idx="0">
+            <a:schemeClr val="accent1"/>
+          </a:fillRef>
+          <a:effectRef idx="0">
+            <a:schemeClr val="accent1"/>
+          </a:effectRef>
+          <a:fontRef idx="minor">
+            <a:schemeClr val="tx1"/>
+          </a:fontRef>
+        </p:style>
+      </p:cxnSp>
+      <p:sp>
+        <p:nvSpPr>
+          <p:cNvPr id="108" name="TextBox 107"/>
+          <p:cNvSpPr txBox="1"/>
+          <p:nvPr/>
+        </p:nvSpPr>
+        <p:spPr>
+          <a:xfrm rot="16200000">
+            <a:off x="241864" y="2499906"/>
+            <a:ext cx="1957652" cy="307777"/>
+          </a:xfrm>
+          <a:prstGeom prst="rect">
+            <a:avLst/>
+          </a:prstGeom>
+          <a:noFill/>
+        </p:spPr>
+        <p:txBody>
+          <a:bodyPr wrap="none" rtlCol="0">
+            <a:spAutoFit/>
+          </a:bodyPr>
+          <a:lstStyle/>
+          <a:p>
+            <a:r>
+              <a:rPr lang="en-US" sz="1400" dirty="0" smtClean="0"/>
+              <a:t>Adding </a:t>
+            </a:r>
+            <a:r>
+              <a:rPr lang="en-US" sz="1400" dirty="0" smtClean="0"/>
+              <a:t>paid User </a:t>
+            </a:r>
+            <a:r>
+              <a:rPr lang="en-US" sz="1400" dirty="0" smtClean="0"/>
+              <a:t>details</a:t>
+            </a:r>
+            <a:endParaRPr lang="en-US" sz="1400" dirty="0"/>
+          </a:p>
+        </p:txBody>
+      </p:sp>
+      <p:cxnSp>
+        <p:nvCxnSpPr>
+          <p:cNvPr id="113" name="Shape 112"/>
+          <p:cNvCxnSpPr/>
+          <p:nvPr/>
+        </p:nvCxnSpPr>
+        <p:spPr>
+          <a:xfrm flipV="1">
+            <a:off x="2438400" y="4038600"/>
+            <a:ext cx="2209800" cy="1752600"/>
+          </a:xfrm>
+          <a:prstGeom prst="bentConnector2">
+            <a:avLst/>
+          </a:prstGeom>
+          <a:ln>
+            <a:solidFill>
+              <a:schemeClr val="tx1"/>
+            </a:solidFill>
+            <a:tailEnd type="arrow"/>
+          </a:ln>
+        </p:spPr>
+        <p:style>
+          <a:lnRef idx="1">
+            <a:schemeClr val="accent1"/>
+          </a:lnRef>
+          <a:fillRef idx="0">
+            <a:schemeClr val="accent1"/>
+          </a:fillRef>
+          <a:effectRef idx="0">
+            <a:schemeClr val="accent1"/>
+          </a:effectRef>
+          <a:fontRef idx="minor">
+            <a:schemeClr val="tx1"/>
+          </a:fontRef>
+        </p:style>
+      </p:cxnSp>
+      <p:cxnSp>
+        <p:nvCxnSpPr>
+          <p:cNvPr id="116" name="Straight Connector 115"/>
+          <p:cNvCxnSpPr>
+            <a:endCxn id="101" idx="6"/>
+          </p:cNvCxnSpPr>
+          <p:nvPr/>
+        </p:nvCxnSpPr>
+        <p:spPr>
+          <a:xfrm rot="10800000">
+            <a:off x="1905000" y="5791200"/>
+            <a:ext cx="533400" cy="1588"/>
+          </a:xfrm>
+          <a:prstGeom prst="line">
+            <a:avLst/>
+          </a:prstGeom>
+          <a:ln>
+            <a:solidFill>
+              <a:schemeClr val="tx1"/>
+            </a:solidFill>
+          </a:ln>
+        </p:spPr>
+        <p:style>
+          <a:lnRef idx="1">
+            <a:schemeClr val="accent1"/>
+          </a:lnRef>
+          <a:fillRef idx="0">
+            <a:schemeClr val="accent1"/>
+          </a:fillRef>
+          <a:effectRef idx="0">
+            <a:schemeClr val="accent1"/>
+          </a:effectRef>
+          <a:fontRef idx="minor">
+            <a:schemeClr val="tx1"/>
+          </a:fontRef>
+        </p:style>
+      </p:cxnSp>
+      <p:sp>
+        <p:nvSpPr>
+          <p:cNvPr id="117" name="TextBox 116"/>
+          <p:cNvSpPr txBox="1"/>
+          <p:nvPr/>
+        </p:nvSpPr>
+        <p:spPr>
+          <a:xfrm>
+            <a:off x="2590800" y="5791200"/>
+            <a:ext cx="1701171" cy="307777"/>
+          </a:xfrm>
+          <a:prstGeom prst="rect">
+            <a:avLst/>
+          </a:prstGeom>
+          <a:noFill/>
+        </p:spPr>
+        <p:txBody>
+          <a:bodyPr wrap="none" rtlCol="0">
+            <a:spAutoFit/>
+          </a:bodyPr>
+          <a:lstStyle/>
+          <a:p>
+            <a:r>
+              <a:rPr lang="en-US" sz="1400" dirty="0" smtClean="0"/>
+              <a:t>Get Paid </a:t>
+            </a:r>
+            <a:r>
+              <a:rPr lang="en-US" sz="1400" dirty="0" smtClean="0"/>
+              <a:t>User details</a:t>
+            </a:r>
+            <a:endParaRPr lang="en-US" sz="1400" dirty="0"/>
+          </a:p>
+        </p:txBody>
+      </p:sp>
+      <p:cxnSp>
+        <p:nvCxnSpPr>
+          <p:cNvPr id="119" name="Shape 118"/>
+          <p:cNvCxnSpPr/>
+          <p:nvPr/>
+        </p:nvCxnSpPr>
+        <p:spPr>
+          <a:xfrm rot="5400000" flipH="1" flipV="1">
+            <a:off x="-876300" y="2171700"/>
+            <a:ext cx="5029200" cy="2057400"/>
+          </a:xfrm>
+          <a:prstGeom prst="bentConnector3">
+            <a:avLst>
+              <a:gd name="adj1" fmla="val 108140"/>
+            </a:avLst>
+          </a:prstGeom>
+          <a:ln>
+            <a:solidFill>
+              <a:schemeClr val="tx1"/>
+            </a:solidFill>
+            <a:tailEnd type="arrow"/>
+          </a:ln>
+        </p:spPr>
+        <p:style>
+          <a:lnRef idx="1">
+            <a:schemeClr val="accent1"/>
+          </a:lnRef>
+          <a:fillRef idx="0">
+            <a:schemeClr val="accent1"/>
+          </a:fillRef>
+          <a:effectRef idx="0">
+            <a:schemeClr val="accent1"/>
+          </a:effectRef>
+          <a:fontRef idx="minor">
+            <a:schemeClr val="tx1"/>
+          </a:fontRef>
+        </p:style>
+      </p:cxnSp>
+      <p:cxnSp>
+        <p:nvCxnSpPr>
+          <p:cNvPr id="132" name="Straight Connector 131"/>
+          <p:cNvCxnSpPr/>
+          <p:nvPr/>
+        </p:nvCxnSpPr>
+        <p:spPr>
+          <a:xfrm>
+            <a:off x="609600" y="5715000"/>
+            <a:ext cx="228600" cy="1588"/>
+          </a:xfrm>
+          <a:prstGeom prst="line">
+            <a:avLst/>
+          </a:prstGeom>
+          <a:ln>
+            <a:solidFill>
+              <a:schemeClr val="tx1"/>
+            </a:solidFill>
+          </a:ln>
+        </p:spPr>
+        <p:style>
+          <a:lnRef idx="1">
+            <a:schemeClr val="accent1"/>
+          </a:lnRef>
+          <a:fillRef idx="0">
+            <a:schemeClr val="accent1"/>
+          </a:fillRef>
+          <a:effectRef idx="0">
+            <a:schemeClr val="accent1"/>
+          </a:effectRef>
+          <a:fontRef idx="minor">
+            <a:schemeClr val="tx1"/>
+          </a:fontRef>
+        </p:style>
+      </p:cxnSp>
+      <p:sp>
+        <p:nvSpPr>
+          <p:cNvPr id="136" name="TextBox 135"/>
+          <p:cNvSpPr txBox="1"/>
+          <p:nvPr/>
+        </p:nvSpPr>
+        <p:spPr>
+          <a:xfrm rot="16200000">
+            <a:off x="-169710" y="2558171"/>
+            <a:ext cx="1866408" cy="307777"/>
+          </a:xfrm>
+          <a:prstGeom prst="rect">
+            <a:avLst/>
+          </a:prstGeom>
+          <a:noFill/>
+        </p:spPr>
+        <p:txBody>
+          <a:bodyPr wrap="none" rtlCol="0">
+            <a:spAutoFit/>
+          </a:bodyPr>
+          <a:lstStyle/>
+          <a:p>
+            <a:r>
+              <a:rPr lang="en-US" sz="1400" dirty="0" smtClean="0"/>
+              <a:t>Adding Paid user result</a:t>
+            </a:r>
+            <a:endParaRPr lang="en-US" sz="1400" dirty="0"/>
+          </a:p>
+        </p:txBody>
+      </p:sp>
+      <p:cxnSp>
+        <p:nvCxnSpPr>
+          <p:cNvPr id="188" name="Elbow Connector 187"/>
+          <p:cNvCxnSpPr>
+            <a:stCxn id="11" idx="3"/>
+          </p:cNvCxnSpPr>
+          <p:nvPr/>
+        </p:nvCxnSpPr>
+        <p:spPr>
+          <a:xfrm>
+            <a:off x="4953000" y="3810000"/>
+            <a:ext cx="1371600" cy="1143000"/>
+          </a:xfrm>
+          <a:prstGeom prst="bentConnector3">
+            <a:avLst>
+              <a:gd name="adj1" fmla="val 50000"/>
+            </a:avLst>
+          </a:prstGeom>
+          <a:ln>
+            <a:solidFill>
+              <a:schemeClr val="tx1"/>
+            </a:solidFill>
+            <a:tailEnd type="arrow"/>
+          </a:ln>
+        </p:spPr>
+        <p:style>
+          <a:lnRef idx="1">
+            <a:schemeClr val="accent1"/>
+          </a:lnRef>
+          <a:fillRef idx="0">
+            <a:schemeClr val="accent1"/>
+          </a:fillRef>
+          <a:effectRef idx="0">
+            <a:schemeClr val="accent1"/>
+          </a:effectRef>
+          <a:fontRef idx="minor">
+            <a:schemeClr val="tx1"/>
+          </a:fontRef>
+        </p:style>
+      </p:cxnSp>
+      <p:sp>
+        <p:nvSpPr>
+          <p:cNvPr id="189" name="TextBox 188"/>
+          <p:cNvSpPr txBox="1"/>
+          <p:nvPr/>
+        </p:nvSpPr>
+        <p:spPr>
+          <a:xfrm>
+            <a:off x="5638800" y="4114800"/>
+            <a:ext cx="667234" cy="523220"/>
+          </a:xfrm>
+          <a:prstGeom prst="rect">
+            <a:avLst/>
+          </a:prstGeom>
+          <a:noFill/>
+        </p:spPr>
+        <p:txBody>
+          <a:bodyPr wrap="none" rtlCol="0">
+            <a:spAutoFit/>
+          </a:bodyPr>
+          <a:lstStyle/>
+          <a:p>
+            <a:r>
+              <a:rPr lang="en-US" sz="1400" dirty="0" smtClean="0"/>
+              <a:t>Get </a:t>
+            </a:r>
+          </a:p>
+          <a:p>
+            <a:r>
+              <a:rPr lang="en-US" sz="1400" dirty="0" smtClean="0"/>
+              <a:t>details</a:t>
+            </a:r>
+            <a:endParaRPr lang="en-US" sz="1400" dirty="0"/>
+          </a:p>
+        </p:txBody>
+      </p:sp>
+      <p:cxnSp>
+        <p:nvCxnSpPr>
+          <p:cNvPr id="71" name="Elbow Connector 70"/>
+          <p:cNvCxnSpPr>
+            <a:stCxn id="22" idx="2"/>
+            <a:endCxn id="19" idx="6"/>
+          </p:cNvCxnSpPr>
+          <p:nvPr/>
+        </p:nvCxnSpPr>
+        <p:spPr>
+          <a:xfrm rot="10800000">
+            <a:off x="4953000" y="2400300"/>
+            <a:ext cx="1600200" cy="1588"/>
+          </a:xfrm>
+          <a:prstGeom prst="bentConnector3">
+            <a:avLst>
+              <a:gd name="adj1" fmla="val 50000"/>
+            </a:avLst>
+          </a:prstGeom>
+          <a:ln>
+            <a:solidFill>
+              <a:schemeClr val="tx1"/>
+            </a:solidFill>
+            <a:tailEnd type="arrow"/>
+          </a:ln>
+        </p:spPr>
+        <p:style>
+          <a:lnRef idx="1">
+            <a:schemeClr val="accent1"/>
+          </a:lnRef>
+          <a:fillRef idx="0">
+            <a:schemeClr val="accent1"/>
+          </a:fillRef>
+          <a:effectRef idx="0">
+            <a:schemeClr val="accent1"/>
+          </a:effectRef>
+          <a:fontRef idx="minor">
+            <a:schemeClr val="tx1"/>
+          </a:fontRef>
+        </p:style>
+      </p:cxnSp>
+      <p:sp>
+        <p:nvSpPr>
+          <p:cNvPr id="72" name="TextBox 71"/>
+          <p:cNvSpPr txBox="1"/>
+          <p:nvPr/>
+        </p:nvSpPr>
+        <p:spPr>
+          <a:xfrm>
+            <a:off x="5181600" y="2438400"/>
+            <a:ext cx="1254702" cy="307777"/>
+          </a:xfrm>
+          <a:prstGeom prst="rect">
+            <a:avLst/>
+          </a:prstGeom>
+          <a:noFill/>
+        </p:spPr>
+        <p:txBody>
+          <a:bodyPr wrap="none" rtlCol="0">
+            <a:spAutoFit/>
+          </a:bodyPr>
+          <a:lstStyle/>
+          <a:p>
+            <a:r>
+              <a:rPr lang="en-US" sz="1400" dirty="0" smtClean="0"/>
+              <a:t>Send response</a:t>
+            </a:r>
+            <a:endParaRPr lang="en-US" dirty="0"/>
+          </a:p>
+        </p:txBody>
+      </p:sp>
+    </p:spTree>
+  </p:cSld>
+  <p:clrMapOvr>
+    <a:masterClrMapping/>
+  </p:clrMapOvr>
+</p:sld>
+</file>
+
 <file path=ppt/theme/theme1.xml><?xml version="1.0" encoding="utf-8"?>
 <a:theme xmlns:a="http://schemas.openxmlformats.org/drawingml/2006/main" name="Office Theme">
   <a:themeElements>

</xml_diff>

<commit_message>
two 1 level dfd added
</commit_message>
<xml_diff>
--- a/report/Child education Diagrams.pptx
+++ b/report/Child education Diagrams.pptx
@@ -8,6 +8,7 @@
     <p:sldId id="256" r:id="rId2"/>
     <p:sldId id="257" r:id="rId3"/>
     <p:sldId id="259" r:id="rId4"/>
+    <p:sldId id="260" r:id="rId5"/>
   </p:sldIdLst>
   <p:sldSz cx="9144000" cy="6858000" type="screen4x3"/>
   <p:notesSz cx="6858000" cy="9144000"/>
@@ -9764,6 +9765,2052 @@
           </a:p>
         </p:txBody>
       </p:sp>
+      <p:grpSp>
+        <p:nvGrpSpPr>
+          <p:cNvPr id="73" name="Group 72"/>
+          <p:cNvGrpSpPr/>
+          <p:nvPr/>
+        </p:nvGrpSpPr>
+        <p:grpSpPr>
+          <a:xfrm>
+            <a:off x="6781800" y="6096000"/>
+            <a:ext cx="1697232" cy="523220"/>
+            <a:chOff x="304800" y="1676400"/>
+            <a:chExt cx="1697232" cy="523220"/>
+          </a:xfrm>
+        </p:grpSpPr>
+        <p:sp>
+          <p:nvSpPr>
+            <p:cNvPr id="74" name="Rectangle 73"/>
+            <p:cNvSpPr/>
+            <p:nvPr/>
+          </p:nvSpPr>
+          <p:spPr>
+            <a:xfrm>
+              <a:off x="304800" y="1676400"/>
+              <a:ext cx="1676400" cy="457200"/>
+            </a:xfrm>
+            <a:prstGeom prst="rect">
+              <a:avLst/>
+            </a:prstGeom>
+            <a:noFill/>
+            <a:ln>
+              <a:solidFill>
+                <a:schemeClr val="tx1"/>
+              </a:solidFill>
+            </a:ln>
+          </p:spPr>
+          <p:style>
+            <a:lnRef idx="2">
+              <a:schemeClr val="accent1">
+                <a:shade val="50000"/>
+              </a:schemeClr>
+            </a:lnRef>
+            <a:fillRef idx="1">
+              <a:schemeClr val="accent1"/>
+            </a:fillRef>
+            <a:effectRef idx="0">
+              <a:schemeClr val="accent1"/>
+            </a:effectRef>
+            <a:fontRef idx="minor">
+              <a:schemeClr val="lt1"/>
+            </a:fontRef>
+          </p:style>
+          <p:txBody>
+            <a:bodyPr rtlCol="0" anchor="ctr"/>
+            <a:lstStyle/>
+            <a:p>
+              <a:pPr algn="ctr"/>
+              <a:endParaRPr lang="en-US"/>
+            </a:p>
+          </p:txBody>
+        </p:sp>
+        <p:sp>
+          <p:nvSpPr>
+            <p:cNvPr id="76" name="TextBox 75"/>
+            <p:cNvSpPr txBox="1"/>
+            <p:nvPr/>
+          </p:nvSpPr>
+          <p:spPr>
+            <a:xfrm>
+              <a:off x="609600" y="1676400"/>
+              <a:ext cx="1392432" cy="523220"/>
+            </a:xfrm>
+            <a:prstGeom prst="rect">
+              <a:avLst/>
+            </a:prstGeom>
+            <a:noFill/>
+          </p:spPr>
+          <p:txBody>
+            <a:bodyPr wrap="none" rtlCol="0">
+              <a:spAutoFit/>
+            </a:bodyPr>
+            <a:lstStyle/>
+            <a:p>
+              <a:r>
+                <a:rPr lang="en-US" sz="1400" dirty="0" smtClean="0"/>
+                <a:t>Online </a:t>
+              </a:r>
+            </a:p>
+            <a:p>
+              <a:r>
+                <a:rPr lang="en-US" sz="1400" dirty="0" smtClean="0"/>
+                <a:t>Resource Details</a:t>
+              </a:r>
+              <a:endParaRPr lang="en-US" sz="1400" dirty="0"/>
+            </a:p>
+          </p:txBody>
+        </p:sp>
+        <p:cxnSp>
+          <p:nvCxnSpPr>
+            <p:cNvPr id="77" name="Straight Connector 76"/>
+            <p:cNvCxnSpPr/>
+            <p:nvPr/>
+          </p:nvCxnSpPr>
+          <p:spPr>
+            <a:xfrm rot="5400000">
+              <a:off x="457994" y="1904206"/>
+              <a:ext cx="456406" cy="794"/>
+            </a:xfrm>
+            <a:prstGeom prst="line">
+              <a:avLst/>
+            </a:prstGeom>
+            <a:ln>
+              <a:solidFill>
+                <a:schemeClr val="tx1"/>
+              </a:solidFill>
+            </a:ln>
+          </p:spPr>
+          <p:style>
+            <a:lnRef idx="1">
+              <a:schemeClr val="accent1"/>
+            </a:lnRef>
+            <a:fillRef idx="0">
+              <a:schemeClr val="accent1"/>
+            </a:fillRef>
+            <a:effectRef idx="0">
+              <a:schemeClr val="accent1"/>
+            </a:effectRef>
+            <a:fontRef idx="minor">
+              <a:schemeClr val="tx1"/>
+            </a:fontRef>
+          </p:style>
+        </p:cxnSp>
+        <p:sp>
+          <p:nvSpPr>
+            <p:cNvPr id="80" name="TextBox 79"/>
+            <p:cNvSpPr txBox="1"/>
+            <p:nvPr/>
+          </p:nvSpPr>
+          <p:spPr>
+            <a:xfrm>
+              <a:off x="304800" y="1752600"/>
+              <a:ext cx="386644" cy="307777"/>
+            </a:xfrm>
+            <a:prstGeom prst="rect">
+              <a:avLst/>
+            </a:prstGeom>
+            <a:noFill/>
+          </p:spPr>
+          <p:txBody>
+            <a:bodyPr wrap="none" rtlCol="0">
+              <a:spAutoFit/>
+            </a:bodyPr>
+            <a:lstStyle/>
+            <a:p>
+              <a:r>
+                <a:rPr lang="en-US" sz="1400" dirty="0" smtClean="0"/>
+                <a:t>D4</a:t>
+              </a:r>
+              <a:endParaRPr lang="en-US" sz="1400" dirty="0"/>
+            </a:p>
+          </p:txBody>
+        </p:sp>
+      </p:grpSp>
+      <p:cxnSp>
+        <p:nvCxnSpPr>
+          <p:cNvPr id="83" name="Straight Arrow Connector 82"/>
+          <p:cNvCxnSpPr>
+            <a:stCxn id="76" idx="0"/>
+          </p:cNvCxnSpPr>
+          <p:nvPr/>
+        </p:nvCxnSpPr>
+        <p:spPr>
+          <a:xfrm rot="16200000" flipV="1">
+            <a:off x="7358508" y="5671692"/>
+            <a:ext cx="838200" cy="10416"/>
+          </a:xfrm>
+          <a:prstGeom prst="straightConnector1">
+            <a:avLst/>
+          </a:prstGeom>
+          <a:ln>
+            <a:solidFill>
+              <a:schemeClr val="tx1"/>
+            </a:solidFill>
+            <a:tailEnd type="arrow"/>
+          </a:ln>
+        </p:spPr>
+        <p:style>
+          <a:lnRef idx="1">
+            <a:schemeClr val="accent1"/>
+          </a:lnRef>
+          <a:fillRef idx="0">
+            <a:schemeClr val="accent1"/>
+          </a:fillRef>
+          <a:effectRef idx="0">
+            <a:schemeClr val="accent1"/>
+          </a:effectRef>
+          <a:fontRef idx="minor">
+            <a:schemeClr val="tx1"/>
+          </a:fontRef>
+        </p:style>
+      </p:cxnSp>
+      <p:sp>
+        <p:nvSpPr>
+          <p:cNvPr id="85" name="TextBox 84"/>
+          <p:cNvSpPr txBox="1"/>
+          <p:nvPr/>
+        </p:nvSpPr>
+        <p:spPr>
+          <a:xfrm>
+            <a:off x="7772400" y="5410200"/>
+            <a:ext cx="667234" cy="523220"/>
+          </a:xfrm>
+          <a:prstGeom prst="rect">
+            <a:avLst/>
+          </a:prstGeom>
+          <a:noFill/>
+        </p:spPr>
+        <p:txBody>
+          <a:bodyPr wrap="none" rtlCol="0">
+            <a:spAutoFit/>
+          </a:bodyPr>
+          <a:lstStyle/>
+          <a:p>
+            <a:r>
+              <a:rPr lang="en-US" sz="1400" dirty="0" smtClean="0"/>
+              <a:t>Get </a:t>
+            </a:r>
+          </a:p>
+          <a:p>
+            <a:r>
+              <a:rPr lang="en-US" sz="1400" dirty="0" smtClean="0"/>
+              <a:t>details</a:t>
+            </a:r>
+            <a:endParaRPr lang="en-US" sz="1400" dirty="0"/>
+          </a:p>
+        </p:txBody>
+      </p:sp>
+    </p:spTree>
+  </p:cSld>
+  <p:clrMapOvr>
+    <a:masterClrMapping/>
+  </p:clrMapOvr>
+</p:sld>
+</file>
+
+<file path=ppt/slides/slide4.xml><?xml version="1.0" encoding="utf-8"?>
+<p:sld xmlns:a="http://schemas.openxmlformats.org/drawingml/2006/main" xmlns:r="http://schemas.openxmlformats.org/officeDocument/2006/relationships" xmlns:p="http://schemas.openxmlformats.org/presentationml/2006/main">
+  <p:cSld>
+    <p:spTree>
+      <p:nvGrpSpPr>
+        <p:cNvPr id="1" name=""/>
+        <p:cNvGrpSpPr/>
+        <p:nvPr/>
+      </p:nvGrpSpPr>
+      <p:grpSpPr>
+        <a:xfrm>
+          <a:off x="0" y="0"/>
+          <a:ext cx="0" cy="0"/>
+          <a:chOff x="0" y="0"/>
+          <a:chExt cx="0" cy="0"/>
+        </a:xfrm>
+      </p:grpSpPr>
+      <p:grpSp>
+        <p:nvGrpSpPr>
+          <p:cNvPr id="3" name="Group 14"/>
+          <p:cNvGrpSpPr/>
+          <p:nvPr/>
+        </p:nvGrpSpPr>
+        <p:grpSpPr>
+          <a:xfrm>
+            <a:off x="6324600" y="4191000"/>
+            <a:ext cx="2438400" cy="1219200"/>
+            <a:chOff x="3962400" y="3505200"/>
+            <a:chExt cx="2438400" cy="1219200"/>
+          </a:xfrm>
+        </p:grpSpPr>
+        <p:sp>
+          <p:nvSpPr>
+            <p:cNvPr id="2" name="Oval 1"/>
+            <p:cNvSpPr/>
+            <p:nvPr/>
+          </p:nvSpPr>
+          <p:spPr>
+            <a:xfrm>
+              <a:off x="3962400" y="3505200"/>
+              <a:ext cx="1828800" cy="1219200"/>
+            </a:xfrm>
+            <a:prstGeom prst="ellipse">
+              <a:avLst/>
+            </a:prstGeom>
+            <a:noFill/>
+            <a:ln>
+              <a:solidFill>
+                <a:schemeClr val="tx1"/>
+              </a:solidFill>
+            </a:ln>
+          </p:spPr>
+          <p:style>
+            <a:lnRef idx="2">
+              <a:schemeClr val="accent1">
+                <a:shade val="50000"/>
+              </a:schemeClr>
+            </a:lnRef>
+            <a:fillRef idx="1">
+              <a:schemeClr val="accent1"/>
+            </a:fillRef>
+            <a:effectRef idx="0">
+              <a:schemeClr val="accent1"/>
+            </a:effectRef>
+            <a:fontRef idx="minor">
+              <a:schemeClr val="lt1"/>
+            </a:fontRef>
+          </p:style>
+          <p:txBody>
+            <a:bodyPr rtlCol="0" anchor="ctr"/>
+            <a:lstStyle/>
+            <a:p>
+              <a:pPr algn="ctr"/>
+              <a:endParaRPr lang="en-US"/>
+            </a:p>
+          </p:txBody>
+        </p:sp>
+        <p:sp>
+          <p:nvSpPr>
+            <p:cNvPr id="4" name="Rectangle 3"/>
+            <p:cNvSpPr/>
+            <p:nvPr/>
+          </p:nvSpPr>
+          <p:spPr>
+            <a:xfrm>
+              <a:off x="4572000" y="3886200"/>
+              <a:ext cx="1828800" cy="738664"/>
+            </a:xfrm>
+            <a:prstGeom prst="rect">
+              <a:avLst/>
+            </a:prstGeom>
+          </p:spPr>
+          <p:txBody>
+            <a:bodyPr wrap="square">
+              <a:spAutoFit/>
+            </a:bodyPr>
+            <a:lstStyle/>
+            <a:p>
+              <a:r>
+                <a:rPr lang="en-US" sz="1400" dirty="0" smtClean="0"/>
+                <a:t>Child </a:t>
+              </a:r>
+            </a:p>
+            <a:p>
+              <a:r>
+                <a:rPr lang="en-US" sz="1400" dirty="0" smtClean="0"/>
+                <a:t>Education </a:t>
+              </a:r>
+            </a:p>
+            <a:p>
+              <a:r>
+                <a:rPr lang="en-US" sz="1400" dirty="0" smtClean="0"/>
+                <a:t>System</a:t>
+              </a:r>
+              <a:endParaRPr lang="en-US" sz="1400" dirty="0"/>
+            </a:p>
+          </p:txBody>
+        </p:sp>
+        <p:sp>
+          <p:nvSpPr>
+            <p:cNvPr id="5" name="TextBox 4"/>
+            <p:cNvSpPr txBox="1"/>
+            <p:nvPr/>
+          </p:nvSpPr>
+          <p:spPr>
+            <a:xfrm>
+              <a:off x="4724400" y="3581400"/>
+              <a:ext cx="301686" cy="369332"/>
+            </a:xfrm>
+            <a:prstGeom prst="rect">
+              <a:avLst/>
+            </a:prstGeom>
+            <a:noFill/>
+          </p:spPr>
+          <p:txBody>
+            <a:bodyPr wrap="none" rtlCol="0">
+              <a:spAutoFit/>
+            </a:bodyPr>
+            <a:lstStyle/>
+            <a:p>
+              <a:r>
+                <a:rPr lang="en-US" dirty="0" smtClean="0"/>
+                <a:t>1</a:t>
+              </a:r>
+              <a:endParaRPr lang="en-US" dirty="0"/>
+            </a:p>
+          </p:txBody>
+        </p:sp>
+      </p:grpSp>
+      <p:grpSp>
+        <p:nvGrpSpPr>
+          <p:cNvPr id="6" name="Group 5"/>
+          <p:cNvGrpSpPr/>
+          <p:nvPr/>
+        </p:nvGrpSpPr>
+        <p:grpSpPr>
+          <a:xfrm>
+            <a:off x="1828800" y="685800"/>
+            <a:ext cx="1066800" cy="381000"/>
+            <a:chOff x="4495800" y="914400"/>
+            <a:chExt cx="1066800" cy="381000"/>
+          </a:xfrm>
+        </p:grpSpPr>
+        <p:sp>
+          <p:nvSpPr>
+            <p:cNvPr id="7" name="TextBox 6"/>
+            <p:cNvSpPr txBox="1"/>
+            <p:nvPr/>
+          </p:nvSpPr>
+          <p:spPr>
+            <a:xfrm>
+              <a:off x="4724400" y="914400"/>
+              <a:ext cx="720069" cy="307777"/>
+            </a:xfrm>
+            <a:prstGeom prst="rect">
+              <a:avLst/>
+            </a:prstGeom>
+            <a:noFill/>
+          </p:spPr>
+          <p:txBody>
+            <a:bodyPr wrap="none" rtlCol="0">
+              <a:spAutoFit/>
+            </a:bodyPr>
+            <a:lstStyle/>
+            <a:p>
+              <a:r>
+                <a:rPr lang="en-US" sz="1400" dirty="0" smtClean="0"/>
+                <a:t>Lesson </a:t>
+              </a:r>
+            </a:p>
+          </p:txBody>
+        </p:sp>
+        <p:sp>
+          <p:nvSpPr>
+            <p:cNvPr id="8" name="Rectangle 7"/>
+            <p:cNvSpPr/>
+            <p:nvPr/>
+          </p:nvSpPr>
+          <p:spPr>
+            <a:xfrm>
+              <a:off x="4495800" y="914400"/>
+              <a:ext cx="1066800" cy="381000"/>
+            </a:xfrm>
+            <a:prstGeom prst="rect">
+              <a:avLst/>
+            </a:prstGeom>
+            <a:noFill/>
+            <a:ln>
+              <a:solidFill>
+                <a:schemeClr val="tx1"/>
+              </a:solidFill>
+            </a:ln>
+          </p:spPr>
+          <p:style>
+            <a:lnRef idx="2">
+              <a:schemeClr val="accent1">
+                <a:shade val="50000"/>
+              </a:schemeClr>
+            </a:lnRef>
+            <a:fillRef idx="1">
+              <a:schemeClr val="accent1"/>
+            </a:fillRef>
+            <a:effectRef idx="0">
+              <a:schemeClr val="accent1"/>
+            </a:effectRef>
+            <a:fontRef idx="minor">
+              <a:schemeClr val="lt1"/>
+            </a:fontRef>
+          </p:style>
+          <p:txBody>
+            <a:bodyPr rtlCol="0" anchor="ctr"/>
+            <a:lstStyle/>
+            <a:p>
+              <a:pPr algn="ctr"/>
+              <a:endParaRPr lang="en-US"/>
+            </a:p>
+          </p:txBody>
+        </p:sp>
+      </p:grpSp>
+      <p:grpSp>
+        <p:nvGrpSpPr>
+          <p:cNvPr id="17" name="Group 17"/>
+          <p:cNvGrpSpPr/>
+          <p:nvPr/>
+        </p:nvGrpSpPr>
+        <p:grpSpPr>
+          <a:xfrm>
+            <a:off x="5943600" y="228600"/>
+            <a:ext cx="990600" cy="838200"/>
+            <a:chOff x="1219200" y="5029200"/>
+            <a:chExt cx="990600" cy="838200"/>
+          </a:xfrm>
+        </p:grpSpPr>
+        <p:sp>
+          <p:nvSpPr>
+            <p:cNvPr id="19" name="Oval 31"/>
+            <p:cNvSpPr>
+              <a:spLocks noChangeArrowheads="1"/>
+            </p:cNvSpPr>
+            <p:nvPr/>
+          </p:nvSpPr>
+          <p:spPr bwMode="auto">
+            <a:xfrm>
+              <a:off x="1219200" y="5029200"/>
+              <a:ext cx="990600" cy="838200"/>
+            </a:xfrm>
+            <a:prstGeom prst="ellipse">
+              <a:avLst/>
+            </a:prstGeom>
+            <a:noFill/>
+            <a:ln w="9525">
+              <a:solidFill>
+                <a:schemeClr val="tx1"/>
+              </a:solidFill>
+              <a:round/>
+              <a:headEnd/>
+              <a:tailEnd/>
+            </a:ln>
+            <a:effectLst/>
+          </p:spPr>
+          <p:txBody>
+            <a:bodyPr wrap="none" anchor="ctr"/>
+            <a:lstStyle/>
+            <a:p>
+              <a:pPr algn="ctr"/>
+              <a:endParaRPr lang="en-US" sz="1400" dirty="0" smtClean="0"/>
+            </a:p>
+            <a:p>
+              <a:pPr algn="ctr"/>
+              <a:r>
+                <a:rPr lang="en-US" sz="1400" dirty="0" smtClean="0"/>
+                <a:t>V</a:t>
+              </a:r>
+              <a:r>
+                <a:rPr lang="en-US" sz="1400" dirty="0" smtClean="0"/>
+                <a:t>ideo </a:t>
+              </a:r>
+            </a:p>
+            <a:p>
+              <a:pPr algn="ctr"/>
+              <a:r>
+                <a:rPr lang="en-US" sz="1400" dirty="0" smtClean="0"/>
+                <a:t>request</a:t>
+              </a:r>
+              <a:endParaRPr lang="en-US" sz="1400" dirty="0" smtClean="0"/>
+            </a:p>
+          </p:txBody>
+        </p:sp>
+        <p:sp>
+          <p:nvSpPr>
+            <p:cNvPr id="20" name="TextBox 19"/>
+            <p:cNvSpPr txBox="1"/>
+            <p:nvPr/>
+          </p:nvSpPr>
+          <p:spPr>
+            <a:xfrm>
+              <a:off x="1447800" y="5029200"/>
+              <a:ext cx="476412" cy="369332"/>
+            </a:xfrm>
+            <a:prstGeom prst="rect">
+              <a:avLst/>
+            </a:prstGeom>
+            <a:noFill/>
+          </p:spPr>
+          <p:txBody>
+            <a:bodyPr wrap="none" rtlCol="0">
+              <a:spAutoFit/>
+            </a:bodyPr>
+            <a:lstStyle/>
+            <a:p>
+              <a:r>
+                <a:rPr lang="en-US" dirty="0" smtClean="0"/>
+                <a:t>3</a:t>
+              </a:r>
+              <a:r>
+                <a:rPr lang="en-US" dirty="0" smtClean="0"/>
+                <a:t>.1</a:t>
+              </a:r>
+              <a:endParaRPr lang="en-US" dirty="0"/>
+            </a:p>
+          </p:txBody>
+        </p:sp>
+      </p:grpSp>
+      <p:grpSp>
+        <p:nvGrpSpPr>
+          <p:cNvPr id="18" name="Group 20"/>
+          <p:cNvGrpSpPr/>
+          <p:nvPr/>
+        </p:nvGrpSpPr>
+        <p:grpSpPr>
+          <a:xfrm>
+            <a:off x="6553200" y="2743200"/>
+            <a:ext cx="990600" cy="838200"/>
+            <a:chOff x="1219200" y="5029200"/>
+            <a:chExt cx="990600" cy="838200"/>
+          </a:xfrm>
+        </p:grpSpPr>
+        <p:sp>
+          <p:nvSpPr>
+            <p:cNvPr id="22" name="Oval 31"/>
+            <p:cNvSpPr>
+              <a:spLocks noChangeArrowheads="1"/>
+            </p:cNvSpPr>
+            <p:nvPr/>
+          </p:nvSpPr>
+          <p:spPr bwMode="auto">
+            <a:xfrm>
+              <a:off x="1219200" y="5029200"/>
+              <a:ext cx="990600" cy="838200"/>
+            </a:xfrm>
+            <a:prstGeom prst="ellipse">
+              <a:avLst/>
+            </a:prstGeom>
+            <a:noFill/>
+            <a:ln w="9525">
+              <a:solidFill>
+                <a:schemeClr val="tx1"/>
+              </a:solidFill>
+              <a:round/>
+              <a:headEnd/>
+              <a:tailEnd/>
+            </a:ln>
+            <a:effectLst/>
+          </p:spPr>
+          <p:txBody>
+            <a:bodyPr wrap="none" anchor="ctr"/>
+            <a:lstStyle/>
+            <a:p>
+              <a:pPr algn="ctr"/>
+              <a:endParaRPr lang="en-US" sz="1400" dirty="0" smtClean="0"/>
+            </a:p>
+            <a:p>
+              <a:pPr algn="ctr"/>
+              <a:r>
+                <a:rPr lang="en-US" sz="1400" dirty="0" smtClean="0"/>
+                <a:t>Verify </a:t>
+              </a:r>
+              <a:endParaRPr lang="en-US" sz="1400" dirty="0" smtClean="0"/>
+            </a:p>
+            <a:p>
+              <a:pPr algn="ctr"/>
+              <a:r>
+                <a:rPr lang="en-US" sz="1400" dirty="0" smtClean="0"/>
+                <a:t>request</a:t>
+              </a:r>
+              <a:endParaRPr lang="en-US" sz="1400" dirty="0" smtClean="0"/>
+            </a:p>
+          </p:txBody>
+        </p:sp>
+        <p:sp>
+          <p:nvSpPr>
+            <p:cNvPr id="23" name="TextBox 22"/>
+            <p:cNvSpPr txBox="1"/>
+            <p:nvPr/>
+          </p:nvSpPr>
+          <p:spPr>
+            <a:xfrm>
+              <a:off x="1447800" y="5029200"/>
+              <a:ext cx="476412" cy="369332"/>
+            </a:xfrm>
+            <a:prstGeom prst="rect">
+              <a:avLst/>
+            </a:prstGeom>
+            <a:noFill/>
+          </p:spPr>
+          <p:txBody>
+            <a:bodyPr wrap="none" rtlCol="0">
+              <a:spAutoFit/>
+            </a:bodyPr>
+            <a:lstStyle/>
+            <a:p>
+              <a:r>
+                <a:rPr lang="en-US" dirty="0" smtClean="0"/>
+                <a:t>3.3</a:t>
+              </a:r>
+              <a:endParaRPr lang="en-US" dirty="0"/>
+            </a:p>
+          </p:txBody>
+        </p:sp>
+      </p:grpSp>
+      <p:sp>
+        <p:nvSpPr>
+          <p:cNvPr id="26" name="TextBox 25"/>
+          <p:cNvSpPr txBox="1"/>
+          <p:nvPr/>
+        </p:nvSpPr>
+        <p:spPr>
+          <a:xfrm>
+            <a:off x="3048000" y="228600"/>
+            <a:ext cx="1833579" cy="307777"/>
+          </a:xfrm>
+          <a:prstGeom prst="rect">
+            <a:avLst/>
+          </a:prstGeom>
+          <a:noFill/>
+        </p:spPr>
+        <p:txBody>
+          <a:bodyPr wrap="none" rtlCol="0">
+            <a:spAutoFit/>
+          </a:bodyPr>
+          <a:lstStyle/>
+          <a:p>
+            <a:r>
+              <a:rPr lang="en-US" sz="1400" dirty="0" smtClean="0"/>
+              <a:t>Apply for video lesson </a:t>
+            </a:r>
+            <a:endParaRPr lang="en-US" dirty="0"/>
+          </a:p>
+        </p:txBody>
+      </p:sp>
+      <p:cxnSp>
+        <p:nvCxnSpPr>
+          <p:cNvPr id="33" name="Shape 32"/>
+          <p:cNvCxnSpPr>
+            <a:stCxn id="8" idx="0"/>
+          </p:cNvCxnSpPr>
+          <p:nvPr/>
+        </p:nvCxnSpPr>
+        <p:spPr>
+          <a:xfrm rot="5400000" flipH="1" flipV="1">
+            <a:off x="4076700" y="-1181100"/>
+            <a:ext cx="152400" cy="3581400"/>
+          </a:xfrm>
+          <a:prstGeom prst="bentConnector2">
+            <a:avLst/>
+          </a:prstGeom>
+          <a:ln>
+            <a:solidFill>
+              <a:schemeClr val="tx1"/>
+            </a:solidFill>
+            <a:tailEnd type="arrow"/>
+          </a:ln>
+        </p:spPr>
+        <p:style>
+          <a:lnRef idx="1">
+            <a:schemeClr val="accent1"/>
+          </a:lnRef>
+          <a:fillRef idx="0">
+            <a:schemeClr val="accent1"/>
+          </a:fillRef>
+          <a:effectRef idx="0">
+            <a:schemeClr val="accent1"/>
+          </a:effectRef>
+          <a:fontRef idx="minor">
+            <a:schemeClr val="tx1"/>
+          </a:fontRef>
+        </p:style>
+      </p:cxnSp>
+      <p:cxnSp>
+        <p:nvCxnSpPr>
+          <p:cNvPr id="35" name="Elbow Connector 34"/>
+          <p:cNvCxnSpPr>
+            <a:stCxn id="19" idx="6"/>
+            <a:endCxn id="23" idx="0"/>
+          </p:cNvCxnSpPr>
+          <p:nvPr/>
+        </p:nvCxnSpPr>
+        <p:spPr>
+          <a:xfrm>
+            <a:off x="6934200" y="647700"/>
+            <a:ext cx="85806" cy="2095500"/>
+          </a:xfrm>
+          <a:prstGeom prst="bentConnector2">
+            <a:avLst/>
+          </a:prstGeom>
+          <a:ln>
+            <a:solidFill>
+              <a:schemeClr val="tx1"/>
+            </a:solidFill>
+            <a:tailEnd type="arrow"/>
+          </a:ln>
+        </p:spPr>
+        <p:style>
+          <a:lnRef idx="1">
+            <a:schemeClr val="accent1"/>
+          </a:lnRef>
+          <a:fillRef idx="0">
+            <a:schemeClr val="accent1"/>
+          </a:fillRef>
+          <a:effectRef idx="0">
+            <a:schemeClr val="accent1"/>
+          </a:effectRef>
+          <a:fontRef idx="minor">
+            <a:schemeClr val="tx1"/>
+          </a:fontRef>
+        </p:style>
+      </p:cxnSp>
+      <p:sp>
+        <p:nvSpPr>
+          <p:cNvPr id="36" name="TextBox 35"/>
+          <p:cNvSpPr txBox="1"/>
+          <p:nvPr/>
+        </p:nvSpPr>
+        <p:spPr>
+          <a:xfrm rot="16200000">
+            <a:off x="6348680" y="1576119"/>
+            <a:ext cx="1631216" cy="307777"/>
+          </a:xfrm>
+          <a:prstGeom prst="rect">
+            <a:avLst/>
+          </a:prstGeom>
+          <a:noFill/>
+        </p:spPr>
+        <p:txBody>
+          <a:bodyPr wrap="none" rtlCol="0">
+            <a:spAutoFit/>
+          </a:bodyPr>
+          <a:lstStyle/>
+          <a:p>
+            <a:r>
+              <a:rPr lang="en-US" sz="1400" dirty="0" smtClean="0"/>
+              <a:t>Resource info check</a:t>
+            </a:r>
+            <a:endParaRPr lang="en-US" dirty="0"/>
+          </a:p>
+        </p:txBody>
+      </p:sp>
+      <p:sp>
+        <p:nvSpPr>
+          <p:cNvPr id="39" name="TextBox 38"/>
+          <p:cNvSpPr txBox="1"/>
+          <p:nvPr/>
+        </p:nvSpPr>
+        <p:spPr>
+          <a:xfrm>
+            <a:off x="7391400" y="3429000"/>
+            <a:ext cx="1297150" cy="738664"/>
+          </a:xfrm>
+          <a:prstGeom prst="rect">
+            <a:avLst/>
+          </a:prstGeom>
+          <a:noFill/>
+        </p:spPr>
+        <p:txBody>
+          <a:bodyPr wrap="none" rtlCol="0">
+            <a:spAutoFit/>
+          </a:bodyPr>
+          <a:lstStyle/>
+          <a:p>
+            <a:r>
+              <a:rPr lang="en-US" sz="1400" dirty="0" smtClean="0"/>
+              <a:t>Use </a:t>
+            </a:r>
+          </a:p>
+          <a:p>
+            <a:r>
+              <a:rPr lang="en-US" sz="1400" dirty="0" smtClean="0"/>
+              <a:t>authentication </a:t>
+            </a:r>
+          </a:p>
+          <a:p>
+            <a:r>
+              <a:rPr lang="en-US" sz="1400" dirty="0" smtClean="0"/>
+              <a:t>info</a:t>
+            </a:r>
+            <a:endParaRPr lang="en-US" sz="1400" dirty="0"/>
+          </a:p>
+        </p:txBody>
+      </p:sp>
+      <p:cxnSp>
+        <p:nvCxnSpPr>
+          <p:cNvPr id="45" name="Straight Arrow Connector 44"/>
+          <p:cNvCxnSpPr>
+            <a:endCxn id="22" idx="5"/>
+          </p:cNvCxnSpPr>
+          <p:nvPr/>
+        </p:nvCxnSpPr>
+        <p:spPr>
+          <a:xfrm rot="5400000" flipH="1" flipV="1">
+            <a:off x="7028891" y="3821161"/>
+            <a:ext cx="732351" cy="7328"/>
+          </a:xfrm>
+          <a:prstGeom prst="straightConnector1">
+            <a:avLst/>
+          </a:prstGeom>
+          <a:ln>
+            <a:solidFill>
+              <a:schemeClr val="tx1"/>
+            </a:solidFill>
+            <a:tailEnd type="arrow"/>
+          </a:ln>
+        </p:spPr>
+        <p:style>
+          <a:lnRef idx="1">
+            <a:schemeClr val="accent1"/>
+          </a:lnRef>
+          <a:fillRef idx="0">
+            <a:schemeClr val="accent1"/>
+          </a:fillRef>
+          <a:effectRef idx="0">
+            <a:schemeClr val="accent1"/>
+          </a:effectRef>
+          <a:fontRef idx="minor">
+            <a:schemeClr val="tx1"/>
+          </a:fontRef>
+        </p:style>
+      </p:cxnSp>
+      <p:cxnSp>
+        <p:nvCxnSpPr>
+          <p:cNvPr id="51" name="Straight Arrow Connector 50"/>
+          <p:cNvCxnSpPr>
+            <a:stCxn id="22" idx="3"/>
+          </p:cNvCxnSpPr>
+          <p:nvPr/>
+        </p:nvCxnSpPr>
+        <p:spPr>
+          <a:xfrm rot="16200000" flipH="1">
+            <a:off x="6297660" y="3859259"/>
+            <a:ext cx="808553" cy="7332"/>
+          </a:xfrm>
+          <a:prstGeom prst="straightConnector1">
+            <a:avLst/>
+          </a:prstGeom>
+          <a:ln>
+            <a:solidFill>
+              <a:schemeClr val="tx1"/>
+            </a:solidFill>
+            <a:tailEnd type="arrow"/>
+          </a:ln>
+        </p:spPr>
+        <p:style>
+          <a:lnRef idx="1">
+            <a:schemeClr val="accent1"/>
+          </a:lnRef>
+          <a:fillRef idx="0">
+            <a:schemeClr val="accent1"/>
+          </a:fillRef>
+          <a:effectRef idx="0">
+            <a:schemeClr val="accent1"/>
+          </a:effectRef>
+          <a:fontRef idx="minor">
+            <a:schemeClr val="tx1"/>
+          </a:fontRef>
+        </p:style>
+      </p:cxnSp>
+      <p:sp>
+        <p:nvSpPr>
+          <p:cNvPr id="53" name="TextBox 52"/>
+          <p:cNvSpPr txBox="1"/>
+          <p:nvPr/>
+        </p:nvSpPr>
+        <p:spPr>
+          <a:xfrm>
+            <a:off x="6019800" y="3505200"/>
+            <a:ext cx="720069" cy="738664"/>
+          </a:xfrm>
+          <a:prstGeom prst="rect">
+            <a:avLst/>
+          </a:prstGeom>
+          <a:noFill/>
+        </p:spPr>
+        <p:txBody>
+          <a:bodyPr wrap="none" rtlCol="0">
+            <a:spAutoFit/>
+          </a:bodyPr>
+          <a:lstStyle/>
+          <a:p>
+            <a:r>
+              <a:rPr lang="en-US" sz="1400" dirty="0" smtClean="0"/>
+              <a:t>Lesson </a:t>
+            </a:r>
+            <a:endParaRPr lang="en-US" sz="1400" dirty="0" smtClean="0"/>
+          </a:p>
+          <a:p>
+            <a:r>
+              <a:rPr lang="en-US" sz="1400" dirty="0" smtClean="0"/>
+              <a:t>Status </a:t>
+            </a:r>
+          </a:p>
+          <a:p>
+            <a:r>
+              <a:rPr lang="en-US" sz="1400" dirty="0" smtClean="0"/>
+              <a:t>Info</a:t>
+            </a:r>
+            <a:endParaRPr lang="en-US" sz="1400" dirty="0"/>
+          </a:p>
+        </p:txBody>
+      </p:sp>
+      <p:sp>
+        <p:nvSpPr>
+          <p:cNvPr id="87" name="TextBox 86"/>
+          <p:cNvSpPr txBox="1"/>
+          <p:nvPr/>
+        </p:nvSpPr>
+        <p:spPr>
+          <a:xfrm>
+            <a:off x="2286000" y="3429000"/>
+            <a:ext cx="1235146" cy="307777"/>
+          </a:xfrm>
+          <a:prstGeom prst="rect">
+            <a:avLst/>
+          </a:prstGeom>
+          <a:noFill/>
+        </p:spPr>
+        <p:txBody>
+          <a:bodyPr wrap="none" rtlCol="0">
+            <a:spAutoFit/>
+          </a:bodyPr>
+          <a:lstStyle/>
+          <a:p>
+            <a:r>
+              <a:rPr lang="en-US" sz="1400" dirty="0" smtClean="0"/>
+              <a:t>Request result</a:t>
+            </a:r>
+            <a:endParaRPr lang="en-US" dirty="0"/>
+          </a:p>
+        </p:txBody>
+      </p:sp>
+      <p:cxnSp>
+        <p:nvCxnSpPr>
+          <p:cNvPr id="71" name="Elbow Connector 70"/>
+          <p:cNvCxnSpPr>
+            <a:stCxn id="68" idx="6"/>
+            <a:endCxn id="22" idx="1"/>
+          </p:cNvCxnSpPr>
+          <p:nvPr/>
+        </p:nvCxnSpPr>
+        <p:spPr>
+          <a:xfrm>
+            <a:off x="5410200" y="1409700"/>
+            <a:ext cx="1288070" cy="1456251"/>
+          </a:xfrm>
+          <a:prstGeom prst="bentConnector2">
+            <a:avLst/>
+          </a:prstGeom>
+          <a:ln>
+            <a:solidFill>
+              <a:schemeClr val="tx1"/>
+            </a:solidFill>
+            <a:tailEnd type="arrow"/>
+          </a:ln>
+        </p:spPr>
+        <p:style>
+          <a:lnRef idx="1">
+            <a:schemeClr val="accent1"/>
+          </a:lnRef>
+          <a:fillRef idx="0">
+            <a:schemeClr val="accent1"/>
+          </a:fillRef>
+          <a:effectRef idx="0">
+            <a:schemeClr val="accent1"/>
+          </a:effectRef>
+          <a:fontRef idx="minor">
+            <a:schemeClr val="tx1"/>
+          </a:fontRef>
+        </p:style>
+      </p:cxnSp>
+      <p:grpSp>
+        <p:nvGrpSpPr>
+          <p:cNvPr id="24" name="Group 72"/>
+          <p:cNvGrpSpPr/>
+          <p:nvPr/>
+        </p:nvGrpSpPr>
+        <p:grpSpPr>
+          <a:xfrm>
+            <a:off x="6781800" y="6172200"/>
+            <a:ext cx="1676400" cy="457200"/>
+            <a:chOff x="304800" y="1676400"/>
+            <a:chExt cx="1676400" cy="457200"/>
+          </a:xfrm>
+        </p:grpSpPr>
+        <p:sp>
+          <p:nvSpPr>
+            <p:cNvPr id="74" name="Rectangle 73"/>
+            <p:cNvSpPr/>
+            <p:nvPr/>
+          </p:nvSpPr>
+          <p:spPr>
+            <a:xfrm>
+              <a:off x="304800" y="1676400"/>
+              <a:ext cx="1676400" cy="457200"/>
+            </a:xfrm>
+            <a:prstGeom prst="rect">
+              <a:avLst/>
+            </a:prstGeom>
+            <a:noFill/>
+            <a:ln>
+              <a:solidFill>
+                <a:schemeClr val="tx1"/>
+              </a:solidFill>
+            </a:ln>
+          </p:spPr>
+          <p:style>
+            <a:lnRef idx="2">
+              <a:schemeClr val="accent1">
+                <a:shade val="50000"/>
+              </a:schemeClr>
+            </a:lnRef>
+            <a:fillRef idx="1">
+              <a:schemeClr val="accent1"/>
+            </a:fillRef>
+            <a:effectRef idx="0">
+              <a:schemeClr val="accent1"/>
+            </a:effectRef>
+            <a:fontRef idx="minor">
+              <a:schemeClr val="lt1"/>
+            </a:fontRef>
+          </p:style>
+          <p:txBody>
+            <a:bodyPr rtlCol="0" anchor="ctr"/>
+            <a:lstStyle/>
+            <a:p>
+              <a:pPr algn="ctr"/>
+              <a:endParaRPr lang="en-US"/>
+            </a:p>
+          </p:txBody>
+        </p:sp>
+        <p:sp>
+          <p:nvSpPr>
+            <p:cNvPr id="76" name="TextBox 75"/>
+            <p:cNvSpPr txBox="1"/>
+            <p:nvPr/>
+          </p:nvSpPr>
+          <p:spPr>
+            <a:xfrm>
+              <a:off x="762000" y="1752600"/>
+              <a:ext cx="1218667" cy="307777"/>
+            </a:xfrm>
+            <a:prstGeom prst="rect">
+              <a:avLst/>
+            </a:prstGeom>
+            <a:noFill/>
+          </p:spPr>
+          <p:txBody>
+            <a:bodyPr wrap="none" rtlCol="0">
+              <a:spAutoFit/>
+            </a:bodyPr>
+            <a:lstStyle/>
+            <a:p>
+              <a:r>
+                <a:rPr lang="en-US" sz="1400" dirty="0" smtClean="0"/>
+                <a:t>Lesson Details</a:t>
+              </a:r>
+            </a:p>
+          </p:txBody>
+        </p:sp>
+        <p:cxnSp>
+          <p:nvCxnSpPr>
+            <p:cNvPr id="77" name="Straight Connector 76"/>
+            <p:cNvCxnSpPr/>
+            <p:nvPr/>
+          </p:nvCxnSpPr>
+          <p:spPr>
+            <a:xfrm rot="5400000">
+              <a:off x="457994" y="1904206"/>
+              <a:ext cx="456406" cy="794"/>
+            </a:xfrm>
+            <a:prstGeom prst="line">
+              <a:avLst/>
+            </a:prstGeom>
+            <a:ln>
+              <a:solidFill>
+                <a:schemeClr val="tx1"/>
+              </a:solidFill>
+            </a:ln>
+          </p:spPr>
+          <p:style>
+            <a:lnRef idx="1">
+              <a:schemeClr val="accent1"/>
+            </a:lnRef>
+            <a:fillRef idx="0">
+              <a:schemeClr val="accent1"/>
+            </a:fillRef>
+            <a:effectRef idx="0">
+              <a:schemeClr val="accent1"/>
+            </a:effectRef>
+            <a:fontRef idx="minor">
+              <a:schemeClr val="tx1"/>
+            </a:fontRef>
+          </p:style>
+        </p:cxnSp>
+        <p:sp>
+          <p:nvSpPr>
+            <p:cNvPr id="80" name="TextBox 79"/>
+            <p:cNvSpPr txBox="1"/>
+            <p:nvPr/>
+          </p:nvSpPr>
+          <p:spPr>
+            <a:xfrm>
+              <a:off x="304800" y="1752600"/>
+              <a:ext cx="386644" cy="307777"/>
+            </a:xfrm>
+            <a:prstGeom prst="rect">
+              <a:avLst/>
+            </a:prstGeom>
+            <a:noFill/>
+          </p:spPr>
+          <p:txBody>
+            <a:bodyPr wrap="none" rtlCol="0">
+              <a:spAutoFit/>
+            </a:bodyPr>
+            <a:lstStyle/>
+            <a:p>
+              <a:r>
+                <a:rPr lang="en-US" sz="1400" dirty="0" smtClean="0"/>
+                <a:t>D2</a:t>
+              </a:r>
+              <a:endParaRPr lang="en-US" sz="1400" dirty="0"/>
+            </a:p>
+          </p:txBody>
+        </p:sp>
+      </p:grpSp>
+      <p:cxnSp>
+        <p:nvCxnSpPr>
+          <p:cNvPr id="83" name="Straight Arrow Connector 82"/>
+          <p:cNvCxnSpPr/>
+          <p:nvPr/>
+        </p:nvCxnSpPr>
+        <p:spPr>
+          <a:xfrm rot="5400000" flipH="1" flipV="1">
+            <a:off x="7201694" y="5752306"/>
+            <a:ext cx="838200" cy="1588"/>
+          </a:xfrm>
+          <a:prstGeom prst="straightConnector1">
+            <a:avLst/>
+          </a:prstGeom>
+          <a:ln>
+            <a:solidFill>
+              <a:schemeClr val="tx1"/>
+            </a:solidFill>
+            <a:tailEnd type="arrow"/>
+          </a:ln>
+        </p:spPr>
+        <p:style>
+          <a:lnRef idx="1">
+            <a:schemeClr val="accent1"/>
+          </a:lnRef>
+          <a:fillRef idx="0">
+            <a:schemeClr val="accent1"/>
+          </a:fillRef>
+          <a:effectRef idx="0">
+            <a:schemeClr val="accent1"/>
+          </a:effectRef>
+          <a:fontRef idx="minor">
+            <a:schemeClr val="tx1"/>
+          </a:fontRef>
+        </p:style>
+      </p:cxnSp>
+      <p:sp>
+        <p:nvSpPr>
+          <p:cNvPr id="85" name="TextBox 84"/>
+          <p:cNvSpPr txBox="1"/>
+          <p:nvPr/>
+        </p:nvSpPr>
+        <p:spPr>
+          <a:xfrm>
+            <a:off x="7620000" y="5562600"/>
+            <a:ext cx="667234" cy="523220"/>
+          </a:xfrm>
+          <a:prstGeom prst="rect">
+            <a:avLst/>
+          </a:prstGeom>
+          <a:noFill/>
+        </p:spPr>
+        <p:txBody>
+          <a:bodyPr wrap="none" rtlCol="0">
+            <a:spAutoFit/>
+          </a:bodyPr>
+          <a:lstStyle/>
+          <a:p>
+            <a:r>
+              <a:rPr lang="en-US" sz="1400" dirty="0" smtClean="0"/>
+              <a:t>Get </a:t>
+            </a:r>
+          </a:p>
+          <a:p>
+            <a:r>
+              <a:rPr lang="en-US" sz="1400" dirty="0" smtClean="0"/>
+              <a:t>details</a:t>
+            </a:r>
+            <a:endParaRPr lang="en-US" sz="1400" dirty="0"/>
+          </a:p>
+        </p:txBody>
+      </p:sp>
+      <p:grpSp>
+        <p:nvGrpSpPr>
+          <p:cNvPr id="67" name="Group 17"/>
+          <p:cNvGrpSpPr/>
+          <p:nvPr/>
+        </p:nvGrpSpPr>
+        <p:grpSpPr>
+          <a:xfrm>
+            <a:off x="4419600" y="990600"/>
+            <a:ext cx="990600" cy="838200"/>
+            <a:chOff x="1219200" y="5029200"/>
+            <a:chExt cx="990600" cy="838200"/>
+          </a:xfrm>
+        </p:grpSpPr>
+        <p:sp>
+          <p:nvSpPr>
+            <p:cNvPr id="68" name="Oval 31"/>
+            <p:cNvSpPr>
+              <a:spLocks noChangeArrowheads="1"/>
+            </p:cNvSpPr>
+            <p:nvPr/>
+          </p:nvSpPr>
+          <p:spPr bwMode="auto">
+            <a:xfrm>
+              <a:off x="1219200" y="5029200"/>
+              <a:ext cx="990600" cy="838200"/>
+            </a:xfrm>
+            <a:prstGeom prst="ellipse">
+              <a:avLst/>
+            </a:prstGeom>
+            <a:noFill/>
+            <a:ln w="9525">
+              <a:solidFill>
+                <a:schemeClr val="tx1"/>
+              </a:solidFill>
+              <a:round/>
+              <a:headEnd/>
+              <a:tailEnd/>
+            </a:ln>
+            <a:effectLst/>
+          </p:spPr>
+          <p:txBody>
+            <a:bodyPr wrap="none" anchor="ctr"/>
+            <a:lstStyle/>
+            <a:p>
+              <a:pPr algn="ctr"/>
+              <a:endParaRPr lang="en-US" sz="1400" dirty="0" smtClean="0"/>
+            </a:p>
+            <a:p>
+              <a:pPr algn="ctr"/>
+              <a:r>
+                <a:rPr lang="en-US" sz="1400" dirty="0" smtClean="0"/>
+                <a:t>Audio</a:t>
+              </a:r>
+              <a:endParaRPr lang="en-US" sz="1400" dirty="0" smtClean="0"/>
+            </a:p>
+            <a:p>
+              <a:pPr algn="ctr"/>
+              <a:r>
+                <a:rPr lang="en-US" sz="1400" dirty="0" smtClean="0"/>
+                <a:t>request</a:t>
+              </a:r>
+              <a:endParaRPr lang="en-US" sz="1400" dirty="0" smtClean="0"/>
+            </a:p>
+          </p:txBody>
+        </p:sp>
+        <p:sp>
+          <p:nvSpPr>
+            <p:cNvPr id="69" name="TextBox 68"/>
+            <p:cNvSpPr txBox="1"/>
+            <p:nvPr/>
+          </p:nvSpPr>
+          <p:spPr>
+            <a:xfrm>
+              <a:off x="1447800" y="5029200"/>
+              <a:ext cx="476412" cy="369332"/>
+            </a:xfrm>
+            <a:prstGeom prst="rect">
+              <a:avLst/>
+            </a:prstGeom>
+            <a:noFill/>
+          </p:spPr>
+          <p:txBody>
+            <a:bodyPr wrap="none" rtlCol="0">
+              <a:spAutoFit/>
+            </a:bodyPr>
+            <a:lstStyle/>
+            <a:p>
+              <a:r>
+                <a:rPr lang="en-US" dirty="0" smtClean="0"/>
+                <a:t>3</a:t>
+              </a:r>
+              <a:r>
+                <a:rPr lang="en-US" dirty="0" smtClean="0"/>
+                <a:t>.2</a:t>
+              </a:r>
+              <a:endParaRPr lang="en-US" dirty="0"/>
+            </a:p>
+          </p:txBody>
+        </p:sp>
+      </p:grpSp>
+      <p:sp>
+        <p:nvSpPr>
+          <p:cNvPr id="81" name="TextBox 80"/>
+          <p:cNvSpPr txBox="1"/>
+          <p:nvPr/>
+        </p:nvSpPr>
+        <p:spPr>
+          <a:xfrm>
+            <a:off x="5791200" y="1371600"/>
+            <a:ext cx="922047" cy="523220"/>
+          </a:xfrm>
+          <a:prstGeom prst="rect">
+            <a:avLst/>
+          </a:prstGeom>
+          <a:noFill/>
+        </p:spPr>
+        <p:txBody>
+          <a:bodyPr wrap="none" rtlCol="0">
+            <a:spAutoFit/>
+          </a:bodyPr>
+          <a:lstStyle/>
+          <a:p>
+            <a:r>
+              <a:rPr lang="en-US" sz="1400" dirty="0" smtClean="0"/>
+              <a:t>Resource </a:t>
+            </a:r>
+          </a:p>
+          <a:p>
+            <a:r>
+              <a:rPr lang="en-US" sz="1400" dirty="0" smtClean="0"/>
+              <a:t>info check</a:t>
+            </a:r>
+            <a:endParaRPr lang="en-US" dirty="0"/>
+          </a:p>
+        </p:txBody>
+      </p:sp>
+      <p:cxnSp>
+        <p:nvCxnSpPr>
+          <p:cNvPr id="89" name="Shape 88"/>
+          <p:cNvCxnSpPr>
+            <a:stCxn id="8" idx="3"/>
+            <a:endCxn id="69" idx="0"/>
+          </p:cNvCxnSpPr>
+          <p:nvPr/>
+        </p:nvCxnSpPr>
+        <p:spPr>
+          <a:xfrm>
+            <a:off x="2895600" y="876300"/>
+            <a:ext cx="1990806" cy="114300"/>
+          </a:xfrm>
+          <a:prstGeom prst="bentConnector2">
+            <a:avLst/>
+          </a:prstGeom>
+          <a:ln>
+            <a:solidFill>
+              <a:schemeClr val="tx1"/>
+            </a:solidFill>
+            <a:tailEnd type="arrow"/>
+          </a:ln>
+        </p:spPr>
+        <p:style>
+          <a:lnRef idx="1">
+            <a:schemeClr val="accent1"/>
+          </a:lnRef>
+          <a:fillRef idx="0">
+            <a:schemeClr val="accent1"/>
+          </a:fillRef>
+          <a:effectRef idx="0">
+            <a:schemeClr val="accent1"/>
+          </a:effectRef>
+          <a:fontRef idx="minor">
+            <a:schemeClr val="tx1"/>
+          </a:fontRef>
+        </p:style>
+      </p:cxnSp>
+      <p:sp>
+        <p:nvSpPr>
+          <p:cNvPr id="90" name="TextBox 89"/>
+          <p:cNvSpPr txBox="1"/>
+          <p:nvPr/>
+        </p:nvSpPr>
+        <p:spPr>
+          <a:xfrm>
+            <a:off x="2895600" y="609600"/>
+            <a:ext cx="1843197" cy="307777"/>
+          </a:xfrm>
+          <a:prstGeom prst="rect">
+            <a:avLst/>
+          </a:prstGeom>
+          <a:noFill/>
+        </p:spPr>
+        <p:txBody>
+          <a:bodyPr wrap="none" rtlCol="0">
+            <a:spAutoFit/>
+          </a:bodyPr>
+          <a:lstStyle/>
+          <a:p>
+            <a:r>
+              <a:rPr lang="en-US" sz="1400" dirty="0" smtClean="0"/>
+              <a:t>Apply for audio lesson </a:t>
+            </a:r>
+            <a:endParaRPr lang="en-US" dirty="0"/>
+          </a:p>
+        </p:txBody>
+      </p:sp>
+      <p:grpSp>
+        <p:nvGrpSpPr>
+          <p:cNvPr id="122" name="Group 17"/>
+          <p:cNvGrpSpPr/>
+          <p:nvPr/>
+        </p:nvGrpSpPr>
+        <p:grpSpPr>
+          <a:xfrm>
+            <a:off x="4724400" y="1981200"/>
+            <a:ext cx="990600" cy="838200"/>
+            <a:chOff x="1219200" y="5029200"/>
+            <a:chExt cx="990600" cy="838200"/>
+          </a:xfrm>
+        </p:grpSpPr>
+        <p:sp>
+          <p:nvSpPr>
+            <p:cNvPr id="123" name="Oval 31"/>
+            <p:cNvSpPr>
+              <a:spLocks noChangeArrowheads="1"/>
+            </p:cNvSpPr>
+            <p:nvPr/>
+          </p:nvSpPr>
+          <p:spPr bwMode="auto">
+            <a:xfrm>
+              <a:off x="1219200" y="5029200"/>
+              <a:ext cx="990600" cy="838200"/>
+            </a:xfrm>
+            <a:prstGeom prst="ellipse">
+              <a:avLst/>
+            </a:prstGeom>
+            <a:noFill/>
+            <a:ln w="9525">
+              <a:solidFill>
+                <a:schemeClr val="tx1"/>
+              </a:solidFill>
+              <a:round/>
+              <a:headEnd/>
+              <a:tailEnd/>
+            </a:ln>
+            <a:effectLst/>
+          </p:spPr>
+          <p:txBody>
+            <a:bodyPr wrap="none" anchor="ctr"/>
+            <a:lstStyle/>
+            <a:p>
+              <a:pPr algn="ctr"/>
+              <a:endParaRPr lang="en-US" sz="1400" dirty="0" smtClean="0"/>
+            </a:p>
+            <a:p>
+              <a:pPr algn="ctr"/>
+              <a:r>
+                <a:rPr lang="en-US" sz="1400" dirty="0" smtClean="0"/>
+                <a:t>Drawing</a:t>
+              </a:r>
+              <a:endParaRPr lang="en-US" sz="1400" dirty="0" smtClean="0"/>
+            </a:p>
+            <a:p>
+              <a:pPr algn="ctr"/>
+              <a:r>
+                <a:rPr lang="en-US" sz="1400" dirty="0" smtClean="0"/>
+                <a:t>request</a:t>
+              </a:r>
+              <a:endParaRPr lang="en-US" sz="1400" dirty="0" smtClean="0"/>
+            </a:p>
+          </p:txBody>
+        </p:sp>
+        <p:sp>
+          <p:nvSpPr>
+            <p:cNvPr id="124" name="TextBox 123"/>
+            <p:cNvSpPr txBox="1"/>
+            <p:nvPr/>
+          </p:nvSpPr>
+          <p:spPr>
+            <a:xfrm>
+              <a:off x="1447800" y="5029200"/>
+              <a:ext cx="476412" cy="369332"/>
+            </a:xfrm>
+            <a:prstGeom prst="rect">
+              <a:avLst/>
+            </a:prstGeom>
+            <a:noFill/>
+          </p:spPr>
+          <p:txBody>
+            <a:bodyPr wrap="none" rtlCol="0">
+              <a:spAutoFit/>
+            </a:bodyPr>
+            <a:lstStyle/>
+            <a:p>
+              <a:r>
+                <a:rPr lang="en-US" dirty="0" smtClean="0"/>
+                <a:t>3</a:t>
+              </a:r>
+              <a:r>
+                <a:rPr lang="en-US" dirty="0" smtClean="0"/>
+                <a:t>.4</a:t>
+              </a:r>
+              <a:endParaRPr lang="en-US" dirty="0"/>
+            </a:p>
+          </p:txBody>
+        </p:sp>
+      </p:grpSp>
+      <p:grpSp>
+        <p:nvGrpSpPr>
+          <p:cNvPr id="125" name="Group 17"/>
+          <p:cNvGrpSpPr/>
+          <p:nvPr/>
+        </p:nvGrpSpPr>
+        <p:grpSpPr>
+          <a:xfrm>
+            <a:off x="2895600" y="2438400"/>
+            <a:ext cx="990600" cy="838200"/>
+            <a:chOff x="1219200" y="5029200"/>
+            <a:chExt cx="990600" cy="838200"/>
+          </a:xfrm>
+        </p:grpSpPr>
+        <p:sp>
+          <p:nvSpPr>
+            <p:cNvPr id="126" name="Oval 31"/>
+            <p:cNvSpPr>
+              <a:spLocks noChangeArrowheads="1"/>
+            </p:cNvSpPr>
+            <p:nvPr/>
+          </p:nvSpPr>
+          <p:spPr bwMode="auto">
+            <a:xfrm>
+              <a:off x="1219200" y="5029200"/>
+              <a:ext cx="990600" cy="838200"/>
+            </a:xfrm>
+            <a:prstGeom prst="ellipse">
+              <a:avLst/>
+            </a:prstGeom>
+            <a:noFill/>
+            <a:ln w="9525">
+              <a:solidFill>
+                <a:schemeClr val="tx1"/>
+              </a:solidFill>
+              <a:round/>
+              <a:headEnd/>
+              <a:tailEnd/>
+            </a:ln>
+            <a:effectLst/>
+          </p:spPr>
+          <p:txBody>
+            <a:bodyPr wrap="none" anchor="ctr"/>
+            <a:lstStyle/>
+            <a:p>
+              <a:pPr algn="ctr"/>
+              <a:endParaRPr lang="en-US" sz="1400" dirty="0" smtClean="0"/>
+            </a:p>
+            <a:p>
+              <a:pPr algn="ctr"/>
+              <a:r>
+                <a:rPr lang="en-US" sz="1400" dirty="0" smtClean="0"/>
+                <a:t>Text</a:t>
+              </a:r>
+              <a:endParaRPr lang="en-US" sz="1400" dirty="0" smtClean="0"/>
+            </a:p>
+            <a:p>
+              <a:pPr algn="ctr"/>
+              <a:r>
+                <a:rPr lang="en-US" sz="1400" dirty="0" smtClean="0"/>
+                <a:t>request</a:t>
+              </a:r>
+              <a:endParaRPr lang="en-US" sz="1400" dirty="0" smtClean="0"/>
+            </a:p>
+          </p:txBody>
+        </p:sp>
+        <p:sp>
+          <p:nvSpPr>
+            <p:cNvPr id="127" name="TextBox 126"/>
+            <p:cNvSpPr txBox="1"/>
+            <p:nvPr/>
+          </p:nvSpPr>
+          <p:spPr>
+            <a:xfrm>
+              <a:off x="1447800" y="5029200"/>
+              <a:ext cx="476412" cy="369332"/>
+            </a:xfrm>
+            <a:prstGeom prst="rect">
+              <a:avLst/>
+            </a:prstGeom>
+            <a:noFill/>
+          </p:spPr>
+          <p:txBody>
+            <a:bodyPr wrap="none" rtlCol="0">
+              <a:spAutoFit/>
+            </a:bodyPr>
+            <a:lstStyle/>
+            <a:p>
+              <a:r>
+                <a:rPr lang="en-US" dirty="0" smtClean="0"/>
+                <a:t>3</a:t>
+              </a:r>
+              <a:r>
+                <a:rPr lang="en-US" dirty="0" smtClean="0"/>
+                <a:t>.5</a:t>
+              </a:r>
+              <a:endParaRPr lang="en-US" dirty="0"/>
+            </a:p>
+          </p:txBody>
+        </p:sp>
+      </p:grpSp>
+      <p:cxnSp>
+        <p:nvCxnSpPr>
+          <p:cNvPr id="138" name="Elbow Connector 137"/>
+          <p:cNvCxnSpPr/>
+          <p:nvPr/>
+        </p:nvCxnSpPr>
+        <p:spPr>
+          <a:xfrm>
+            <a:off x="2743200" y="1066800"/>
+            <a:ext cx="2057400" cy="1143000"/>
+          </a:xfrm>
+          <a:prstGeom prst="bentConnector3">
+            <a:avLst>
+              <a:gd name="adj1" fmla="val 249"/>
+            </a:avLst>
+          </a:prstGeom>
+          <a:ln>
+            <a:solidFill>
+              <a:schemeClr val="tx1"/>
+            </a:solidFill>
+            <a:tailEnd type="arrow"/>
+          </a:ln>
+        </p:spPr>
+        <p:style>
+          <a:lnRef idx="1">
+            <a:schemeClr val="accent1"/>
+          </a:lnRef>
+          <a:fillRef idx="0">
+            <a:schemeClr val="accent1"/>
+          </a:fillRef>
+          <a:effectRef idx="0">
+            <a:schemeClr val="accent1"/>
+          </a:effectRef>
+          <a:fontRef idx="minor">
+            <a:schemeClr val="tx1"/>
+          </a:fontRef>
+        </p:style>
+      </p:cxnSp>
+      <p:cxnSp>
+        <p:nvCxnSpPr>
+          <p:cNvPr id="147" name="Straight Arrow Connector 146"/>
+          <p:cNvCxnSpPr/>
+          <p:nvPr/>
+        </p:nvCxnSpPr>
+        <p:spPr>
+          <a:xfrm rot="5400000" flipH="1" flipV="1">
+            <a:off x="724694" y="2247106"/>
+            <a:ext cx="2362200" cy="1588"/>
+          </a:xfrm>
+          <a:prstGeom prst="straightConnector1">
+            <a:avLst/>
+          </a:prstGeom>
+          <a:ln>
+            <a:solidFill>
+              <a:schemeClr val="tx1"/>
+            </a:solidFill>
+            <a:tailEnd type="arrow"/>
+          </a:ln>
+        </p:spPr>
+        <p:style>
+          <a:lnRef idx="1">
+            <a:schemeClr val="accent1"/>
+          </a:lnRef>
+          <a:fillRef idx="0">
+            <a:schemeClr val="accent1"/>
+          </a:fillRef>
+          <a:effectRef idx="0">
+            <a:schemeClr val="accent1"/>
+          </a:effectRef>
+          <a:fontRef idx="minor">
+            <a:schemeClr val="tx1"/>
+          </a:fontRef>
+        </p:style>
+      </p:cxnSp>
+      <p:cxnSp>
+        <p:nvCxnSpPr>
+          <p:cNvPr id="150" name="Straight Connector 149"/>
+          <p:cNvCxnSpPr>
+            <a:stCxn id="22" idx="3"/>
+          </p:cNvCxnSpPr>
+          <p:nvPr/>
+        </p:nvCxnSpPr>
+        <p:spPr>
+          <a:xfrm rot="5400000" flipH="1">
+            <a:off x="4286810" y="1047190"/>
+            <a:ext cx="29649" cy="4793270"/>
+          </a:xfrm>
+          <a:prstGeom prst="line">
+            <a:avLst/>
+          </a:prstGeom>
+          <a:ln>
+            <a:solidFill>
+              <a:schemeClr val="tx1"/>
+            </a:solidFill>
+          </a:ln>
+        </p:spPr>
+        <p:style>
+          <a:lnRef idx="1">
+            <a:schemeClr val="accent1"/>
+          </a:lnRef>
+          <a:fillRef idx="0">
+            <a:schemeClr val="accent1"/>
+          </a:fillRef>
+          <a:effectRef idx="0">
+            <a:schemeClr val="accent1"/>
+          </a:effectRef>
+          <a:fontRef idx="minor">
+            <a:schemeClr val="tx1"/>
+          </a:fontRef>
+        </p:style>
+      </p:cxnSp>
+      <p:cxnSp>
+        <p:nvCxnSpPr>
+          <p:cNvPr id="157" name="Shape 156"/>
+          <p:cNvCxnSpPr>
+            <a:stCxn id="8" idx="2"/>
+            <a:endCxn id="126" idx="2"/>
+          </p:cNvCxnSpPr>
+          <p:nvPr/>
+        </p:nvCxnSpPr>
+        <p:spPr>
+          <a:xfrm rot="16200000" flipH="1">
+            <a:off x="1733550" y="1695450"/>
+            <a:ext cx="1790700" cy="533400"/>
+          </a:xfrm>
+          <a:prstGeom prst="bentConnector2">
+            <a:avLst/>
+          </a:prstGeom>
+          <a:ln>
+            <a:solidFill>
+              <a:schemeClr val="tx1"/>
+            </a:solidFill>
+            <a:tailEnd type="arrow"/>
+          </a:ln>
+        </p:spPr>
+        <p:style>
+          <a:lnRef idx="1">
+            <a:schemeClr val="accent1"/>
+          </a:lnRef>
+          <a:fillRef idx="0">
+            <a:schemeClr val="accent1"/>
+          </a:fillRef>
+          <a:effectRef idx="0">
+            <a:schemeClr val="accent1"/>
+          </a:effectRef>
+          <a:fontRef idx="minor">
+            <a:schemeClr val="tx1"/>
+          </a:fontRef>
+        </p:style>
+      </p:cxnSp>
+      <p:cxnSp>
+        <p:nvCxnSpPr>
+          <p:cNvPr id="159" name="Elbow Connector 158"/>
+          <p:cNvCxnSpPr/>
+          <p:nvPr/>
+        </p:nvCxnSpPr>
+        <p:spPr>
+          <a:xfrm>
+            <a:off x="3886200" y="3048000"/>
+            <a:ext cx="2667000" cy="1588"/>
+          </a:xfrm>
+          <a:prstGeom prst="bentConnector3">
+            <a:avLst>
+              <a:gd name="adj1" fmla="val 50000"/>
+            </a:avLst>
+          </a:prstGeom>
+          <a:ln>
+            <a:solidFill>
+              <a:schemeClr val="tx1"/>
+            </a:solidFill>
+            <a:tailEnd type="arrow"/>
+          </a:ln>
+        </p:spPr>
+        <p:style>
+          <a:lnRef idx="1">
+            <a:schemeClr val="accent1"/>
+          </a:lnRef>
+          <a:fillRef idx="0">
+            <a:schemeClr val="accent1"/>
+          </a:fillRef>
+          <a:effectRef idx="0">
+            <a:schemeClr val="accent1"/>
+          </a:effectRef>
+          <a:fontRef idx="minor">
+            <a:schemeClr val="tx1"/>
+          </a:fontRef>
+        </p:style>
+      </p:cxnSp>
+      <p:sp>
+        <p:nvSpPr>
+          <p:cNvPr id="162" name="TextBox 161"/>
+          <p:cNvSpPr txBox="1"/>
+          <p:nvPr/>
+        </p:nvSpPr>
+        <p:spPr>
+          <a:xfrm rot="16200000">
+            <a:off x="1352657" y="1905901"/>
+            <a:ext cx="1717265" cy="307777"/>
+          </a:xfrm>
+          <a:prstGeom prst="rect">
+            <a:avLst/>
+          </a:prstGeom>
+          <a:noFill/>
+        </p:spPr>
+        <p:txBody>
+          <a:bodyPr wrap="none" rtlCol="0">
+            <a:spAutoFit/>
+          </a:bodyPr>
+          <a:lstStyle/>
+          <a:p>
+            <a:r>
+              <a:rPr lang="en-US" sz="1400" dirty="0" smtClean="0"/>
+              <a:t>Apply for text lesson </a:t>
+            </a:r>
+            <a:endParaRPr lang="en-US" dirty="0"/>
+          </a:p>
+        </p:txBody>
+      </p:sp>
+      <p:sp>
+        <p:nvSpPr>
+          <p:cNvPr id="163" name="TextBox 162"/>
+          <p:cNvSpPr txBox="1"/>
+          <p:nvPr/>
+        </p:nvSpPr>
+        <p:spPr>
+          <a:xfrm>
+            <a:off x="2895600" y="1905000"/>
+            <a:ext cx="2019464" cy="307777"/>
+          </a:xfrm>
+          <a:prstGeom prst="rect">
+            <a:avLst/>
+          </a:prstGeom>
+          <a:noFill/>
+        </p:spPr>
+        <p:txBody>
+          <a:bodyPr wrap="none" rtlCol="0">
+            <a:spAutoFit/>
+          </a:bodyPr>
+          <a:lstStyle/>
+          <a:p>
+            <a:r>
+              <a:rPr lang="en-US" sz="1400" dirty="0" smtClean="0"/>
+              <a:t>Apply for drawing lesson </a:t>
+            </a:r>
+            <a:endParaRPr lang="en-US" dirty="0"/>
+          </a:p>
+        </p:txBody>
+      </p:sp>
+      <p:sp>
+        <p:nvSpPr>
+          <p:cNvPr id="167" name="TextBox 166"/>
+          <p:cNvSpPr txBox="1"/>
+          <p:nvPr/>
+        </p:nvSpPr>
+        <p:spPr>
+          <a:xfrm>
+            <a:off x="5791200" y="2133600"/>
+            <a:ext cx="962123" cy="738664"/>
+          </a:xfrm>
+          <a:prstGeom prst="rect">
+            <a:avLst/>
+          </a:prstGeom>
+          <a:noFill/>
+        </p:spPr>
+        <p:txBody>
+          <a:bodyPr wrap="none" rtlCol="0">
+            <a:spAutoFit/>
+          </a:bodyPr>
+          <a:lstStyle/>
+          <a:p>
+            <a:r>
+              <a:rPr lang="en-US" sz="1400" dirty="0" smtClean="0"/>
+              <a:t>Resource </a:t>
+            </a:r>
+          </a:p>
+          <a:p>
+            <a:r>
+              <a:rPr lang="en-US" sz="1400" dirty="0" smtClean="0"/>
+              <a:t>         info </a:t>
+            </a:r>
+          </a:p>
+          <a:p>
+            <a:r>
+              <a:rPr lang="en-US" sz="1400" dirty="0" smtClean="0"/>
+              <a:t>         check</a:t>
+            </a:r>
+            <a:endParaRPr lang="en-US" dirty="0"/>
+          </a:p>
+        </p:txBody>
+      </p:sp>
+      <p:sp>
+        <p:nvSpPr>
+          <p:cNvPr id="169" name="TextBox 168"/>
+          <p:cNvSpPr txBox="1"/>
+          <p:nvPr/>
+        </p:nvSpPr>
+        <p:spPr>
+          <a:xfrm>
+            <a:off x="4114800" y="3048000"/>
+            <a:ext cx="1631216" cy="307777"/>
+          </a:xfrm>
+          <a:prstGeom prst="rect">
+            <a:avLst/>
+          </a:prstGeom>
+          <a:noFill/>
+        </p:spPr>
+        <p:txBody>
+          <a:bodyPr wrap="none" rtlCol="0">
+            <a:spAutoFit/>
+          </a:bodyPr>
+          <a:lstStyle/>
+          <a:p>
+            <a:r>
+              <a:rPr lang="en-US" sz="1400" dirty="0" smtClean="0"/>
+              <a:t>Resource info check</a:t>
+            </a:r>
+            <a:endParaRPr lang="en-US" dirty="0"/>
+          </a:p>
+        </p:txBody>
+      </p:sp>
+      <p:cxnSp>
+        <p:nvCxnSpPr>
+          <p:cNvPr id="175" name="Elbow Connector 174"/>
+          <p:cNvCxnSpPr>
+            <a:stCxn id="123" idx="6"/>
+          </p:cNvCxnSpPr>
+          <p:nvPr/>
+        </p:nvCxnSpPr>
+        <p:spPr>
+          <a:xfrm>
+            <a:off x="5715000" y="2400300"/>
+            <a:ext cx="914400" cy="571500"/>
+          </a:xfrm>
+          <a:prstGeom prst="bentConnector3">
+            <a:avLst>
+              <a:gd name="adj1" fmla="val 50000"/>
+            </a:avLst>
+          </a:prstGeom>
+          <a:ln>
+            <a:solidFill>
+              <a:schemeClr val="tx1"/>
+            </a:solidFill>
+            <a:tailEnd type="arrow"/>
+          </a:ln>
+        </p:spPr>
+        <p:style>
+          <a:lnRef idx="1">
+            <a:schemeClr val="accent1"/>
+          </a:lnRef>
+          <a:fillRef idx="0">
+            <a:schemeClr val="accent1"/>
+          </a:fillRef>
+          <a:effectRef idx="0">
+            <a:schemeClr val="accent1"/>
+          </a:effectRef>
+          <a:fontRef idx="minor">
+            <a:schemeClr val="tx1"/>
+          </a:fontRef>
+        </p:style>
+      </p:cxnSp>
     </p:spTree>
   </p:cSld>
   <p:clrMapOvr>

</xml_diff>

<commit_message>
three 1 level dfd added
</commit_message>
<xml_diff>
--- a/report/Child education Diagrams.pptx
+++ b/report/Child education Diagrams.pptx
@@ -9,6 +9,7 @@
     <p:sldId id="257" r:id="rId3"/>
     <p:sldId id="259" r:id="rId4"/>
     <p:sldId id="260" r:id="rId5"/>
+    <p:sldId id="261" r:id="rId6"/>
   </p:sldIdLst>
   <p:sldSz cx="9144000" cy="6858000" type="screen4x3"/>
   <p:notesSz cx="6858000" cy="9144000"/>
@@ -8333,7 +8334,6 @@
                 <a:rPr lang="en-US" sz="1400" dirty="0" smtClean="0"/>
                 <a:t>Free User</a:t>
               </a:r>
-              <a:endParaRPr lang="en-US" sz="1400" dirty="0" smtClean="0"/>
             </a:p>
           </p:txBody>
         </p:sp>
@@ -8429,7 +8429,6 @@
                 <a:rPr lang="en-US" sz="1400" dirty="0" smtClean="0"/>
                 <a:t>request</a:t>
               </a:r>
-              <a:endParaRPr lang="en-US" sz="1400" dirty="0" smtClean="0"/>
             </a:p>
           </p:txBody>
         </p:sp>
@@ -8518,7 +8517,6 @@
                 <a:rPr lang="en-US" sz="1400" dirty="0" smtClean="0"/>
                 <a:t>Verify </a:t>
               </a:r>
-              <a:endParaRPr lang="en-US" sz="1400" dirty="0" smtClean="0"/>
             </a:p>
             <a:p>
               <a:pPr algn="ctr"/>
@@ -8526,7 +8524,6 @@
                 <a:rPr lang="en-US" sz="1400" dirty="0" smtClean="0"/>
                 <a:t>request</a:t>
               </a:r>
-              <a:endParaRPr lang="en-US" sz="1400" dirty="0" smtClean="0"/>
             </a:p>
           </p:txBody>
         </p:sp>
@@ -8845,7 +8842,6 @@
               <a:rPr lang="en-US" sz="1400" dirty="0" smtClean="0"/>
               <a:t>User </a:t>
             </a:r>
-            <a:endParaRPr lang="en-US" sz="1400" dirty="0" smtClean="0"/>
           </a:p>
           <a:p>
             <a:r>
@@ -8922,19 +8918,7 @@
           <a:p>
             <a:r>
               <a:rPr lang="en-US" sz="1400" dirty="0" smtClean="0"/>
-              <a:t>Add </a:t>
-            </a:r>
-            <a:r>
-              <a:rPr lang="en-US" sz="1400" dirty="0" smtClean="0"/>
-              <a:t>Free </a:t>
-            </a:r>
-            <a:r>
-              <a:rPr lang="en-US" sz="1400" dirty="0" smtClean="0"/>
-              <a:t>User </a:t>
-            </a:r>
-            <a:r>
-              <a:rPr lang="en-US" sz="1400" dirty="0" smtClean="0"/>
-              <a:t>details</a:t>
+              <a:t>Add Free User details</a:t>
             </a:r>
             <a:endParaRPr lang="en-US" sz="1400" dirty="0"/>
           </a:p>
@@ -9003,19 +8987,7 @@
           <a:p>
             <a:r>
               <a:rPr lang="en-US" sz="1400" dirty="0" smtClean="0"/>
-              <a:t>Get </a:t>
-            </a:r>
-            <a:r>
-              <a:rPr lang="en-US" sz="1400" dirty="0" smtClean="0"/>
-              <a:t>Free </a:t>
-            </a:r>
-            <a:r>
-              <a:rPr lang="en-US" sz="1400" dirty="0" smtClean="0"/>
-              <a:t>User </a:t>
-            </a:r>
-            <a:r>
-              <a:rPr lang="en-US" sz="1400" dirty="0" smtClean="0"/>
-              <a:t>details</a:t>
+              <a:t>Get Free User details</a:t>
             </a:r>
             <a:endParaRPr lang="en-US" sz="1400" dirty="0"/>
           </a:p>
@@ -9045,17 +9017,8 @@
           <a:p>
             <a:r>
               <a:rPr lang="en-US" sz="1400" dirty="0" smtClean="0"/>
-              <a:t>Adding </a:t>
-            </a:r>
-            <a:r>
-              <a:rPr lang="en-US" sz="1400" dirty="0" smtClean="0"/>
-              <a:t>Free </a:t>
-            </a:r>
-            <a:r>
-              <a:rPr lang="en-US" sz="1400" dirty="0" smtClean="0"/>
-              <a:t>User</a:t>
-            </a:r>
-            <a:endParaRPr lang="en-US" sz="1400" dirty="0" smtClean="0"/>
+              <a:t>Adding Free User</a:t>
+            </a:r>
           </a:p>
         </p:txBody>
       </p:sp>
@@ -9232,7 +9195,6 @@
               <a:rPr lang="en-US" sz="1400" dirty="0" smtClean="0"/>
               <a:t>User Details</a:t>
             </a:r>
-            <a:endParaRPr lang="en-US" sz="1400" dirty="0" smtClean="0"/>
           </a:p>
         </p:txBody>
       </p:sp>
@@ -9288,13 +9250,8 @@
               <a:pPr algn="ctr"/>
               <a:r>
                 <a:rPr lang="en-US" sz="1400" dirty="0" smtClean="0"/>
-                <a:t> </a:t>
+                <a:t> Paid User</a:t>
               </a:r>
-              <a:r>
-                <a:rPr lang="en-US" sz="1400" dirty="0" smtClean="0"/>
-                <a:t>Paid User</a:t>
-              </a:r>
-              <a:endParaRPr lang="en-US" sz="1400" dirty="0" smtClean="0"/>
             </a:p>
           </p:txBody>
         </p:sp>
@@ -9394,15 +9351,7 @@
           <a:p>
             <a:r>
               <a:rPr lang="en-US" sz="1400" dirty="0" smtClean="0"/>
-              <a:t>Adding </a:t>
-            </a:r>
-            <a:r>
-              <a:rPr lang="en-US" sz="1400" dirty="0" smtClean="0"/>
-              <a:t>paid User </a:t>
-            </a:r>
-            <a:r>
-              <a:rPr lang="en-US" sz="1400" dirty="0" smtClean="0"/>
-              <a:t>details</a:t>
+              <a:t>Adding paid User details</a:t>
             </a:r>
             <a:endParaRPr lang="en-US" sz="1400" dirty="0"/>
           </a:p>
@@ -9505,11 +9454,7 @@
           <a:p>
             <a:r>
               <a:rPr lang="en-US" sz="1400" dirty="0" smtClean="0"/>
-              <a:t>Get Paid </a:t>
-            </a:r>
-            <a:r>
-              <a:rPr lang="en-US" sz="1400" dirty="0" smtClean="0"/>
-              <a:t>User details</a:t>
+              <a:t>Get Paid User details</a:t>
             </a:r>
             <a:endParaRPr lang="en-US" sz="1400" dirty="0"/>
           </a:p>
@@ -10300,11 +10245,7 @@
               <a:pPr algn="ctr"/>
               <a:r>
                 <a:rPr lang="en-US" sz="1400" dirty="0" smtClean="0"/>
-                <a:t>V</a:t>
-              </a:r>
-              <a:r>
-                <a:rPr lang="en-US" sz="1400" dirty="0" smtClean="0"/>
-                <a:t>ideo </a:t>
+                <a:t>Video </a:t>
               </a:r>
             </a:p>
             <a:p>
@@ -10313,7 +10254,6 @@
                 <a:rPr lang="en-US" sz="1400" dirty="0" smtClean="0"/>
                 <a:t>request</a:t>
               </a:r>
-              <a:endParaRPr lang="en-US" sz="1400" dirty="0" smtClean="0"/>
             </a:p>
           </p:txBody>
         </p:sp>
@@ -10341,11 +10281,7 @@
             <a:p>
               <a:r>
                 <a:rPr lang="en-US" dirty="0" smtClean="0"/>
-                <a:t>3</a:t>
-              </a:r>
-              <a:r>
-                <a:rPr lang="en-US" dirty="0" smtClean="0"/>
-                <a:t>.1</a:t>
+                <a:t>3.1</a:t>
               </a:r>
               <a:endParaRPr lang="en-US" dirty="0"/>
             </a:p>
@@ -10406,7 +10342,6 @@
                 <a:rPr lang="en-US" sz="1400" dirty="0" smtClean="0"/>
                 <a:t>Verify </a:t>
               </a:r>
-              <a:endParaRPr lang="en-US" sz="1400" dirty="0" smtClean="0"/>
             </a:p>
             <a:p>
               <a:pPr algn="ctr"/>
@@ -10414,7 +10349,6 @@
                 <a:rPr lang="en-US" sz="1400" dirty="0" smtClean="0"/>
                 <a:t>request</a:t>
               </a:r>
-              <a:endParaRPr lang="en-US" sz="1400" dirty="0" smtClean="0"/>
             </a:p>
           </p:txBody>
         </p:sp>
@@ -10442,7 +10376,7 @@
             <a:p>
               <a:r>
                 <a:rPr lang="en-US" dirty="0" smtClean="0"/>
-                <a:t>3.3</a:t>
+                <a:t>3.5</a:t>
               </a:r>
               <a:endParaRPr lang="en-US" dirty="0"/>
             </a:p>
@@ -10669,15 +10603,13 @@
       <p:cxnSp>
         <p:nvCxnSpPr>
           <p:cNvPr id="51" name="Straight Arrow Connector 50"/>
-          <p:cNvCxnSpPr>
-            <a:stCxn id="22" idx="3"/>
-          </p:cNvCxnSpPr>
+          <p:cNvCxnSpPr/>
           <p:nvPr/>
         </p:nvCxnSpPr>
         <p:spPr>
           <a:xfrm rot="16200000" flipH="1">
-            <a:off x="6297660" y="3859259"/>
-            <a:ext cx="808553" cy="7332"/>
+            <a:off x="6533592" y="3905811"/>
+            <a:ext cx="656151" cy="7331"/>
           </a:xfrm>
           <a:prstGeom prst="straightConnector1">
             <a:avLst/>
@@ -10712,7 +10644,7 @@
         </p:nvSpPr>
         <p:spPr>
           <a:xfrm>
-            <a:off x="6019800" y="3505200"/>
+            <a:off x="6172200" y="3581400"/>
             <a:ext cx="720069" cy="738664"/>
           </a:xfrm>
           <a:prstGeom prst="rect">
@@ -10730,7 +10662,6 @@
               <a:rPr lang="en-US" sz="1400" dirty="0" smtClean="0"/>
               <a:t>Lesson </a:t>
             </a:r>
-            <a:endParaRPr lang="en-US" sz="1400" dirty="0" smtClean="0"/>
           </a:p>
           <a:p>
             <a:r>
@@ -11097,7 +11028,6 @@
                 <a:rPr lang="en-US" sz="1400" dirty="0" smtClean="0"/>
                 <a:t>Audio</a:t>
               </a:r>
-              <a:endParaRPr lang="en-US" sz="1400" dirty="0" smtClean="0"/>
             </a:p>
             <a:p>
               <a:pPr algn="ctr"/>
@@ -11105,7 +11035,6 @@
                 <a:rPr lang="en-US" sz="1400" dirty="0" smtClean="0"/>
                 <a:t>request</a:t>
               </a:r>
-              <a:endParaRPr lang="en-US" sz="1400" dirty="0" smtClean="0"/>
             </a:p>
           </p:txBody>
         </p:sp>
@@ -11133,11 +11062,7 @@
             <a:p>
               <a:r>
                 <a:rPr lang="en-US" dirty="0" smtClean="0"/>
-                <a:t>3</a:t>
-              </a:r>
-              <a:r>
-                <a:rPr lang="en-US" dirty="0" smtClean="0"/>
-                <a:t>.2</a:t>
+                <a:t>3.2</a:t>
               </a:r>
               <a:endParaRPr lang="en-US" dirty="0"/>
             </a:p>
@@ -11303,7 +11228,6 @@
                 <a:rPr lang="en-US" sz="1400" dirty="0" smtClean="0"/>
                 <a:t>Drawing</a:t>
               </a:r>
-              <a:endParaRPr lang="en-US" sz="1400" dirty="0" smtClean="0"/>
             </a:p>
             <a:p>
               <a:pPr algn="ctr"/>
@@ -11311,7 +11235,6 @@
                 <a:rPr lang="en-US" sz="1400" dirty="0" smtClean="0"/>
                 <a:t>request</a:t>
               </a:r>
-              <a:endParaRPr lang="en-US" sz="1400" dirty="0" smtClean="0"/>
             </a:p>
           </p:txBody>
         </p:sp>
@@ -11339,11 +11262,7 @@
             <a:p>
               <a:r>
                 <a:rPr lang="en-US" dirty="0" smtClean="0"/>
-                <a:t>3</a:t>
-              </a:r>
-              <a:r>
-                <a:rPr lang="en-US" dirty="0" smtClean="0"/>
-                <a:t>.4</a:t>
+                <a:t>3.4</a:t>
               </a:r>
               <a:endParaRPr lang="en-US" dirty="0"/>
             </a:p>
@@ -11404,7 +11323,6 @@
                 <a:rPr lang="en-US" sz="1400" dirty="0" smtClean="0"/>
                 <a:t>Text</a:t>
               </a:r>
-              <a:endParaRPr lang="en-US" sz="1400" dirty="0" smtClean="0"/>
             </a:p>
             <a:p>
               <a:pPr algn="ctr"/>
@@ -11412,7 +11330,6 @@
                 <a:rPr lang="en-US" sz="1400" dirty="0" smtClean="0"/>
                 <a:t>request</a:t>
               </a:r>
-              <a:endParaRPr lang="en-US" sz="1400" dirty="0" smtClean="0"/>
             </a:p>
           </p:txBody>
         </p:sp>
@@ -11440,11 +11357,7 @@
             <a:p>
               <a:r>
                 <a:rPr lang="en-US" dirty="0" smtClean="0"/>
-                <a:t>3</a:t>
-              </a:r>
-              <a:r>
-                <a:rPr lang="en-US" dirty="0" smtClean="0"/>
-                <a:t>.5</a:t>
+                <a:t>3.3</a:t>
               </a:r>
               <a:endParaRPr lang="en-US" dirty="0"/>
             </a:p>
@@ -11811,6 +11724,1558 @@
           </a:fontRef>
         </p:style>
       </p:cxnSp>
+    </p:spTree>
+  </p:cSld>
+  <p:clrMapOvr>
+    <a:masterClrMapping/>
+  </p:clrMapOvr>
+</p:sld>
+</file>
+
+<file path=ppt/slides/slide5.xml><?xml version="1.0" encoding="utf-8"?>
+<p:sld xmlns:a="http://schemas.openxmlformats.org/drawingml/2006/main" xmlns:r="http://schemas.openxmlformats.org/officeDocument/2006/relationships" xmlns:p="http://schemas.openxmlformats.org/presentationml/2006/main">
+  <p:cSld>
+    <p:spTree>
+      <p:nvGrpSpPr>
+        <p:cNvPr id="1" name=""/>
+        <p:cNvGrpSpPr/>
+        <p:nvPr/>
+      </p:nvGrpSpPr>
+      <p:grpSpPr>
+        <a:xfrm>
+          <a:off x="0" y="0"/>
+          <a:ext cx="0" cy="0"/>
+          <a:chOff x="0" y="0"/>
+          <a:chExt cx="0" cy="0"/>
+        </a:xfrm>
+      </p:grpSpPr>
+      <p:grpSp>
+        <p:nvGrpSpPr>
+          <p:cNvPr id="3" name="Group 14"/>
+          <p:cNvGrpSpPr/>
+          <p:nvPr/>
+        </p:nvGrpSpPr>
+        <p:grpSpPr>
+          <a:xfrm>
+            <a:off x="6324600" y="4191000"/>
+            <a:ext cx="2438400" cy="1219200"/>
+            <a:chOff x="3962400" y="3505200"/>
+            <a:chExt cx="2438400" cy="1219200"/>
+          </a:xfrm>
+        </p:grpSpPr>
+        <p:sp>
+          <p:nvSpPr>
+            <p:cNvPr id="2" name="Oval 1"/>
+            <p:cNvSpPr/>
+            <p:nvPr/>
+          </p:nvSpPr>
+          <p:spPr>
+            <a:xfrm>
+              <a:off x="3962400" y="3505200"/>
+              <a:ext cx="1828800" cy="1219200"/>
+            </a:xfrm>
+            <a:prstGeom prst="ellipse">
+              <a:avLst/>
+            </a:prstGeom>
+            <a:noFill/>
+            <a:ln>
+              <a:solidFill>
+                <a:schemeClr val="tx1"/>
+              </a:solidFill>
+            </a:ln>
+          </p:spPr>
+          <p:style>
+            <a:lnRef idx="2">
+              <a:schemeClr val="accent1">
+                <a:shade val="50000"/>
+              </a:schemeClr>
+            </a:lnRef>
+            <a:fillRef idx="1">
+              <a:schemeClr val="accent1"/>
+            </a:fillRef>
+            <a:effectRef idx="0">
+              <a:schemeClr val="accent1"/>
+            </a:effectRef>
+            <a:fontRef idx="minor">
+              <a:schemeClr val="lt1"/>
+            </a:fontRef>
+          </p:style>
+          <p:txBody>
+            <a:bodyPr rtlCol="0" anchor="ctr"/>
+            <a:lstStyle/>
+            <a:p>
+              <a:pPr algn="ctr"/>
+              <a:endParaRPr lang="en-US"/>
+            </a:p>
+          </p:txBody>
+        </p:sp>
+        <p:sp>
+          <p:nvSpPr>
+            <p:cNvPr id="4" name="Rectangle 3"/>
+            <p:cNvSpPr/>
+            <p:nvPr/>
+          </p:nvSpPr>
+          <p:spPr>
+            <a:xfrm>
+              <a:off x="4572000" y="3886200"/>
+              <a:ext cx="1828800" cy="738664"/>
+            </a:xfrm>
+            <a:prstGeom prst="rect">
+              <a:avLst/>
+            </a:prstGeom>
+          </p:spPr>
+          <p:txBody>
+            <a:bodyPr wrap="square">
+              <a:spAutoFit/>
+            </a:bodyPr>
+            <a:lstStyle/>
+            <a:p>
+              <a:r>
+                <a:rPr lang="en-US" sz="1400" dirty="0" smtClean="0"/>
+                <a:t>Child </a:t>
+              </a:r>
+            </a:p>
+            <a:p>
+              <a:r>
+                <a:rPr lang="en-US" sz="1400" dirty="0" smtClean="0"/>
+                <a:t>Education </a:t>
+              </a:r>
+            </a:p>
+            <a:p>
+              <a:r>
+                <a:rPr lang="en-US" sz="1400" dirty="0" smtClean="0"/>
+                <a:t>System</a:t>
+              </a:r>
+              <a:endParaRPr lang="en-US" sz="1400" dirty="0"/>
+            </a:p>
+          </p:txBody>
+        </p:sp>
+        <p:sp>
+          <p:nvSpPr>
+            <p:cNvPr id="5" name="TextBox 4"/>
+            <p:cNvSpPr txBox="1"/>
+            <p:nvPr/>
+          </p:nvSpPr>
+          <p:spPr>
+            <a:xfrm>
+              <a:off x="4724400" y="3581400"/>
+              <a:ext cx="301686" cy="369332"/>
+            </a:xfrm>
+            <a:prstGeom prst="rect">
+              <a:avLst/>
+            </a:prstGeom>
+            <a:noFill/>
+          </p:spPr>
+          <p:txBody>
+            <a:bodyPr wrap="none" rtlCol="0">
+              <a:spAutoFit/>
+            </a:bodyPr>
+            <a:lstStyle/>
+            <a:p>
+              <a:r>
+                <a:rPr lang="en-US" dirty="0" smtClean="0"/>
+                <a:t>1</a:t>
+              </a:r>
+              <a:endParaRPr lang="en-US" dirty="0"/>
+            </a:p>
+          </p:txBody>
+        </p:sp>
+      </p:grpSp>
+      <p:grpSp>
+        <p:nvGrpSpPr>
+          <p:cNvPr id="6" name="Group 5"/>
+          <p:cNvGrpSpPr/>
+          <p:nvPr/>
+        </p:nvGrpSpPr>
+        <p:grpSpPr>
+          <a:xfrm>
+            <a:off x="1828800" y="685800"/>
+            <a:ext cx="1066800" cy="381000"/>
+            <a:chOff x="4495800" y="914400"/>
+            <a:chExt cx="1066800" cy="381000"/>
+          </a:xfrm>
+        </p:grpSpPr>
+        <p:sp>
+          <p:nvSpPr>
+            <p:cNvPr id="7" name="TextBox 6"/>
+            <p:cNvSpPr txBox="1"/>
+            <p:nvPr/>
+          </p:nvSpPr>
+          <p:spPr>
+            <a:xfrm>
+              <a:off x="4648200" y="914400"/>
+              <a:ext cx="773610" cy="307777"/>
+            </a:xfrm>
+            <a:prstGeom prst="rect">
+              <a:avLst/>
+            </a:prstGeom>
+            <a:noFill/>
+          </p:spPr>
+          <p:txBody>
+            <a:bodyPr wrap="none" rtlCol="0">
+              <a:spAutoFit/>
+            </a:bodyPr>
+            <a:lstStyle/>
+            <a:p>
+              <a:r>
+                <a:rPr lang="en-US" sz="1400" dirty="0" smtClean="0"/>
+                <a:t>Exercise</a:t>
+              </a:r>
+            </a:p>
+          </p:txBody>
+        </p:sp>
+        <p:sp>
+          <p:nvSpPr>
+            <p:cNvPr id="8" name="Rectangle 7"/>
+            <p:cNvSpPr/>
+            <p:nvPr/>
+          </p:nvSpPr>
+          <p:spPr>
+            <a:xfrm>
+              <a:off x="4495800" y="914400"/>
+              <a:ext cx="1066800" cy="381000"/>
+            </a:xfrm>
+            <a:prstGeom prst="rect">
+              <a:avLst/>
+            </a:prstGeom>
+            <a:noFill/>
+            <a:ln>
+              <a:solidFill>
+                <a:schemeClr val="tx1"/>
+              </a:solidFill>
+            </a:ln>
+          </p:spPr>
+          <p:style>
+            <a:lnRef idx="2">
+              <a:schemeClr val="accent1">
+                <a:shade val="50000"/>
+              </a:schemeClr>
+            </a:lnRef>
+            <a:fillRef idx="1">
+              <a:schemeClr val="accent1"/>
+            </a:fillRef>
+            <a:effectRef idx="0">
+              <a:schemeClr val="accent1"/>
+            </a:effectRef>
+            <a:fontRef idx="minor">
+              <a:schemeClr val="lt1"/>
+            </a:fontRef>
+          </p:style>
+          <p:txBody>
+            <a:bodyPr rtlCol="0" anchor="ctr"/>
+            <a:lstStyle/>
+            <a:p>
+              <a:pPr algn="ctr"/>
+              <a:endParaRPr lang="en-US"/>
+            </a:p>
+          </p:txBody>
+        </p:sp>
+      </p:grpSp>
+      <p:grpSp>
+        <p:nvGrpSpPr>
+          <p:cNvPr id="9" name="Group 17"/>
+          <p:cNvGrpSpPr/>
+          <p:nvPr/>
+        </p:nvGrpSpPr>
+        <p:grpSpPr>
+          <a:xfrm>
+            <a:off x="5943600" y="228600"/>
+            <a:ext cx="990600" cy="838200"/>
+            <a:chOff x="1219200" y="5029200"/>
+            <a:chExt cx="990600" cy="838200"/>
+          </a:xfrm>
+        </p:grpSpPr>
+        <p:sp>
+          <p:nvSpPr>
+            <p:cNvPr id="19" name="Oval 31"/>
+            <p:cNvSpPr>
+              <a:spLocks noChangeArrowheads="1"/>
+            </p:cNvSpPr>
+            <p:nvPr/>
+          </p:nvSpPr>
+          <p:spPr bwMode="auto">
+            <a:xfrm>
+              <a:off x="1219200" y="5029200"/>
+              <a:ext cx="990600" cy="838200"/>
+            </a:xfrm>
+            <a:prstGeom prst="ellipse">
+              <a:avLst/>
+            </a:prstGeom>
+            <a:noFill/>
+            <a:ln w="9525">
+              <a:solidFill>
+                <a:schemeClr val="tx1"/>
+              </a:solidFill>
+              <a:round/>
+              <a:headEnd/>
+              <a:tailEnd/>
+            </a:ln>
+            <a:effectLst/>
+          </p:spPr>
+          <p:txBody>
+            <a:bodyPr wrap="none" anchor="ctr"/>
+            <a:lstStyle/>
+            <a:p>
+              <a:pPr algn="ctr"/>
+              <a:endParaRPr lang="en-US" sz="1400" dirty="0" smtClean="0"/>
+            </a:p>
+            <a:p>
+              <a:pPr algn="ctr"/>
+              <a:r>
+                <a:rPr lang="en-US" sz="1400" dirty="0" smtClean="0"/>
+                <a:t>Easy level</a:t>
+              </a:r>
+            </a:p>
+            <a:p>
+              <a:pPr algn="ctr"/>
+              <a:r>
+                <a:rPr lang="en-US" sz="1400" dirty="0" smtClean="0"/>
+                <a:t>request</a:t>
+              </a:r>
+            </a:p>
+          </p:txBody>
+        </p:sp>
+        <p:sp>
+          <p:nvSpPr>
+            <p:cNvPr id="20" name="TextBox 19"/>
+            <p:cNvSpPr txBox="1"/>
+            <p:nvPr/>
+          </p:nvSpPr>
+          <p:spPr>
+            <a:xfrm>
+              <a:off x="1447800" y="5029200"/>
+              <a:ext cx="476412" cy="369332"/>
+            </a:xfrm>
+            <a:prstGeom prst="rect">
+              <a:avLst/>
+            </a:prstGeom>
+            <a:noFill/>
+          </p:spPr>
+          <p:txBody>
+            <a:bodyPr wrap="none" rtlCol="0">
+              <a:spAutoFit/>
+            </a:bodyPr>
+            <a:lstStyle/>
+            <a:p>
+              <a:r>
+                <a:rPr lang="en-US" dirty="0" smtClean="0"/>
+                <a:t>4.1</a:t>
+              </a:r>
+              <a:endParaRPr lang="en-US" dirty="0"/>
+            </a:p>
+          </p:txBody>
+        </p:sp>
+      </p:grpSp>
+      <p:grpSp>
+        <p:nvGrpSpPr>
+          <p:cNvPr id="10" name="Group 20"/>
+          <p:cNvGrpSpPr/>
+          <p:nvPr/>
+        </p:nvGrpSpPr>
+        <p:grpSpPr>
+          <a:xfrm>
+            <a:off x="6553200" y="2743200"/>
+            <a:ext cx="990600" cy="838200"/>
+            <a:chOff x="1219200" y="5029200"/>
+            <a:chExt cx="990600" cy="838200"/>
+          </a:xfrm>
+        </p:grpSpPr>
+        <p:sp>
+          <p:nvSpPr>
+            <p:cNvPr id="22" name="Oval 31"/>
+            <p:cNvSpPr>
+              <a:spLocks noChangeArrowheads="1"/>
+            </p:cNvSpPr>
+            <p:nvPr/>
+          </p:nvSpPr>
+          <p:spPr bwMode="auto">
+            <a:xfrm>
+              <a:off x="1219200" y="5029200"/>
+              <a:ext cx="990600" cy="838200"/>
+            </a:xfrm>
+            <a:prstGeom prst="ellipse">
+              <a:avLst/>
+            </a:prstGeom>
+            <a:noFill/>
+            <a:ln w="9525">
+              <a:solidFill>
+                <a:schemeClr val="tx1"/>
+              </a:solidFill>
+              <a:round/>
+              <a:headEnd/>
+              <a:tailEnd/>
+            </a:ln>
+            <a:effectLst/>
+          </p:spPr>
+          <p:txBody>
+            <a:bodyPr wrap="none" anchor="ctr"/>
+            <a:lstStyle/>
+            <a:p>
+              <a:pPr algn="ctr"/>
+              <a:endParaRPr lang="en-US" sz="1400" dirty="0" smtClean="0"/>
+            </a:p>
+            <a:p>
+              <a:pPr algn="ctr"/>
+              <a:r>
+                <a:rPr lang="en-US" sz="1400" dirty="0" smtClean="0"/>
+                <a:t>Verify </a:t>
+              </a:r>
+            </a:p>
+            <a:p>
+              <a:pPr algn="ctr"/>
+              <a:r>
+                <a:rPr lang="en-US" sz="1400" dirty="0" smtClean="0"/>
+                <a:t>request</a:t>
+              </a:r>
+            </a:p>
+          </p:txBody>
+        </p:sp>
+        <p:sp>
+          <p:nvSpPr>
+            <p:cNvPr id="23" name="TextBox 22"/>
+            <p:cNvSpPr txBox="1"/>
+            <p:nvPr/>
+          </p:nvSpPr>
+          <p:spPr>
+            <a:xfrm>
+              <a:off x="1447800" y="5029200"/>
+              <a:ext cx="476412" cy="369332"/>
+            </a:xfrm>
+            <a:prstGeom prst="rect">
+              <a:avLst/>
+            </a:prstGeom>
+            <a:noFill/>
+          </p:spPr>
+          <p:txBody>
+            <a:bodyPr wrap="none" rtlCol="0">
+              <a:spAutoFit/>
+            </a:bodyPr>
+            <a:lstStyle/>
+            <a:p>
+              <a:r>
+                <a:rPr lang="en-US" dirty="0" smtClean="0"/>
+                <a:t>4.4</a:t>
+              </a:r>
+              <a:endParaRPr lang="en-US" dirty="0"/>
+            </a:p>
+          </p:txBody>
+        </p:sp>
+      </p:grpSp>
+      <p:sp>
+        <p:nvSpPr>
+          <p:cNvPr id="26" name="TextBox 25"/>
+          <p:cNvSpPr txBox="1"/>
+          <p:nvPr/>
+        </p:nvSpPr>
+        <p:spPr>
+          <a:xfrm>
+            <a:off x="3048000" y="228600"/>
+            <a:ext cx="2225866" cy="307777"/>
+          </a:xfrm>
+          <a:prstGeom prst="rect">
+            <a:avLst/>
+          </a:prstGeom>
+          <a:noFill/>
+        </p:spPr>
+        <p:txBody>
+          <a:bodyPr wrap="none" rtlCol="0">
+            <a:spAutoFit/>
+          </a:bodyPr>
+          <a:lstStyle/>
+          <a:p>
+            <a:r>
+              <a:rPr lang="en-US" sz="1400" dirty="0" smtClean="0"/>
+              <a:t>Apply for easy level Exercise</a:t>
+            </a:r>
+            <a:endParaRPr lang="en-US" dirty="0"/>
+          </a:p>
+        </p:txBody>
+      </p:sp>
+      <p:cxnSp>
+        <p:nvCxnSpPr>
+          <p:cNvPr id="33" name="Shape 32"/>
+          <p:cNvCxnSpPr>
+            <a:stCxn id="8" idx="0"/>
+          </p:cNvCxnSpPr>
+          <p:nvPr/>
+        </p:nvCxnSpPr>
+        <p:spPr>
+          <a:xfrm rot="5400000" flipH="1" flipV="1">
+            <a:off x="4076700" y="-1181100"/>
+            <a:ext cx="152400" cy="3581400"/>
+          </a:xfrm>
+          <a:prstGeom prst="bentConnector2">
+            <a:avLst/>
+          </a:prstGeom>
+          <a:ln>
+            <a:solidFill>
+              <a:schemeClr val="tx1"/>
+            </a:solidFill>
+            <a:tailEnd type="arrow"/>
+          </a:ln>
+        </p:spPr>
+        <p:style>
+          <a:lnRef idx="1">
+            <a:schemeClr val="accent1"/>
+          </a:lnRef>
+          <a:fillRef idx="0">
+            <a:schemeClr val="accent1"/>
+          </a:fillRef>
+          <a:effectRef idx="0">
+            <a:schemeClr val="accent1"/>
+          </a:effectRef>
+          <a:fontRef idx="minor">
+            <a:schemeClr val="tx1"/>
+          </a:fontRef>
+        </p:style>
+      </p:cxnSp>
+      <p:cxnSp>
+        <p:nvCxnSpPr>
+          <p:cNvPr id="35" name="Elbow Connector 34"/>
+          <p:cNvCxnSpPr>
+            <a:stCxn id="19" idx="6"/>
+            <a:endCxn id="23" idx="0"/>
+          </p:cNvCxnSpPr>
+          <p:nvPr/>
+        </p:nvCxnSpPr>
+        <p:spPr>
+          <a:xfrm>
+            <a:off x="6934200" y="647700"/>
+            <a:ext cx="85806" cy="2095500"/>
+          </a:xfrm>
+          <a:prstGeom prst="bentConnector2">
+            <a:avLst/>
+          </a:prstGeom>
+          <a:ln>
+            <a:solidFill>
+              <a:schemeClr val="tx1"/>
+            </a:solidFill>
+            <a:tailEnd type="arrow"/>
+          </a:ln>
+        </p:spPr>
+        <p:style>
+          <a:lnRef idx="1">
+            <a:schemeClr val="accent1"/>
+          </a:lnRef>
+          <a:fillRef idx="0">
+            <a:schemeClr val="accent1"/>
+          </a:fillRef>
+          <a:effectRef idx="0">
+            <a:schemeClr val="accent1"/>
+          </a:effectRef>
+          <a:fontRef idx="minor">
+            <a:schemeClr val="tx1"/>
+          </a:fontRef>
+        </p:style>
+      </p:cxnSp>
+      <p:sp>
+        <p:nvSpPr>
+          <p:cNvPr id="36" name="TextBox 35"/>
+          <p:cNvSpPr txBox="1"/>
+          <p:nvPr/>
+        </p:nvSpPr>
+        <p:spPr>
+          <a:xfrm rot="16200000">
+            <a:off x="6348680" y="1576119"/>
+            <a:ext cx="1631216" cy="307777"/>
+          </a:xfrm>
+          <a:prstGeom prst="rect">
+            <a:avLst/>
+          </a:prstGeom>
+          <a:noFill/>
+        </p:spPr>
+        <p:txBody>
+          <a:bodyPr wrap="none" rtlCol="0">
+            <a:spAutoFit/>
+          </a:bodyPr>
+          <a:lstStyle/>
+          <a:p>
+            <a:r>
+              <a:rPr lang="en-US" sz="1400" dirty="0" smtClean="0"/>
+              <a:t>Resource info check</a:t>
+            </a:r>
+            <a:endParaRPr lang="en-US" dirty="0"/>
+          </a:p>
+        </p:txBody>
+      </p:sp>
+      <p:sp>
+        <p:nvSpPr>
+          <p:cNvPr id="39" name="TextBox 38"/>
+          <p:cNvSpPr txBox="1"/>
+          <p:nvPr/>
+        </p:nvSpPr>
+        <p:spPr>
+          <a:xfrm>
+            <a:off x="7391400" y="3429000"/>
+            <a:ext cx="1297150" cy="738664"/>
+          </a:xfrm>
+          <a:prstGeom prst="rect">
+            <a:avLst/>
+          </a:prstGeom>
+          <a:noFill/>
+        </p:spPr>
+        <p:txBody>
+          <a:bodyPr wrap="none" rtlCol="0">
+            <a:spAutoFit/>
+          </a:bodyPr>
+          <a:lstStyle/>
+          <a:p>
+            <a:r>
+              <a:rPr lang="en-US" sz="1400" dirty="0" smtClean="0"/>
+              <a:t>Use </a:t>
+            </a:r>
+          </a:p>
+          <a:p>
+            <a:r>
+              <a:rPr lang="en-US" sz="1400" dirty="0" smtClean="0"/>
+              <a:t>authentication </a:t>
+            </a:r>
+          </a:p>
+          <a:p>
+            <a:r>
+              <a:rPr lang="en-US" sz="1400" dirty="0" smtClean="0"/>
+              <a:t>info</a:t>
+            </a:r>
+            <a:endParaRPr lang="en-US" sz="1400" dirty="0"/>
+          </a:p>
+        </p:txBody>
+      </p:sp>
+      <p:cxnSp>
+        <p:nvCxnSpPr>
+          <p:cNvPr id="45" name="Straight Arrow Connector 44"/>
+          <p:cNvCxnSpPr>
+            <a:endCxn id="22" idx="5"/>
+          </p:cNvCxnSpPr>
+          <p:nvPr/>
+        </p:nvCxnSpPr>
+        <p:spPr>
+          <a:xfrm rot="5400000" flipH="1" flipV="1">
+            <a:off x="7028891" y="3821161"/>
+            <a:ext cx="732351" cy="7328"/>
+          </a:xfrm>
+          <a:prstGeom prst="straightConnector1">
+            <a:avLst/>
+          </a:prstGeom>
+          <a:ln>
+            <a:solidFill>
+              <a:schemeClr val="tx1"/>
+            </a:solidFill>
+            <a:tailEnd type="arrow"/>
+          </a:ln>
+        </p:spPr>
+        <p:style>
+          <a:lnRef idx="1">
+            <a:schemeClr val="accent1"/>
+          </a:lnRef>
+          <a:fillRef idx="0">
+            <a:schemeClr val="accent1"/>
+          </a:fillRef>
+          <a:effectRef idx="0">
+            <a:schemeClr val="accent1"/>
+          </a:effectRef>
+          <a:fontRef idx="minor">
+            <a:schemeClr val="tx1"/>
+          </a:fontRef>
+        </p:style>
+      </p:cxnSp>
+      <p:cxnSp>
+        <p:nvCxnSpPr>
+          <p:cNvPr id="51" name="Straight Arrow Connector 50"/>
+          <p:cNvCxnSpPr/>
+          <p:nvPr/>
+        </p:nvCxnSpPr>
+        <p:spPr>
+          <a:xfrm rot="16200000" flipH="1">
+            <a:off x="6533592" y="3905811"/>
+            <a:ext cx="656151" cy="7331"/>
+          </a:xfrm>
+          <a:prstGeom prst="straightConnector1">
+            <a:avLst/>
+          </a:prstGeom>
+          <a:ln>
+            <a:solidFill>
+              <a:schemeClr val="tx1"/>
+            </a:solidFill>
+            <a:tailEnd type="arrow"/>
+          </a:ln>
+        </p:spPr>
+        <p:style>
+          <a:lnRef idx="1">
+            <a:schemeClr val="accent1"/>
+          </a:lnRef>
+          <a:fillRef idx="0">
+            <a:schemeClr val="accent1"/>
+          </a:fillRef>
+          <a:effectRef idx="0">
+            <a:schemeClr val="accent1"/>
+          </a:effectRef>
+          <a:fontRef idx="minor">
+            <a:schemeClr val="tx1"/>
+          </a:fontRef>
+        </p:style>
+      </p:cxnSp>
+      <p:sp>
+        <p:nvSpPr>
+          <p:cNvPr id="53" name="TextBox 52"/>
+          <p:cNvSpPr txBox="1"/>
+          <p:nvPr/>
+        </p:nvSpPr>
+        <p:spPr>
+          <a:xfrm>
+            <a:off x="6172200" y="3581400"/>
+            <a:ext cx="720069" cy="738664"/>
+          </a:xfrm>
+          <a:prstGeom prst="rect">
+            <a:avLst/>
+          </a:prstGeom>
+          <a:noFill/>
+        </p:spPr>
+        <p:txBody>
+          <a:bodyPr wrap="none" rtlCol="0">
+            <a:spAutoFit/>
+          </a:bodyPr>
+          <a:lstStyle/>
+          <a:p>
+            <a:r>
+              <a:rPr lang="en-US" sz="1400" dirty="0" smtClean="0"/>
+              <a:t>Lesson </a:t>
+            </a:r>
+          </a:p>
+          <a:p>
+            <a:r>
+              <a:rPr lang="en-US" sz="1400" dirty="0" smtClean="0"/>
+              <a:t>Status </a:t>
+            </a:r>
+          </a:p>
+          <a:p>
+            <a:r>
+              <a:rPr lang="en-US" sz="1400" dirty="0" smtClean="0"/>
+              <a:t>Info</a:t>
+            </a:r>
+            <a:endParaRPr lang="en-US" sz="1400" dirty="0"/>
+          </a:p>
+        </p:txBody>
+      </p:sp>
+      <p:sp>
+        <p:nvSpPr>
+          <p:cNvPr id="87" name="TextBox 86"/>
+          <p:cNvSpPr txBox="1"/>
+          <p:nvPr/>
+        </p:nvSpPr>
+        <p:spPr>
+          <a:xfrm>
+            <a:off x="2286000" y="3429000"/>
+            <a:ext cx="1235146" cy="307777"/>
+          </a:xfrm>
+          <a:prstGeom prst="rect">
+            <a:avLst/>
+          </a:prstGeom>
+          <a:noFill/>
+        </p:spPr>
+        <p:txBody>
+          <a:bodyPr wrap="none" rtlCol="0">
+            <a:spAutoFit/>
+          </a:bodyPr>
+          <a:lstStyle/>
+          <a:p>
+            <a:r>
+              <a:rPr lang="en-US" sz="1400" dirty="0" smtClean="0"/>
+              <a:t>Request result</a:t>
+            </a:r>
+            <a:endParaRPr lang="en-US" dirty="0"/>
+          </a:p>
+        </p:txBody>
+      </p:sp>
+      <p:cxnSp>
+        <p:nvCxnSpPr>
+          <p:cNvPr id="71" name="Elbow Connector 70"/>
+          <p:cNvCxnSpPr>
+            <a:stCxn id="68" idx="6"/>
+            <a:endCxn id="22" idx="1"/>
+          </p:cNvCxnSpPr>
+          <p:nvPr/>
+        </p:nvCxnSpPr>
+        <p:spPr>
+          <a:xfrm>
+            <a:off x="5257800" y="1866900"/>
+            <a:ext cx="1440470" cy="999051"/>
+          </a:xfrm>
+          <a:prstGeom prst="bentConnector2">
+            <a:avLst/>
+          </a:prstGeom>
+          <a:ln>
+            <a:solidFill>
+              <a:schemeClr val="tx1"/>
+            </a:solidFill>
+            <a:tailEnd type="arrow"/>
+          </a:ln>
+        </p:spPr>
+        <p:style>
+          <a:lnRef idx="1">
+            <a:schemeClr val="accent1"/>
+          </a:lnRef>
+          <a:fillRef idx="0">
+            <a:schemeClr val="accent1"/>
+          </a:fillRef>
+          <a:effectRef idx="0">
+            <a:schemeClr val="accent1"/>
+          </a:effectRef>
+          <a:fontRef idx="minor">
+            <a:schemeClr val="tx1"/>
+          </a:fontRef>
+        </p:style>
+      </p:cxnSp>
+      <p:grpSp>
+        <p:nvGrpSpPr>
+          <p:cNvPr id="11" name="Group 72"/>
+          <p:cNvGrpSpPr/>
+          <p:nvPr/>
+        </p:nvGrpSpPr>
+        <p:grpSpPr>
+          <a:xfrm>
+            <a:off x="6781800" y="6172200"/>
+            <a:ext cx="1693282" cy="457200"/>
+            <a:chOff x="304800" y="1676400"/>
+            <a:chExt cx="1693282" cy="457200"/>
+          </a:xfrm>
+        </p:grpSpPr>
+        <p:sp>
+          <p:nvSpPr>
+            <p:cNvPr id="74" name="Rectangle 73"/>
+            <p:cNvSpPr/>
+            <p:nvPr/>
+          </p:nvSpPr>
+          <p:spPr>
+            <a:xfrm>
+              <a:off x="304800" y="1676400"/>
+              <a:ext cx="1676400" cy="457200"/>
+            </a:xfrm>
+            <a:prstGeom prst="rect">
+              <a:avLst/>
+            </a:prstGeom>
+            <a:noFill/>
+            <a:ln>
+              <a:solidFill>
+                <a:schemeClr val="tx1"/>
+              </a:solidFill>
+            </a:ln>
+          </p:spPr>
+          <p:style>
+            <a:lnRef idx="2">
+              <a:schemeClr val="accent1">
+                <a:shade val="50000"/>
+              </a:schemeClr>
+            </a:lnRef>
+            <a:fillRef idx="1">
+              <a:schemeClr val="accent1"/>
+            </a:fillRef>
+            <a:effectRef idx="0">
+              <a:schemeClr val="accent1"/>
+            </a:effectRef>
+            <a:fontRef idx="minor">
+              <a:schemeClr val="lt1"/>
+            </a:fontRef>
+          </p:style>
+          <p:txBody>
+            <a:bodyPr rtlCol="0" anchor="ctr"/>
+            <a:lstStyle/>
+            <a:p>
+              <a:pPr algn="ctr"/>
+              <a:endParaRPr lang="en-US"/>
+            </a:p>
+          </p:txBody>
+        </p:sp>
+        <p:sp>
+          <p:nvSpPr>
+            <p:cNvPr id="76" name="TextBox 75"/>
+            <p:cNvSpPr txBox="1"/>
+            <p:nvPr/>
+          </p:nvSpPr>
+          <p:spPr>
+            <a:xfrm>
+              <a:off x="685800" y="1752600"/>
+              <a:ext cx="1312282" cy="307777"/>
+            </a:xfrm>
+            <a:prstGeom prst="rect">
+              <a:avLst/>
+            </a:prstGeom>
+            <a:noFill/>
+          </p:spPr>
+          <p:txBody>
+            <a:bodyPr wrap="none" rtlCol="0">
+              <a:spAutoFit/>
+            </a:bodyPr>
+            <a:lstStyle/>
+            <a:p>
+              <a:r>
+                <a:rPr lang="en-US" sz="1400" dirty="0" smtClean="0"/>
+                <a:t>Exercise Details</a:t>
+              </a:r>
+            </a:p>
+          </p:txBody>
+        </p:sp>
+        <p:cxnSp>
+          <p:nvCxnSpPr>
+            <p:cNvPr id="77" name="Straight Connector 76"/>
+            <p:cNvCxnSpPr/>
+            <p:nvPr/>
+          </p:nvCxnSpPr>
+          <p:spPr>
+            <a:xfrm rot="5400000">
+              <a:off x="457994" y="1904206"/>
+              <a:ext cx="456406" cy="794"/>
+            </a:xfrm>
+            <a:prstGeom prst="line">
+              <a:avLst/>
+            </a:prstGeom>
+            <a:ln>
+              <a:solidFill>
+                <a:schemeClr val="tx1"/>
+              </a:solidFill>
+            </a:ln>
+          </p:spPr>
+          <p:style>
+            <a:lnRef idx="1">
+              <a:schemeClr val="accent1"/>
+            </a:lnRef>
+            <a:fillRef idx="0">
+              <a:schemeClr val="accent1"/>
+            </a:fillRef>
+            <a:effectRef idx="0">
+              <a:schemeClr val="accent1"/>
+            </a:effectRef>
+            <a:fontRef idx="minor">
+              <a:schemeClr val="tx1"/>
+            </a:fontRef>
+          </p:style>
+        </p:cxnSp>
+        <p:sp>
+          <p:nvSpPr>
+            <p:cNvPr id="80" name="TextBox 79"/>
+            <p:cNvSpPr txBox="1"/>
+            <p:nvPr/>
+          </p:nvSpPr>
+          <p:spPr>
+            <a:xfrm>
+              <a:off x="304800" y="1752600"/>
+              <a:ext cx="386644" cy="307777"/>
+            </a:xfrm>
+            <a:prstGeom prst="rect">
+              <a:avLst/>
+            </a:prstGeom>
+            <a:noFill/>
+          </p:spPr>
+          <p:txBody>
+            <a:bodyPr wrap="none" rtlCol="0">
+              <a:spAutoFit/>
+            </a:bodyPr>
+            <a:lstStyle/>
+            <a:p>
+              <a:r>
+                <a:rPr lang="en-US" sz="1400" dirty="0" smtClean="0"/>
+                <a:t>D3</a:t>
+              </a:r>
+              <a:endParaRPr lang="en-US" sz="1400" dirty="0"/>
+            </a:p>
+          </p:txBody>
+        </p:sp>
+      </p:grpSp>
+      <p:cxnSp>
+        <p:nvCxnSpPr>
+          <p:cNvPr id="83" name="Straight Arrow Connector 82"/>
+          <p:cNvCxnSpPr/>
+          <p:nvPr/>
+        </p:nvCxnSpPr>
+        <p:spPr>
+          <a:xfrm rot="5400000" flipH="1" flipV="1">
+            <a:off x="7201694" y="5752306"/>
+            <a:ext cx="838200" cy="1588"/>
+          </a:xfrm>
+          <a:prstGeom prst="straightConnector1">
+            <a:avLst/>
+          </a:prstGeom>
+          <a:ln>
+            <a:solidFill>
+              <a:schemeClr val="tx1"/>
+            </a:solidFill>
+            <a:tailEnd type="arrow"/>
+          </a:ln>
+        </p:spPr>
+        <p:style>
+          <a:lnRef idx="1">
+            <a:schemeClr val="accent1"/>
+          </a:lnRef>
+          <a:fillRef idx="0">
+            <a:schemeClr val="accent1"/>
+          </a:fillRef>
+          <a:effectRef idx="0">
+            <a:schemeClr val="accent1"/>
+          </a:effectRef>
+          <a:fontRef idx="minor">
+            <a:schemeClr val="tx1"/>
+          </a:fontRef>
+        </p:style>
+      </p:cxnSp>
+      <p:sp>
+        <p:nvSpPr>
+          <p:cNvPr id="85" name="TextBox 84"/>
+          <p:cNvSpPr txBox="1"/>
+          <p:nvPr/>
+        </p:nvSpPr>
+        <p:spPr>
+          <a:xfrm>
+            <a:off x="7620000" y="5562600"/>
+            <a:ext cx="667234" cy="523220"/>
+          </a:xfrm>
+          <a:prstGeom prst="rect">
+            <a:avLst/>
+          </a:prstGeom>
+          <a:noFill/>
+        </p:spPr>
+        <p:txBody>
+          <a:bodyPr wrap="none" rtlCol="0">
+            <a:spAutoFit/>
+          </a:bodyPr>
+          <a:lstStyle/>
+          <a:p>
+            <a:r>
+              <a:rPr lang="en-US" sz="1400" dirty="0" smtClean="0"/>
+              <a:t>Get </a:t>
+            </a:r>
+          </a:p>
+          <a:p>
+            <a:r>
+              <a:rPr lang="en-US" sz="1400" dirty="0" smtClean="0"/>
+              <a:t>details</a:t>
+            </a:r>
+            <a:endParaRPr lang="en-US" sz="1400" dirty="0"/>
+          </a:p>
+        </p:txBody>
+      </p:sp>
+      <p:grpSp>
+        <p:nvGrpSpPr>
+          <p:cNvPr id="12" name="Group 17"/>
+          <p:cNvGrpSpPr/>
+          <p:nvPr/>
+        </p:nvGrpSpPr>
+        <p:grpSpPr>
+          <a:xfrm>
+            <a:off x="4267200" y="1447800"/>
+            <a:ext cx="990600" cy="838200"/>
+            <a:chOff x="1219200" y="5029200"/>
+            <a:chExt cx="990600" cy="838200"/>
+          </a:xfrm>
+        </p:grpSpPr>
+        <p:sp>
+          <p:nvSpPr>
+            <p:cNvPr id="68" name="Oval 31"/>
+            <p:cNvSpPr>
+              <a:spLocks noChangeArrowheads="1"/>
+            </p:cNvSpPr>
+            <p:nvPr/>
+          </p:nvSpPr>
+          <p:spPr bwMode="auto">
+            <a:xfrm>
+              <a:off x="1219200" y="5029200"/>
+              <a:ext cx="990600" cy="838200"/>
+            </a:xfrm>
+            <a:prstGeom prst="ellipse">
+              <a:avLst/>
+            </a:prstGeom>
+            <a:noFill/>
+            <a:ln w="9525">
+              <a:solidFill>
+                <a:schemeClr val="tx1"/>
+              </a:solidFill>
+              <a:round/>
+              <a:headEnd/>
+              <a:tailEnd/>
+            </a:ln>
+            <a:effectLst/>
+          </p:spPr>
+          <p:txBody>
+            <a:bodyPr wrap="none" anchor="ctr"/>
+            <a:lstStyle/>
+            <a:p>
+              <a:pPr algn="ctr"/>
+              <a:endParaRPr lang="en-US" sz="1400" dirty="0" smtClean="0"/>
+            </a:p>
+            <a:p>
+              <a:pPr algn="ctr"/>
+              <a:r>
+                <a:rPr lang="en-US" sz="1400" dirty="0" smtClean="0"/>
+                <a:t>Hard level</a:t>
+              </a:r>
+            </a:p>
+            <a:p>
+              <a:pPr algn="ctr"/>
+              <a:r>
+                <a:rPr lang="en-US" sz="1400" dirty="0" smtClean="0"/>
+                <a:t>request</a:t>
+              </a:r>
+            </a:p>
+          </p:txBody>
+        </p:sp>
+        <p:sp>
+          <p:nvSpPr>
+            <p:cNvPr id="69" name="TextBox 68"/>
+            <p:cNvSpPr txBox="1"/>
+            <p:nvPr/>
+          </p:nvSpPr>
+          <p:spPr>
+            <a:xfrm>
+              <a:off x="1447800" y="5029200"/>
+              <a:ext cx="476412" cy="369332"/>
+            </a:xfrm>
+            <a:prstGeom prst="rect">
+              <a:avLst/>
+            </a:prstGeom>
+            <a:noFill/>
+          </p:spPr>
+          <p:txBody>
+            <a:bodyPr wrap="none" rtlCol="0">
+              <a:spAutoFit/>
+            </a:bodyPr>
+            <a:lstStyle/>
+            <a:p>
+              <a:r>
+                <a:rPr lang="en-US" dirty="0" smtClean="0"/>
+                <a:t>4.2</a:t>
+              </a:r>
+              <a:endParaRPr lang="en-US" dirty="0"/>
+            </a:p>
+          </p:txBody>
+        </p:sp>
+      </p:grpSp>
+      <p:sp>
+        <p:nvSpPr>
+          <p:cNvPr id="81" name="TextBox 80"/>
+          <p:cNvSpPr txBox="1"/>
+          <p:nvPr/>
+        </p:nvSpPr>
+        <p:spPr>
+          <a:xfrm>
+            <a:off x="5791200" y="1371600"/>
+            <a:ext cx="922047" cy="523220"/>
+          </a:xfrm>
+          <a:prstGeom prst="rect">
+            <a:avLst/>
+          </a:prstGeom>
+          <a:noFill/>
+        </p:spPr>
+        <p:txBody>
+          <a:bodyPr wrap="none" rtlCol="0">
+            <a:spAutoFit/>
+          </a:bodyPr>
+          <a:lstStyle/>
+          <a:p>
+            <a:r>
+              <a:rPr lang="en-US" sz="1400" dirty="0" smtClean="0"/>
+              <a:t>Resource </a:t>
+            </a:r>
+          </a:p>
+          <a:p>
+            <a:r>
+              <a:rPr lang="en-US" sz="1400" dirty="0" smtClean="0"/>
+              <a:t>info check</a:t>
+            </a:r>
+            <a:endParaRPr lang="en-US" dirty="0"/>
+          </a:p>
+        </p:txBody>
+      </p:sp>
+      <p:cxnSp>
+        <p:nvCxnSpPr>
+          <p:cNvPr id="89" name="Shape 88"/>
+          <p:cNvCxnSpPr/>
+          <p:nvPr/>
+        </p:nvCxnSpPr>
+        <p:spPr>
+          <a:xfrm>
+            <a:off x="2743200" y="1066800"/>
+            <a:ext cx="1533606" cy="723900"/>
+          </a:xfrm>
+          <a:prstGeom prst="bentConnector3">
+            <a:avLst>
+              <a:gd name="adj1" fmla="val 1055"/>
+            </a:avLst>
+          </a:prstGeom>
+          <a:ln>
+            <a:solidFill>
+              <a:schemeClr val="tx1"/>
+            </a:solidFill>
+            <a:tailEnd type="arrow"/>
+          </a:ln>
+        </p:spPr>
+        <p:style>
+          <a:lnRef idx="1">
+            <a:schemeClr val="accent1"/>
+          </a:lnRef>
+          <a:fillRef idx="0">
+            <a:schemeClr val="accent1"/>
+          </a:fillRef>
+          <a:effectRef idx="0">
+            <a:schemeClr val="accent1"/>
+          </a:effectRef>
+          <a:fontRef idx="minor">
+            <a:schemeClr val="tx1"/>
+          </a:fontRef>
+        </p:style>
+      </p:cxnSp>
+      <p:sp>
+        <p:nvSpPr>
+          <p:cNvPr id="90" name="TextBox 89"/>
+          <p:cNvSpPr txBox="1"/>
+          <p:nvPr/>
+        </p:nvSpPr>
+        <p:spPr>
+          <a:xfrm>
+            <a:off x="2743200" y="1143000"/>
+            <a:ext cx="920188" cy="738664"/>
+          </a:xfrm>
+          <a:prstGeom prst="rect">
+            <a:avLst/>
+          </a:prstGeom>
+          <a:noFill/>
+        </p:spPr>
+        <p:txBody>
+          <a:bodyPr wrap="none" rtlCol="0">
+            <a:spAutoFit/>
+          </a:bodyPr>
+          <a:lstStyle/>
+          <a:p>
+            <a:r>
+              <a:rPr lang="en-US" sz="1400" dirty="0" smtClean="0"/>
+              <a:t>Apply for </a:t>
+            </a:r>
+          </a:p>
+          <a:p>
+            <a:r>
+              <a:rPr lang="en-US" sz="1400" dirty="0" smtClean="0"/>
+              <a:t>Hard level</a:t>
+            </a:r>
+          </a:p>
+          <a:p>
+            <a:r>
+              <a:rPr lang="en-US" sz="1400" dirty="0" smtClean="0"/>
+              <a:t>Exercise</a:t>
+            </a:r>
+            <a:endParaRPr lang="en-US" dirty="0"/>
+          </a:p>
+        </p:txBody>
+      </p:sp>
+      <p:grpSp>
+        <p:nvGrpSpPr>
+          <p:cNvPr id="14" name="Group 17"/>
+          <p:cNvGrpSpPr/>
+          <p:nvPr/>
+        </p:nvGrpSpPr>
+        <p:grpSpPr>
+          <a:xfrm>
+            <a:off x="3200400" y="2286000"/>
+            <a:ext cx="1066800" cy="838200"/>
+            <a:chOff x="1219200" y="5029200"/>
+            <a:chExt cx="990600" cy="838200"/>
+          </a:xfrm>
+        </p:grpSpPr>
+        <p:sp>
+          <p:nvSpPr>
+            <p:cNvPr id="126" name="Oval 31"/>
+            <p:cNvSpPr>
+              <a:spLocks noChangeArrowheads="1"/>
+            </p:cNvSpPr>
+            <p:nvPr/>
+          </p:nvSpPr>
+          <p:spPr bwMode="auto">
+            <a:xfrm>
+              <a:off x="1219200" y="5029200"/>
+              <a:ext cx="990600" cy="838200"/>
+            </a:xfrm>
+            <a:prstGeom prst="ellipse">
+              <a:avLst/>
+            </a:prstGeom>
+            <a:noFill/>
+            <a:ln w="9525">
+              <a:solidFill>
+                <a:schemeClr val="tx1"/>
+              </a:solidFill>
+              <a:round/>
+              <a:headEnd/>
+              <a:tailEnd/>
+            </a:ln>
+            <a:effectLst/>
+          </p:spPr>
+          <p:txBody>
+            <a:bodyPr wrap="none" anchor="ctr"/>
+            <a:lstStyle/>
+            <a:p>
+              <a:pPr algn="ctr"/>
+              <a:endParaRPr lang="en-US" sz="1400" dirty="0" smtClean="0"/>
+            </a:p>
+            <a:p>
+              <a:pPr algn="ctr"/>
+              <a:r>
+                <a:rPr lang="en-US" sz="1400" dirty="0" smtClean="0"/>
+                <a:t>Medium level</a:t>
+              </a:r>
+            </a:p>
+            <a:p>
+              <a:pPr algn="ctr"/>
+              <a:r>
+                <a:rPr lang="en-US" sz="1400" dirty="0" smtClean="0"/>
+                <a:t>request</a:t>
+              </a:r>
+            </a:p>
+          </p:txBody>
+        </p:sp>
+        <p:sp>
+          <p:nvSpPr>
+            <p:cNvPr id="127" name="TextBox 126"/>
+            <p:cNvSpPr txBox="1"/>
+            <p:nvPr/>
+          </p:nvSpPr>
+          <p:spPr>
+            <a:xfrm>
+              <a:off x="1447800" y="5029200"/>
+              <a:ext cx="442383" cy="369332"/>
+            </a:xfrm>
+            <a:prstGeom prst="rect">
+              <a:avLst/>
+            </a:prstGeom>
+            <a:noFill/>
+          </p:spPr>
+          <p:txBody>
+            <a:bodyPr wrap="none" rtlCol="0">
+              <a:spAutoFit/>
+            </a:bodyPr>
+            <a:lstStyle/>
+            <a:p>
+              <a:r>
+                <a:rPr lang="en-US" dirty="0" smtClean="0"/>
+                <a:t>4.3</a:t>
+              </a:r>
+              <a:endParaRPr lang="en-US" dirty="0"/>
+            </a:p>
+          </p:txBody>
+        </p:sp>
+      </p:grpSp>
+      <p:cxnSp>
+        <p:nvCxnSpPr>
+          <p:cNvPr id="147" name="Straight Arrow Connector 146"/>
+          <p:cNvCxnSpPr/>
+          <p:nvPr/>
+        </p:nvCxnSpPr>
+        <p:spPr>
+          <a:xfrm rot="5400000" flipH="1" flipV="1">
+            <a:off x="724694" y="2247106"/>
+            <a:ext cx="2362200" cy="1588"/>
+          </a:xfrm>
+          <a:prstGeom prst="straightConnector1">
+            <a:avLst/>
+          </a:prstGeom>
+          <a:ln>
+            <a:solidFill>
+              <a:schemeClr val="tx1"/>
+            </a:solidFill>
+            <a:tailEnd type="arrow"/>
+          </a:ln>
+        </p:spPr>
+        <p:style>
+          <a:lnRef idx="1">
+            <a:schemeClr val="accent1"/>
+          </a:lnRef>
+          <a:fillRef idx="0">
+            <a:schemeClr val="accent1"/>
+          </a:fillRef>
+          <a:effectRef idx="0">
+            <a:schemeClr val="accent1"/>
+          </a:effectRef>
+          <a:fontRef idx="minor">
+            <a:schemeClr val="tx1"/>
+          </a:fontRef>
+        </p:style>
+      </p:cxnSp>
+      <p:cxnSp>
+        <p:nvCxnSpPr>
+          <p:cNvPr id="150" name="Straight Connector 149"/>
+          <p:cNvCxnSpPr>
+            <a:stCxn id="22" idx="3"/>
+          </p:cNvCxnSpPr>
+          <p:nvPr/>
+        </p:nvCxnSpPr>
+        <p:spPr>
+          <a:xfrm rot="5400000" flipH="1">
+            <a:off x="4286810" y="1047190"/>
+            <a:ext cx="29649" cy="4793270"/>
+          </a:xfrm>
+          <a:prstGeom prst="line">
+            <a:avLst/>
+          </a:prstGeom>
+          <a:ln>
+            <a:solidFill>
+              <a:schemeClr val="tx1"/>
+            </a:solidFill>
+          </a:ln>
+        </p:spPr>
+        <p:style>
+          <a:lnRef idx="1">
+            <a:schemeClr val="accent1"/>
+          </a:lnRef>
+          <a:fillRef idx="0">
+            <a:schemeClr val="accent1"/>
+          </a:fillRef>
+          <a:effectRef idx="0">
+            <a:schemeClr val="accent1"/>
+          </a:effectRef>
+          <a:fontRef idx="minor">
+            <a:schemeClr val="tx1"/>
+          </a:fontRef>
+        </p:style>
+      </p:cxnSp>
+      <p:cxnSp>
+        <p:nvCxnSpPr>
+          <p:cNvPr id="157" name="Shape 156"/>
+          <p:cNvCxnSpPr>
+            <a:stCxn id="8" idx="2"/>
+            <a:endCxn id="126" idx="2"/>
+          </p:cNvCxnSpPr>
+          <p:nvPr/>
+        </p:nvCxnSpPr>
+        <p:spPr>
+          <a:xfrm rot="16200000" flipH="1">
+            <a:off x="1962150" y="1466850"/>
+            <a:ext cx="1638300" cy="838200"/>
+          </a:xfrm>
+          <a:prstGeom prst="bentConnector2">
+            <a:avLst/>
+          </a:prstGeom>
+          <a:ln>
+            <a:solidFill>
+              <a:schemeClr val="tx1"/>
+            </a:solidFill>
+            <a:tailEnd type="arrow"/>
+          </a:ln>
+        </p:spPr>
+        <p:style>
+          <a:lnRef idx="1">
+            <a:schemeClr val="accent1"/>
+          </a:lnRef>
+          <a:fillRef idx="0">
+            <a:schemeClr val="accent1"/>
+          </a:fillRef>
+          <a:effectRef idx="0">
+            <a:schemeClr val="accent1"/>
+          </a:effectRef>
+          <a:fontRef idx="minor">
+            <a:schemeClr val="tx1"/>
+          </a:fontRef>
+        </p:style>
+      </p:cxnSp>
+      <p:cxnSp>
+        <p:nvCxnSpPr>
+          <p:cNvPr id="159" name="Elbow Connector 158"/>
+          <p:cNvCxnSpPr>
+            <a:stCxn id="126" idx="6"/>
+          </p:cNvCxnSpPr>
+          <p:nvPr/>
+        </p:nvCxnSpPr>
+        <p:spPr>
+          <a:xfrm>
+            <a:off x="4267200" y="2705100"/>
+            <a:ext cx="2286000" cy="344488"/>
+          </a:xfrm>
+          <a:prstGeom prst="bentConnector3">
+            <a:avLst>
+              <a:gd name="adj1" fmla="val 69104"/>
+            </a:avLst>
+          </a:prstGeom>
+          <a:ln>
+            <a:solidFill>
+              <a:schemeClr val="tx1"/>
+            </a:solidFill>
+            <a:tailEnd type="arrow"/>
+          </a:ln>
+        </p:spPr>
+        <p:style>
+          <a:lnRef idx="1">
+            <a:schemeClr val="accent1"/>
+          </a:lnRef>
+          <a:fillRef idx="0">
+            <a:schemeClr val="accent1"/>
+          </a:fillRef>
+          <a:effectRef idx="0">
+            <a:schemeClr val="accent1"/>
+          </a:effectRef>
+          <a:fontRef idx="minor">
+            <a:schemeClr val="tx1"/>
+          </a:fontRef>
+        </p:style>
+      </p:cxnSp>
+      <p:sp>
+        <p:nvSpPr>
+          <p:cNvPr id="162" name="TextBox 161"/>
+          <p:cNvSpPr txBox="1"/>
+          <p:nvPr/>
+        </p:nvSpPr>
+        <p:spPr>
+          <a:xfrm>
+            <a:off x="2362200" y="1905000"/>
+            <a:ext cx="1546642" cy="523220"/>
+          </a:xfrm>
+          <a:prstGeom prst="rect">
+            <a:avLst/>
+          </a:prstGeom>
+          <a:noFill/>
+        </p:spPr>
+        <p:txBody>
+          <a:bodyPr wrap="none" rtlCol="0">
+            <a:spAutoFit/>
+          </a:bodyPr>
+          <a:lstStyle/>
+          <a:p>
+            <a:r>
+              <a:rPr lang="en-US" sz="1400" dirty="0" smtClean="0"/>
+              <a:t>Apply for Medium </a:t>
+            </a:r>
+          </a:p>
+          <a:p>
+            <a:r>
+              <a:rPr lang="en-US" sz="1400" dirty="0" smtClean="0"/>
+              <a:t>level Exercise</a:t>
+            </a:r>
+            <a:endParaRPr lang="en-US" dirty="0"/>
+          </a:p>
+        </p:txBody>
+      </p:sp>
+      <p:sp>
+        <p:nvSpPr>
+          <p:cNvPr id="169" name="TextBox 168"/>
+          <p:cNvSpPr txBox="1"/>
+          <p:nvPr/>
+        </p:nvSpPr>
+        <p:spPr>
+          <a:xfrm>
+            <a:off x="4267200" y="2438400"/>
+            <a:ext cx="1631216" cy="307777"/>
+          </a:xfrm>
+          <a:prstGeom prst="rect">
+            <a:avLst/>
+          </a:prstGeom>
+          <a:noFill/>
+        </p:spPr>
+        <p:txBody>
+          <a:bodyPr wrap="none" rtlCol="0">
+            <a:spAutoFit/>
+          </a:bodyPr>
+          <a:lstStyle/>
+          <a:p>
+            <a:r>
+              <a:rPr lang="en-US" sz="1400" dirty="0" smtClean="0"/>
+              <a:t>Resource info check</a:t>
+            </a:r>
+            <a:endParaRPr lang="en-US" dirty="0"/>
+          </a:p>
+        </p:txBody>
+      </p:sp>
     </p:spTree>
   </p:cSld>
   <p:clrMapOvr>

</xml_diff>

<commit_message>
2 level dfd added
</commit_message>
<xml_diff>
--- a/report/Child education Diagrams.pptx
+++ b/report/Child education Diagrams.pptx
@@ -10,6 +10,7 @@
     <p:sldId id="259" r:id="rId4"/>
     <p:sldId id="260" r:id="rId5"/>
     <p:sldId id="261" r:id="rId6"/>
+    <p:sldId id="263" r:id="rId7"/>
   </p:sldIdLst>
   <p:sldSz cx="9144000" cy="6858000" type="screen4x3"/>
   <p:notesSz cx="6858000" cy="9144000"/>
@@ -10252,8 +10253,9 @@
               <a:pPr algn="ctr"/>
               <a:r>
                 <a:rPr lang="en-US" sz="1400" dirty="0" smtClean="0"/>
-                <a:t>request</a:t>
+                <a:t>process</a:t>
               </a:r>
+              <a:endParaRPr lang="en-US" sz="1400" dirty="0" smtClean="0"/>
             </a:p>
           </p:txBody>
         </p:sp>
@@ -11033,8 +11035,9 @@
               <a:pPr algn="ctr"/>
               <a:r>
                 <a:rPr lang="en-US" sz="1400" dirty="0" smtClean="0"/>
-                <a:t>request</a:t>
+                <a:t>process</a:t>
               </a:r>
+              <a:endParaRPr lang="en-US" sz="1400" dirty="0" smtClean="0"/>
             </a:p>
           </p:txBody>
         </p:sp>
@@ -11233,8 +11236,9 @@
               <a:pPr algn="ctr"/>
               <a:r>
                 <a:rPr lang="en-US" sz="1400" dirty="0" smtClean="0"/>
-                <a:t>request</a:t>
+                <a:t>process</a:t>
               </a:r>
+              <a:endParaRPr lang="en-US" sz="1400" dirty="0" smtClean="0"/>
             </a:p>
           </p:txBody>
         </p:sp>
@@ -11328,8 +11332,9 @@
               <a:pPr algn="ctr"/>
               <a:r>
                 <a:rPr lang="en-US" sz="1400" dirty="0" smtClean="0"/>
-                <a:t>request</a:t>
+                <a:t>process</a:t>
               </a:r>
+              <a:endParaRPr lang="en-US" sz="1400" dirty="0" smtClean="0"/>
             </a:p>
           </p:txBody>
         </p:sp>
@@ -12030,8 +12035,9 @@
               <a:pPr algn="ctr"/>
               <a:r>
                 <a:rPr lang="en-US" sz="1400" dirty="0" smtClean="0"/>
-                <a:t>request</a:t>
+                <a:t>process</a:t>
               </a:r>
+              <a:endParaRPr lang="en-US" sz="1400" dirty="0" smtClean="0"/>
             </a:p>
           </p:txBody>
         </p:sp>
@@ -12125,8 +12131,9 @@
               <a:pPr algn="ctr"/>
               <a:r>
                 <a:rPr lang="en-US" sz="1400" dirty="0" smtClean="0"/>
-                <a:t>request</a:t>
+                <a:t>process</a:t>
               </a:r>
+              <a:endParaRPr lang="en-US" sz="1400" dirty="0" smtClean="0"/>
             </a:p>
           </p:txBody>
         </p:sp>
@@ -12811,8 +12818,9 @@
               <a:pPr algn="ctr"/>
               <a:r>
                 <a:rPr lang="en-US" sz="1400" dirty="0" smtClean="0"/>
-                <a:t>request</a:t>
+                <a:t>process</a:t>
               </a:r>
+              <a:endParaRPr lang="en-US" sz="1400" dirty="0" smtClean="0"/>
             </a:p>
           </p:txBody>
         </p:sp>
@@ -13022,8 +13030,9 @@
               <a:pPr algn="ctr"/>
               <a:r>
                 <a:rPr lang="en-US" sz="1400" dirty="0" smtClean="0"/>
-                <a:t>request</a:t>
+                <a:t>process</a:t>
               </a:r>
+              <a:endParaRPr lang="en-US" sz="1400" dirty="0" smtClean="0"/>
             </a:p>
           </p:txBody>
         </p:sp>
@@ -13281,6 +13290,1051 @@
   <p:clrMapOvr>
     <a:masterClrMapping/>
   </p:clrMapOvr>
+</p:sld>
+</file>
+
+<file path=ppt/slides/slide6.xml><?xml version="1.0" encoding="utf-8"?>
+<p:sld xmlns:a="http://schemas.openxmlformats.org/drawingml/2006/main" xmlns:r="http://schemas.openxmlformats.org/officeDocument/2006/relationships" xmlns:p="http://schemas.openxmlformats.org/presentationml/2006/main">
+  <p:cSld>
+    <p:spTree>
+      <p:nvGrpSpPr>
+        <p:cNvPr id="1" name=""/>
+        <p:cNvGrpSpPr/>
+        <p:nvPr/>
+      </p:nvGrpSpPr>
+      <p:grpSpPr>
+        <a:xfrm>
+          <a:off x="0" y="0"/>
+          <a:ext cx="0" cy="0"/>
+          <a:chOff x="0" y="0"/>
+          <a:chExt cx="0" cy="0"/>
+        </a:xfrm>
+      </p:grpSpPr>
+      <p:sp>
+        <p:nvSpPr>
+          <p:cNvPr id="2" name="Oval 1"/>
+          <p:cNvSpPr/>
+          <p:nvPr/>
+        </p:nvSpPr>
+        <p:spPr>
+          <a:xfrm>
+            <a:off x="4648200" y="2362200"/>
+            <a:ext cx="990600" cy="990600"/>
+          </a:xfrm>
+          <a:prstGeom prst="ellipse">
+            <a:avLst/>
+          </a:prstGeom>
+          <a:solidFill>
+            <a:schemeClr val="bg1"/>
+          </a:solidFill>
+          <a:ln w="6350">
+            <a:solidFill>
+              <a:schemeClr val="tx1"/>
+            </a:solidFill>
+          </a:ln>
+        </p:spPr>
+        <p:style>
+          <a:lnRef idx="2">
+            <a:schemeClr val="accent1">
+              <a:shade val="50000"/>
+            </a:schemeClr>
+          </a:lnRef>
+          <a:fillRef idx="1">
+            <a:schemeClr val="accent1"/>
+          </a:fillRef>
+          <a:effectRef idx="0">
+            <a:schemeClr val="accent1"/>
+          </a:effectRef>
+          <a:fontRef idx="minor">
+            <a:schemeClr val="lt1"/>
+          </a:fontRef>
+        </p:style>
+        <p:txBody>
+          <a:bodyPr rtlCol="0" anchor="ctr"/>
+          <a:lstStyle/>
+          <a:p>
+            <a:pPr algn="ctr"/>
+            <a:r>
+              <a:rPr lang="en-US" sz="800" dirty="0" smtClean="0">
+                <a:solidFill>
+                  <a:schemeClr val="tx1"/>
+                </a:solidFill>
+              </a:rPr>
+              <a:t>Validate</a:t>
+            </a:r>
+          </a:p>
+          <a:p>
+            <a:pPr algn="ctr"/>
+            <a:r>
+              <a:rPr lang="en-US" sz="800" dirty="0" smtClean="0">
+                <a:solidFill>
+                  <a:schemeClr val="tx1"/>
+                </a:solidFill>
+              </a:rPr>
+              <a:t>Hard level</a:t>
+            </a:r>
+          </a:p>
+          <a:p>
+            <a:pPr algn="ctr"/>
+            <a:r>
+              <a:rPr lang="en-US" sz="800" dirty="0" smtClean="0">
+                <a:solidFill>
+                  <a:schemeClr val="tx1"/>
+                </a:solidFill>
+              </a:rPr>
+              <a:t>process</a:t>
+            </a:r>
+          </a:p>
+          <a:p>
+            <a:pPr algn="ctr"/>
+            <a:endParaRPr lang="en-US" sz="1200" dirty="0">
+              <a:solidFill>
+                <a:schemeClr val="tx1"/>
+              </a:solidFill>
+            </a:endParaRPr>
+          </a:p>
+          <a:p>
+            <a:pPr algn="ctr"/>
+            <a:r>
+              <a:rPr lang="en-US" sz="1600" b="1" dirty="0" smtClean="0">
+                <a:solidFill>
+                  <a:schemeClr val="tx1"/>
+                </a:solidFill>
+              </a:rPr>
+              <a:t>4</a:t>
+            </a:r>
+            <a:r>
+              <a:rPr lang="en-US" sz="1600" b="1" dirty="0" smtClean="0">
+                <a:solidFill>
+                  <a:schemeClr val="tx1"/>
+                </a:solidFill>
+              </a:rPr>
+              <a:t>.2.1</a:t>
+            </a:r>
+            <a:endParaRPr lang="en-US" sz="1600" b="1" dirty="0">
+              <a:solidFill>
+                <a:schemeClr val="tx1"/>
+              </a:solidFill>
+            </a:endParaRPr>
+          </a:p>
+        </p:txBody>
+      </p:sp>
+      <p:sp>
+        <p:nvSpPr>
+          <p:cNvPr id="3" name="Oval 2"/>
+          <p:cNvSpPr/>
+          <p:nvPr/>
+        </p:nvSpPr>
+        <p:spPr>
+          <a:xfrm>
+            <a:off x="1524000" y="4419600"/>
+            <a:ext cx="1066800" cy="990600"/>
+          </a:xfrm>
+          <a:prstGeom prst="ellipse">
+            <a:avLst/>
+          </a:prstGeom>
+          <a:solidFill>
+            <a:schemeClr val="bg1"/>
+          </a:solidFill>
+          <a:ln w="6350">
+            <a:solidFill>
+              <a:schemeClr val="tx1"/>
+            </a:solidFill>
+          </a:ln>
+        </p:spPr>
+        <p:style>
+          <a:lnRef idx="2">
+            <a:schemeClr val="accent1">
+              <a:shade val="50000"/>
+            </a:schemeClr>
+          </a:lnRef>
+          <a:fillRef idx="1">
+            <a:schemeClr val="accent1"/>
+          </a:fillRef>
+          <a:effectRef idx="0">
+            <a:schemeClr val="accent1"/>
+          </a:effectRef>
+          <a:fontRef idx="minor">
+            <a:schemeClr val="lt1"/>
+          </a:fontRef>
+        </p:style>
+        <p:txBody>
+          <a:bodyPr rtlCol="0" anchor="ctr"/>
+          <a:lstStyle/>
+          <a:p>
+            <a:pPr algn="ctr"/>
+            <a:r>
+              <a:rPr lang="en-US" sz="800" dirty="0" smtClean="0">
+                <a:solidFill>
+                  <a:schemeClr val="tx1"/>
+                </a:solidFill>
+              </a:rPr>
+              <a:t>Update </a:t>
+            </a:r>
+            <a:r>
+              <a:rPr lang="en-US" sz="800" dirty="0">
+                <a:solidFill>
+                  <a:schemeClr val="tx1"/>
+                </a:solidFill>
+              </a:rPr>
+              <a:t> </a:t>
+            </a:r>
+            <a:r>
+              <a:rPr lang="en-US" sz="800" dirty="0" smtClean="0">
+                <a:solidFill>
+                  <a:schemeClr val="tx1"/>
+                </a:solidFill>
+              </a:rPr>
+              <a:t>exercise details</a:t>
+            </a:r>
+            <a:endParaRPr lang="en-US" sz="800" dirty="0" smtClean="0">
+              <a:solidFill>
+                <a:schemeClr val="tx1"/>
+              </a:solidFill>
+            </a:endParaRPr>
+          </a:p>
+          <a:p>
+            <a:pPr algn="ctr"/>
+            <a:endParaRPr lang="en-US" sz="1200" dirty="0">
+              <a:solidFill>
+                <a:schemeClr val="tx1"/>
+              </a:solidFill>
+            </a:endParaRPr>
+          </a:p>
+          <a:p>
+            <a:pPr algn="ctr"/>
+            <a:r>
+              <a:rPr lang="en-US" sz="1600" b="1" dirty="0" smtClean="0">
+                <a:solidFill>
+                  <a:schemeClr val="tx1"/>
+                </a:solidFill>
+              </a:rPr>
+              <a:t>4.2.3</a:t>
+            </a:r>
+            <a:endParaRPr lang="en-US" sz="1600" b="1" dirty="0">
+              <a:solidFill>
+                <a:schemeClr val="tx1"/>
+              </a:solidFill>
+            </a:endParaRPr>
+          </a:p>
+        </p:txBody>
+      </p:sp>
+      <p:sp>
+        <p:nvSpPr>
+          <p:cNvPr id="4" name="Oval 3"/>
+          <p:cNvSpPr/>
+          <p:nvPr/>
+        </p:nvSpPr>
+        <p:spPr>
+          <a:xfrm>
+            <a:off x="3733800" y="4419600"/>
+            <a:ext cx="990600" cy="990600"/>
+          </a:xfrm>
+          <a:prstGeom prst="ellipse">
+            <a:avLst/>
+          </a:prstGeom>
+          <a:solidFill>
+            <a:schemeClr val="bg1"/>
+          </a:solidFill>
+          <a:ln w="6350">
+            <a:solidFill>
+              <a:schemeClr val="tx1"/>
+            </a:solidFill>
+          </a:ln>
+        </p:spPr>
+        <p:style>
+          <a:lnRef idx="2">
+            <a:schemeClr val="accent1">
+              <a:shade val="50000"/>
+            </a:schemeClr>
+          </a:lnRef>
+          <a:fillRef idx="1">
+            <a:schemeClr val="accent1"/>
+          </a:fillRef>
+          <a:effectRef idx="0">
+            <a:schemeClr val="accent1"/>
+          </a:effectRef>
+          <a:fontRef idx="minor">
+            <a:schemeClr val="lt1"/>
+          </a:fontRef>
+        </p:style>
+        <p:txBody>
+          <a:bodyPr rtlCol="0" anchor="ctr"/>
+          <a:lstStyle/>
+          <a:p>
+            <a:pPr algn="ctr"/>
+            <a:r>
+              <a:rPr lang="en-US" sz="800" dirty="0" smtClean="0">
+                <a:solidFill>
+                  <a:schemeClr val="tx1"/>
+                </a:solidFill>
+              </a:rPr>
+              <a:t>Allow Access to</a:t>
+            </a:r>
+          </a:p>
+          <a:p>
+            <a:pPr algn="ctr"/>
+            <a:r>
+              <a:rPr lang="en-US" sz="800" dirty="0" smtClean="0">
+                <a:solidFill>
+                  <a:schemeClr val="tx1"/>
+                </a:solidFill>
+              </a:rPr>
+              <a:t>Hard level</a:t>
+            </a:r>
+          </a:p>
+          <a:p>
+            <a:pPr algn="ctr"/>
+            <a:endParaRPr lang="en-US" sz="1200" dirty="0">
+              <a:solidFill>
+                <a:schemeClr val="tx1"/>
+              </a:solidFill>
+            </a:endParaRPr>
+          </a:p>
+          <a:p>
+            <a:pPr algn="ctr"/>
+            <a:r>
+              <a:rPr lang="en-US" sz="1600" b="1" dirty="0" smtClean="0">
+                <a:solidFill>
+                  <a:schemeClr val="tx1"/>
+                </a:solidFill>
+              </a:rPr>
+              <a:t>4</a:t>
+            </a:r>
+            <a:r>
+              <a:rPr lang="en-US" sz="1600" b="1" dirty="0" smtClean="0">
+                <a:solidFill>
+                  <a:schemeClr val="tx1"/>
+                </a:solidFill>
+              </a:rPr>
+              <a:t>.2.2</a:t>
+            </a:r>
+            <a:endParaRPr lang="en-US" sz="1600" b="1" dirty="0">
+              <a:solidFill>
+                <a:schemeClr val="tx1"/>
+              </a:solidFill>
+            </a:endParaRPr>
+          </a:p>
+        </p:txBody>
+      </p:sp>
+      <p:cxnSp>
+        <p:nvCxnSpPr>
+          <p:cNvPr id="6" name="Straight Arrow Connector 5"/>
+          <p:cNvCxnSpPr>
+            <a:endCxn id="2" idx="1"/>
+          </p:cNvCxnSpPr>
+          <p:nvPr/>
+        </p:nvCxnSpPr>
+        <p:spPr>
+          <a:xfrm rot="16200000" flipH="1">
+            <a:off x="4076700" y="1790700"/>
+            <a:ext cx="907070" cy="526070"/>
+          </a:xfrm>
+          <a:prstGeom prst="straightConnector1">
+            <a:avLst/>
+          </a:prstGeom>
+          <a:ln>
+            <a:tailEnd type="arrow"/>
+          </a:ln>
+        </p:spPr>
+        <p:style>
+          <a:lnRef idx="1">
+            <a:schemeClr val="dk1"/>
+          </a:lnRef>
+          <a:fillRef idx="0">
+            <a:schemeClr val="dk1"/>
+          </a:fillRef>
+          <a:effectRef idx="0">
+            <a:schemeClr val="dk1"/>
+          </a:effectRef>
+          <a:fontRef idx="minor">
+            <a:schemeClr val="tx1"/>
+          </a:fontRef>
+        </p:style>
+      </p:cxnSp>
+      <p:sp>
+        <p:nvSpPr>
+          <p:cNvPr id="7" name="TextBox 6"/>
+          <p:cNvSpPr txBox="1"/>
+          <p:nvPr/>
+        </p:nvSpPr>
+        <p:spPr>
+          <a:xfrm rot="3578673">
+            <a:off x="4189065" y="1838798"/>
+            <a:ext cx="910827" cy="215444"/>
+          </a:xfrm>
+          <a:prstGeom prst="rect">
+            <a:avLst/>
+          </a:prstGeom>
+          <a:noFill/>
+        </p:spPr>
+        <p:txBody>
+          <a:bodyPr wrap="none" rtlCol="0">
+            <a:spAutoFit/>
+          </a:bodyPr>
+          <a:lstStyle/>
+          <a:p>
+            <a:pPr lvl="0"/>
+            <a:r>
+              <a:rPr lang="en-US" sz="800" kern="0" dirty="0" smtClean="0">
+                <a:solidFill>
+                  <a:srgbClr val="262626"/>
+                </a:solidFill>
+              </a:rPr>
+              <a:t>Exercise  Request</a:t>
+            </a:r>
+            <a:endParaRPr lang="en-US" sz="800" kern="0" dirty="0">
+              <a:solidFill>
+                <a:srgbClr val="262626"/>
+              </a:solidFill>
+            </a:endParaRPr>
+          </a:p>
+        </p:txBody>
+      </p:sp>
+      <p:cxnSp>
+        <p:nvCxnSpPr>
+          <p:cNvPr id="8" name="Straight Arrow Connector 7"/>
+          <p:cNvCxnSpPr>
+            <a:stCxn id="2" idx="6"/>
+          </p:cNvCxnSpPr>
+          <p:nvPr/>
+        </p:nvCxnSpPr>
+        <p:spPr>
+          <a:xfrm>
+            <a:off x="5638800" y="2857500"/>
+            <a:ext cx="1524000" cy="1588"/>
+          </a:xfrm>
+          <a:prstGeom prst="straightConnector1">
+            <a:avLst/>
+          </a:prstGeom>
+          <a:ln>
+            <a:tailEnd type="arrow"/>
+          </a:ln>
+        </p:spPr>
+        <p:style>
+          <a:lnRef idx="1">
+            <a:schemeClr val="dk1"/>
+          </a:lnRef>
+          <a:fillRef idx="0">
+            <a:schemeClr val="dk1"/>
+          </a:fillRef>
+          <a:effectRef idx="0">
+            <a:schemeClr val="dk1"/>
+          </a:effectRef>
+          <a:fontRef idx="minor">
+            <a:schemeClr val="tx1"/>
+          </a:fontRef>
+        </p:style>
+      </p:cxnSp>
+      <p:sp>
+        <p:nvSpPr>
+          <p:cNvPr id="9" name="TextBox 8"/>
+          <p:cNvSpPr txBox="1"/>
+          <p:nvPr/>
+        </p:nvSpPr>
+        <p:spPr>
+          <a:xfrm>
+            <a:off x="5700081" y="2663842"/>
+            <a:ext cx="952505" cy="215444"/>
+          </a:xfrm>
+          <a:prstGeom prst="rect">
+            <a:avLst/>
+          </a:prstGeom>
+          <a:noFill/>
+        </p:spPr>
+        <p:txBody>
+          <a:bodyPr wrap="none" rtlCol="0">
+            <a:spAutoFit/>
+          </a:bodyPr>
+          <a:lstStyle/>
+          <a:p>
+            <a:pPr lvl="0"/>
+            <a:r>
+              <a:rPr lang="en-US" sz="800" kern="0" dirty="0" smtClean="0">
+                <a:solidFill>
+                  <a:srgbClr val="262626"/>
+                </a:solidFill>
+              </a:rPr>
+              <a:t>Query </a:t>
+            </a:r>
+            <a:r>
+              <a:rPr lang="en-US" sz="800" kern="0" dirty="0" smtClean="0">
+                <a:solidFill>
+                  <a:srgbClr val="262626"/>
+                </a:solidFill>
+              </a:rPr>
+              <a:t>user Details</a:t>
+            </a:r>
+            <a:endParaRPr lang="en-US" sz="800" kern="0" dirty="0">
+              <a:solidFill>
+                <a:srgbClr val="262626"/>
+              </a:solidFill>
+            </a:endParaRPr>
+          </a:p>
+        </p:txBody>
+      </p:sp>
+      <p:grpSp>
+        <p:nvGrpSpPr>
+          <p:cNvPr id="5" name="Group 15"/>
+          <p:cNvGrpSpPr/>
+          <p:nvPr/>
+        </p:nvGrpSpPr>
+        <p:grpSpPr>
+          <a:xfrm>
+            <a:off x="7162800" y="2740042"/>
+            <a:ext cx="1371600" cy="228600"/>
+            <a:chOff x="275492" y="2361935"/>
+            <a:chExt cx="1371600" cy="228603"/>
+          </a:xfrm>
+        </p:grpSpPr>
+        <p:sp>
+          <p:nvSpPr>
+            <p:cNvPr id="11" name="Rectangle 10"/>
+            <p:cNvSpPr/>
+            <p:nvPr/>
+          </p:nvSpPr>
+          <p:spPr>
+            <a:xfrm>
+              <a:off x="275492" y="2361935"/>
+              <a:ext cx="1371600" cy="228600"/>
+            </a:xfrm>
+            <a:prstGeom prst="rect">
+              <a:avLst/>
+            </a:prstGeom>
+            <a:solidFill>
+              <a:sysClr val="window" lastClr="FFFFFF"/>
+            </a:solidFill>
+            <a:ln w="6350" cap="flat" cmpd="sng" algn="ctr">
+              <a:solidFill>
+                <a:srgbClr val="4D4D4D"/>
+              </a:solidFill>
+              <a:prstDash val="solid"/>
+            </a:ln>
+            <a:effectLst/>
+          </p:spPr>
+          <p:txBody>
+            <a:bodyPr rtlCol="0" anchor="ctr"/>
+            <a:lstStyle/>
+            <a:p>
+              <a:pPr marL="0" marR="0" lvl="0" indent="0" defTabSz="914400" eaLnBrk="1" fontAlgn="auto" latinLnBrk="0" hangingPunct="1">
+                <a:lnSpc>
+                  <a:spcPct val="100000"/>
+                </a:lnSpc>
+                <a:spcBef>
+                  <a:spcPts val="0"/>
+                </a:spcBef>
+                <a:spcAft>
+                  <a:spcPts val="0"/>
+                </a:spcAft>
+                <a:buClrTx/>
+                <a:buSzTx/>
+                <a:buFontTx/>
+                <a:buNone/>
+                <a:tabLst/>
+                <a:defRPr/>
+              </a:pPr>
+              <a:r>
+                <a:rPr kumimoji="0" lang="en-US" sz="800" b="0" i="0" u="none" strike="noStrike" kern="0" cap="none" spc="0" normalizeH="0" baseline="0" noProof="0" dirty="0" smtClean="0">
+                  <a:ln>
+                    <a:noFill/>
+                  </a:ln>
+                  <a:solidFill>
+                    <a:srgbClr val="262626"/>
+                  </a:solidFill>
+                  <a:effectLst/>
+                  <a:uLnTx/>
+                  <a:uFillTx/>
+                  <a:latin typeface="Ubuntu Condensed"/>
+                  <a:ea typeface="+mn-ea"/>
+                  <a:cs typeface="+mn-cs"/>
+                </a:rPr>
+                <a:t>D1</a:t>
+              </a:r>
+              <a:r>
+                <a:rPr kumimoji="0" lang="en-US" sz="800" b="0" i="0" u="none" strike="noStrike" kern="0" cap="none" spc="0" normalizeH="0" noProof="0" dirty="0" smtClean="0">
+                  <a:ln>
+                    <a:noFill/>
+                  </a:ln>
+                  <a:solidFill>
+                    <a:srgbClr val="262626"/>
+                  </a:solidFill>
+                  <a:effectLst/>
+                  <a:uLnTx/>
+                  <a:uFillTx/>
+                  <a:latin typeface="Ubuntu Condensed"/>
+                  <a:ea typeface="+mn-ea"/>
+                  <a:cs typeface="+mn-cs"/>
+                </a:rPr>
+                <a:t>              </a:t>
+              </a:r>
+              <a:r>
+                <a:rPr kumimoji="0" lang="en-US" sz="800" b="0" i="0" u="none" strike="noStrike" kern="0" cap="none" spc="0" normalizeH="0" baseline="0" noProof="0" dirty="0" smtClean="0">
+                  <a:ln>
+                    <a:noFill/>
+                  </a:ln>
+                  <a:solidFill>
+                    <a:srgbClr val="262626"/>
+                  </a:solidFill>
+                  <a:effectLst/>
+                  <a:uLnTx/>
+                  <a:uFillTx/>
+                  <a:latin typeface="Ubuntu Condensed"/>
+                  <a:ea typeface="+mn-ea"/>
+                  <a:cs typeface="+mn-cs"/>
+                </a:rPr>
+                <a:t>     User details</a:t>
+              </a:r>
+              <a:endParaRPr kumimoji="0" lang="en-US" sz="800" b="0" i="0" u="none" strike="noStrike" kern="0" cap="none" spc="0" normalizeH="0" baseline="0" noProof="0" dirty="0">
+                <a:ln>
+                  <a:noFill/>
+                </a:ln>
+                <a:solidFill>
+                  <a:srgbClr val="262626"/>
+                </a:solidFill>
+                <a:effectLst/>
+                <a:uLnTx/>
+                <a:uFillTx/>
+                <a:latin typeface="Ubuntu Condensed"/>
+                <a:ea typeface="+mn-ea"/>
+                <a:cs typeface="+mn-cs"/>
+              </a:endParaRPr>
+            </a:p>
+          </p:txBody>
+        </p:sp>
+        <p:cxnSp>
+          <p:nvCxnSpPr>
+            <p:cNvPr id="12" name="Straight Connector 11"/>
+            <p:cNvCxnSpPr/>
+            <p:nvPr/>
+          </p:nvCxnSpPr>
+          <p:spPr>
+            <a:xfrm rot="5400000">
+              <a:off x="465198" y="2475444"/>
+              <a:ext cx="228601" cy="1588"/>
+            </a:xfrm>
+            <a:prstGeom prst="line">
+              <a:avLst/>
+            </a:prstGeom>
+            <a:noFill/>
+            <a:ln w="9525" cap="flat" cmpd="sng" algn="ctr">
+              <a:solidFill>
+                <a:srgbClr val="373737">
+                  <a:shade val="95000"/>
+                  <a:satMod val="105000"/>
+                </a:srgbClr>
+              </a:solidFill>
+              <a:prstDash val="solid"/>
+            </a:ln>
+            <a:effectLst/>
+          </p:spPr>
+        </p:cxnSp>
+      </p:grpSp>
+      <p:cxnSp>
+        <p:nvCxnSpPr>
+          <p:cNvPr id="14" name="Straight Arrow Connector 13"/>
+          <p:cNvCxnSpPr>
+            <a:stCxn id="4" idx="2"/>
+            <a:endCxn id="3" idx="6"/>
+          </p:cNvCxnSpPr>
+          <p:nvPr/>
+        </p:nvCxnSpPr>
+        <p:spPr>
+          <a:xfrm flipH="1">
+            <a:off x="2590800" y="4914900"/>
+            <a:ext cx="1143000" cy="0"/>
+          </a:xfrm>
+          <a:prstGeom prst="straightConnector1">
+            <a:avLst/>
+          </a:prstGeom>
+          <a:ln>
+            <a:tailEnd type="arrow"/>
+          </a:ln>
+        </p:spPr>
+        <p:style>
+          <a:lnRef idx="1">
+            <a:schemeClr val="dk1"/>
+          </a:lnRef>
+          <a:fillRef idx="0">
+            <a:schemeClr val="dk1"/>
+          </a:fillRef>
+          <a:effectRef idx="0">
+            <a:schemeClr val="dk1"/>
+          </a:effectRef>
+          <a:fontRef idx="minor">
+            <a:schemeClr val="tx1"/>
+          </a:fontRef>
+        </p:style>
+      </p:cxnSp>
+      <p:cxnSp>
+        <p:nvCxnSpPr>
+          <p:cNvPr id="15" name="Straight Arrow Connector 14"/>
+          <p:cNvCxnSpPr>
+            <a:endCxn id="4" idx="7"/>
+          </p:cNvCxnSpPr>
+          <p:nvPr/>
+        </p:nvCxnSpPr>
+        <p:spPr>
+          <a:xfrm flipH="1">
+            <a:off x="4579330" y="3349642"/>
+            <a:ext cx="487970" cy="1215028"/>
+          </a:xfrm>
+          <a:prstGeom prst="straightConnector1">
+            <a:avLst/>
+          </a:prstGeom>
+          <a:ln>
+            <a:tailEnd type="arrow"/>
+          </a:ln>
+        </p:spPr>
+        <p:style>
+          <a:lnRef idx="1">
+            <a:schemeClr val="dk1"/>
+          </a:lnRef>
+          <a:fillRef idx="0">
+            <a:schemeClr val="dk1"/>
+          </a:fillRef>
+          <a:effectRef idx="0">
+            <a:schemeClr val="dk1"/>
+          </a:effectRef>
+          <a:fontRef idx="minor">
+            <a:schemeClr val="tx1"/>
+          </a:fontRef>
+        </p:style>
+      </p:cxnSp>
+      <p:sp>
+        <p:nvSpPr>
+          <p:cNvPr id="16" name="TextBox 15"/>
+          <p:cNvSpPr txBox="1"/>
+          <p:nvPr/>
+        </p:nvSpPr>
+        <p:spPr>
+          <a:xfrm>
+            <a:off x="2819400" y="4661356"/>
+            <a:ext cx="825867" cy="215444"/>
+          </a:xfrm>
+          <a:prstGeom prst="rect">
+            <a:avLst/>
+          </a:prstGeom>
+          <a:noFill/>
+        </p:spPr>
+        <p:txBody>
+          <a:bodyPr wrap="none" rtlCol="0">
+            <a:spAutoFit/>
+          </a:bodyPr>
+          <a:lstStyle/>
+          <a:p>
+            <a:pPr lvl="0"/>
+            <a:r>
+              <a:rPr lang="en-US" sz="800" kern="0" dirty="0" smtClean="0">
+                <a:solidFill>
+                  <a:srgbClr val="262626"/>
+                </a:solidFill>
+              </a:rPr>
+              <a:t>Request details</a:t>
+            </a:r>
+            <a:endParaRPr lang="en-US" sz="800" kern="0" dirty="0">
+              <a:solidFill>
+                <a:srgbClr val="262626"/>
+              </a:solidFill>
+            </a:endParaRPr>
+          </a:p>
+        </p:txBody>
+      </p:sp>
+      <p:sp>
+        <p:nvSpPr>
+          <p:cNvPr id="17" name="TextBox 16"/>
+          <p:cNvSpPr txBox="1"/>
+          <p:nvPr/>
+        </p:nvSpPr>
+        <p:spPr>
+          <a:xfrm rot="17597323">
+            <a:off x="4112225" y="3767789"/>
+            <a:ext cx="1091966" cy="215444"/>
+          </a:xfrm>
+          <a:prstGeom prst="rect">
+            <a:avLst/>
+          </a:prstGeom>
+          <a:noFill/>
+        </p:spPr>
+        <p:txBody>
+          <a:bodyPr wrap="none" rtlCol="0">
+            <a:spAutoFit/>
+          </a:bodyPr>
+          <a:lstStyle/>
+          <a:p>
+            <a:pPr lvl="0"/>
+            <a:r>
+              <a:rPr lang="en-US" sz="800" kern="0" dirty="0" smtClean="0">
+                <a:solidFill>
+                  <a:srgbClr val="262626"/>
+                </a:solidFill>
+              </a:rPr>
+              <a:t>Authenticate Request</a:t>
+            </a:r>
+            <a:endParaRPr lang="en-US" sz="800" kern="0" dirty="0">
+              <a:solidFill>
+                <a:srgbClr val="262626"/>
+              </a:solidFill>
+            </a:endParaRPr>
+          </a:p>
+        </p:txBody>
+      </p:sp>
+      <p:cxnSp>
+        <p:nvCxnSpPr>
+          <p:cNvPr id="19" name="Straight Arrow Connector 18"/>
+          <p:cNvCxnSpPr>
+            <a:stCxn id="3" idx="1"/>
+          </p:cNvCxnSpPr>
+          <p:nvPr/>
+        </p:nvCxnSpPr>
+        <p:spPr>
+          <a:xfrm rot="16200000" flipV="1">
+            <a:off x="1415279" y="4299719"/>
+            <a:ext cx="373673" cy="156229"/>
+          </a:xfrm>
+          <a:prstGeom prst="straightConnector1">
+            <a:avLst/>
+          </a:prstGeom>
+          <a:ln>
+            <a:tailEnd type="arrow"/>
+          </a:ln>
+        </p:spPr>
+        <p:style>
+          <a:lnRef idx="1">
+            <a:schemeClr val="dk1"/>
+          </a:lnRef>
+          <a:fillRef idx="0">
+            <a:schemeClr val="dk1"/>
+          </a:fillRef>
+          <a:effectRef idx="0">
+            <a:schemeClr val="dk1"/>
+          </a:effectRef>
+          <a:fontRef idx="minor">
+            <a:schemeClr val="tx1"/>
+          </a:fontRef>
+        </p:style>
+      </p:cxnSp>
+      <p:grpSp>
+        <p:nvGrpSpPr>
+          <p:cNvPr id="10" name="Group 15"/>
+          <p:cNvGrpSpPr/>
+          <p:nvPr/>
+        </p:nvGrpSpPr>
+        <p:grpSpPr>
+          <a:xfrm>
+            <a:off x="838200" y="3962400"/>
+            <a:ext cx="1905000" cy="228600"/>
+            <a:chOff x="275492" y="2361935"/>
+            <a:chExt cx="1371600" cy="228603"/>
+          </a:xfrm>
+        </p:grpSpPr>
+        <p:sp>
+          <p:nvSpPr>
+            <p:cNvPr id="21" name="Rectangle 20"/>
+            <p:cNvSpPr/>
+            <p:nvPr/>
+          </p:nvSpPr>
+          <p:spPr>
+            <a:xfrm>
+              <a:off x="275492" y="2361935"/>
+              <a:ext cx="1371600" cy="228600"/>
+            </a:xfrm>
+            <a:prstGeom prst="rect">
+              <a:avLst/>
+            </a:prstGeom>
+            <a:solidFill>
+              <a:sysClr val="window" lastClr="FFFFFF"/>
+            </a:solidFill>
+            <a:ln w="6350" cap="flat" cmpd="sng" algn="ctr">
+              <a:solidFill>
+                <a:srgbClr val="4D4D4D"/>
+              </a:solidFill>
+              <a:prstDash val="solid"/>
+            </a:ln>
+            <a:effectLst/>
+          </p:spPr>
+          <p:txBody>
+            <a:bodyPr rtlCol="0" anchor="ctr"/>
+            <a:lstStyle/>
+            <a:p>
+              <a:pPr lvl="0">
+                <a:defRPr/>
+              </a:pPr>
+              <a:r>
+                <a:rPr kumimoji="0" lang="en-US" sz="800" b="0" i="0" u="none" strike="noStrike" kern="0" cap="none" spc="0" normalizeH="0" baseline="0" noProof="0" dirty="0" smtClean="0">
+                  <a:ln>
+                    <a:noFill/>
+                  </a:ln>
+                  <a:solidFill>
+                    <a:srgbClr val="262626"/>
+                  </a:solidFill>
+                  <a:effectLst/>
+                  <a:uLnTx/>
+                  <a:uFillTx/>
+                  <a:latin typeface="Ubuntu Condensed"/>
+                  <a:ea typeface="+mn-ea"/>
+                  <a:cs typeface="+mn-cs"/>
+                </a:rPr>
+                <a:t>   D3                             </a:t>
+              </a:r>
+              <a:r>
+                <a:rPr kumimoji="0" lang="en-US" sz="800" b="0" i="0" u="none" strike="noStrike" kern="0" cap="none" spc="0" normalizeH="0" baseline="0" noProof="0" dirty="0" smtClean="0">
+                  <a:ln>
+                    <a:noFill/>
+                  </a:ln>
+                  <a:solidFill>
+                    <a:srgbClr val="262626"/>
+                  </a:solidFill>
+                  <a:effectLst/>
+                  <a:uLnTx/>
+                  <a:uFillTx/>
+                  <a:latin typeface="Ubuntu Condensed"/>
+                  <a:ea typeface="+mn-ea"/>
+                  <a:cs typeface="+mn-cs"/>
+                </a:rPr>
+                <a:t>E</a:t>
+              </a:r>
+              <a:r>
+                <a:rPr lang="en-US" sz="800" dirty="0" err="1" smtClean="0"/>
+                <a:t>xercise</a:t>
+              </a:r>
+              <a:r>
+                <a:rPr lang="en-US" sz="800" dirty="0" smtClean="0"/>
+                <a:t> details</a:t>
+              </a:r>
+              <a:endParaRPr kumimoji="0" lang="en-US" sz="800" b="0" i="0" u="none" strike="noStrike" kern="0" cap="none" spc="0" normalizeH="0" baseline="0" noProof="0" dirty="0">
+                <a:ln>
+                  <a:noFill/>
+                </a:ln>
+                <a:solidFill>
+                  <a:srgbClr val="262626"/>
+                </a:solidFill>
+                <a:effectLst/>
+                <a:uLnTx/>
+                <a:uFillTx/>
+                <a:latin typeface="Ubuntu Condensed"/>
+                <a:ea typeface="+mn-ea"/>
+                <a:cs typeface="+mn-cs"/>
+              </a:endParaRPr>
+            </a:p>
+          </p:txBody>
+        </p:sp>
+        <p:cxnSp>
+          <p:nvCxnSpPr>
+            <p:cNvPr id="22" name="Straight Connector 21"/>
+            <p:cNvCxnSpPr/>
+            <p:nvPr/>
+          </p:nvCxnSpPr>
+          <p:spPr>
+            <a:xfrm rot="5400000">
+              <a:off x="465198" y="2475444"/>
+              <a:ext cx="228601" cy="1588"/>
+            </a:xfrm>
+            <a:prstGeom prst="line">
+              <a:avLst/>
+            </a:prstGeom>
+            <a:noFill/>
+            <a:ln w="9525" cap="flat" cmpd="sng" algn="ctr">
+              <a:solidFill>
+                <a:srgbClr val="373737">
+                  <a:shade val="95000"/>
+                  <a:satMod val="105000"/>
+                </a:srgbClr>
+              </a:solidFill>
+              <a:prstDash val="solid"/>
+            </a:ln>
+            <a:effectLst/>
+          </p:spPr>
+        </p:cxnSp>
+      </p:grpSp>
+      <p:cxnSp>
+        <p:nvCxnSpPr>
+          <p:cNvPr id="26" name="Straight Arrow Connector 25"/>
+          <p:cNvCxnSpPr/>
+          <p:nvPr/>
+        </p:nvCxnSpPr>
+        <p:spPr>
+          <a:xfrm rot="10800000" flipV="1">
+            <a:off x="3352799" y="5372099"/>
+            <a:ext cx="609600" cy="876300"/>
+          </a:xfrm>
+          <a:prstGeom prst="straightConnector1">
+            <a:avLst/>
+          </a:prstGeom>
+          <a:ln>
+            <a:tailEnd type="arrow"/>
+          </a:ln>
+        </p:spPr>
+        <p:style>
+          <a:lnRef idx="1">
+            <a:schemeClr val="dk1"/>
+          </a:lnRef>
+          <a:fillRef idx="0">
+            <a:schemeClr val="dk1"/>
+          </a:fillRef>
+          <a:effectRef idx="0">
+            <a:schemeClr val="dk1"/>
+          </a:effectRef>
+          <a:fontRef idx="minor">
+            <a:schemeClr val="tx1"/>
+          </a:fontRef>
+        </p:style>
+      </p:cxnSp>
+      <p:sp>
+        <p:nvSpPr>
+          <p:cNvPr id="27" name="TextBox 26"/>
+          <p:cNvSpPr txBox="1"/>
+          <p:nvPr/>
+        </p:nvSpPr>
+        <p:spPr>
+          <a:xfrm rot="18268963">
+            <a:off x="3100369" y="5568410"/>
+            <a:ext cx="1023037" cy="215444"/>
+          </a:xfrm>
+          <a:prstGeom prst="rect">
+            <a:avLst/>
+          </a:prstGeom>
+          <a:noFill/>
+        </p:spPr>
+        <p:txBody>
+          <a:bodyPr wrap="none" rtlCol="0">
+            <a:spAutoFit/>
+          </a:bodyPr>
+          <a:lstStyle/>
+          <a:p>
+            <a:pPr lvl="0"/>
+            <a:r>
+              <a:rPr lang="en-US" sz="800" kern="0" dirty="0" smtClean="0">
+                <a:solidFill>
+                  <a:srgbClr val="262626"/>
+                </a:solidFill>
+              </a:rPr>
+              <a:t>Accessible Features</a:t>
+            </a:r>
+            <a:endParaRPr lang="en-US" sz="800" kern="0" dirty="0">
+              <a:solidFill>
+                <a:srgbClr val="262626"/>
+              </a:solidFill>
+            </a:endParaRPr>
+          </a:p>
+        </p:txBody>
+      </p:sp>
+    </p:spTree>
+    <p:extLst>
+      <p:ext uri="{BB962C8B-B14F-4D97-AF65-F5344CB8AC3E}">
+        <p14:creationId xmlns:p14="http://schemas.microsoft.com/office/powerpoint/2010/main" xmlns="" val="3088154541"/>
+      </p:ext>
+    </p:extLst>
+  </p:cSld>
+  <p:clrMapOvr>
+    <a:masterClrMapping/>
+  </p:clrMapOvr>
+  <p:timing>
+    <p:tnLst>
+      <p:par>
+        <p:cTn id="1" dur="indefinite" restart="never" nodeType="tmRoot"/>
+      </p:par>
+    </p:tnLst>
+  </p:timing>
 </p:sld>
 </file>
 

</xml_diff>

<commit_message>
little change in process
</commit_message>
<xml_diff>
--- a/report/Child education Diagrams.pptx
+++ b/report/Child education Diagrams.pptx
@@ -8421,15 +8421,16 @@
               <a:pPr algn="ctr"/>
               <a:r>
                 <a:rPr lang="en-US" sz="1400" dirty="0" smtClean="0"/>
-                <a:t>Apply</a:t>
+                <a:t>Request</a:t>
               </a:r>
             </a:p>
             <a:p>
               <a:pPr algn="ctr"/>
               <a:r>
                 <a:rPr lang="en-US" sz="1400" dirty="0" smtClean="0"/>
-                <a:t>request</a:t>
+                <a:t>process</a:t>
               </a:r>
+              <a:endParaRPr lang="en-US" sz="1400" dirty="0" smtClean="0"/>
             </a:p>
           </p:txBody>
         </p:sp>
@@ -8522,9 +8523,10 @@
             <a:p>
               <a:pPr algn="ctr"/>
               <a:r>
-                <a:rPr lang="en-US" sz="1400" dirty="0" smtClean="0"/>
-                <a:t>request</a:t>
+                <a:rPr lang="en-US" sz="1400" smtClean="0"/>
+                <a:t>process</a:t>
               </a:r>
+              <a:endParaRPr lang="en-US" sz="1400" dirty="0" smtClean="0"/>
             </a:p>
           </p:txBody>
         </p:sp>
@@ -10255,7 +10257,6 @@
                 <a:rPr lang="en-US" sz="1400" dirty="0" smtClean="0"/>
                 <a:t>process</a:t>
               </a:r>
-              <a:endParaRPr lang="en-US" sz="1400" dirty="0" smtClean="0"/>
             </a:p>
           </p:txBody>
         </p:sp>
@@ -11037,7 +11038,6 @@
                 <a:rPr lang="en-US" sz="1400" dirty="0" smtClean="0"/>
                 <a:t>process</a:t>
               </a:r>
-              <a:endParaRPr lang="en-US" sz="1400" dirty="0" smtClean="0"/>
             </a:p>
           </p:txBody>
         </p:sp>
@@ -11238,7 +11238,6 @@
                 <a:rPr lang="en-US" sz="1400" dirty="0" smtClean="0"/>
                 <a:t>process</a:t>
               </a:r>
-              <a:endParaRPr lang="en-US" sz="1400" dirty="0" smtClean="0"/>
             </a:p>
           </p:txBody>
         </p:sp>
@@ -11334,7 +11333,6 @@
                 <a:rPr lang="en-US" sz="1400" dirty="0" smtClean="0"/>
                 <a:t>process</a:t>
               </a:r>
-              <a:endParaRPr lang="en-US" sz="1400" dirty="0" smtClean="0"/>
             </a:p>
           </p:txBody>
         </p:sp>
@@ -12037,7 +12035,6 @@
                 <a:rPr lang="en-US" sz="1400" dirty="0" smtClean="0"/>
                 <a:t>process</a:t>
               </a:r>
-              <a:endParaRPr lang="en-US" sz="1400" dirty="0" smtClean="0"/>
             </a:p>
           </p:txBody>
         </p:sp>
@@ -12133,7 +12130,6 @@
                 <a:rPr lang="en-US" sz="1400" dirty="0" smtClean="0"/>
                 <a:t>process</a:t>
               </a:r>
-              <a:endParaRPr lang="en-US" sz="1400" dirty="0" smtClean="0"/>
             </a:p>
           </p:txBody>
         </p:sp>
@@ -12820,7 +12816,6 @@
                 <a:rPr lang="en-US" sz="1400" dirty="0" smtClean="0"/>
                 <a:t>process</a:t>
               </a:r>
-              <a:endParaRPr lang="en-US" sz="1400" dirty="0" smtClean="0"/>
             </a:p>
           </p:txBody>
         </p:sp>
@@ -13032,7 +13027,6 @@
                 <a:rPr lang="en-US" sz="1400" dirty="0" smtClean="0"/>
                 <a:t>process</a:t>
               </a:r>
-              <a:endParaRPr lang="en-US" sz="1400" dirty="0" smtClean="0"/>
             </a:p>
           </p:txBody>
         </p:sp>
@@ -13401,15 +13395,7 @@
                   <a:schemeClr val="tx1"/>
                 </a:solidFill>
               </a:rPr>
-              <a:t>4</a:t>
-            </a:r>
-            <a:r>
-              <a:rPr lang="en-US" sz="1600" b="1" dirty="0" smtClean="0">
-                <a:solidFill>
-                  <a:schemeClr val="tx1"/>
-                </a:solidFill>
-              </a:rPr>
-              <a:t>.2.1</a:t>
+              <a:t>4.2.1</a:t>
             </a:r>
             <a:endParaRPr lang="en-US" sz="1600" b="1" dirty="0">
               <a:solidFill>
@@ -13487,11 +13473,6 @@
               </a:rPr>
               <a:t>exercise details</a:t>
             </a:r>
-            <a:endParaRPr lang="en-US" sz="800" dirty="0" smtClean="0">
-              <a:solidFill>
-                <a:schemeClr val="tx1"/>
-              </a:solidFill>
-            </a:endParaRPr>
           </a:p>
           <a:p>
             <a:pPr algn="ctr"/>
@@ -13599,15 +13580,7 @@
                   <a:schemeClr val="tx1"/>
                 </a:solidFill>
               </a:rPr>
-              <a:t>4</a:t>
-            </a:r>
-            <a:r>
-              <a:rPr lang="en-US" sz="1600" b="1" dirty="0" smtClean="0">
-                <a:solidFill>
-                  <a:schemeClr val="tx1"/>
-                </a:solidFill>
-              </a:rPr>
-              <a:t>.2.2</a:t>
+              <a:t>4.2.2</a:t>
             </a:r>
             <a:endParaRPr lang="en-US" sz="1600" b="1" dirty="0">
               <a:solidFill>
@@ -13755,15 +13728,7 @@
                   <a:srgbClr val="262626"/>
                 </a:solidFill>
               </a:rPr>
-              <a:t>Query </a:t>
-            </a:r>
-            <a:r>
-              <a:rPr lang="en-US" sz="800" kern="0" dirty="0" smtClean="0">
-                <a:solidFill>
-                  <a:srgbClr val="262626"/>
-                </a:solidFill>
-              </a:rPr>
-              <a:t>user Details</a:t>
+              <a:t>Query user Details</a:t>
             </a:r>
             <a:endParaRPr lang="en-US" sz="800" kern="0" dirty="0">
               <a:solidFill>
@@ -14174,24 +14139,7 @@
                   <a:ea typeface="+mn-ea"/>
                   <a:cs typeface="+mn-cs"/>
                 </a:rPr>
-                <a:t>   D3                             </a:t>
-              </a:r>
-              <a:r>
-                <a:rPr kumimoji="0" lang="en-US" sz="800" b="0" i="0" u="none" strike="noStrike" kern="0" cap="none" spc="0" normalizeH="0" baseline="0" noProof="0" dirty="0" smtClean="0">
-                  <a:ln>
-                    <a:noFill/>
-                  </a:ln>
-                  <a:solidFill>
-                    <a:srgbClr val="262626"/>
-                  </a:solidFill>
-                  <a:effectLst/>
-                  <a:uLnTx/>
-                  <a:uFillTx/>
-                  <a:latin typeface="Ubuntu Condensed"/>
-                  <a:ea typeface="+mn-ea"/>
-                  <a:cs typeface="+mn-cs"/>
-                </a:rPr>
-                <a:t>E</a:t>
+                <a:t>   D3                             E</a:t>
               </a:r>
               <a:r>
                 <a:rPr lang="en-US" sz="800" dirty="0" err="1" smtClean="0"/>
@@ -14321,7 +14269,7 @@
     </p:spTree>
     <p:extLst>
       <p:ext uri="{BB962C8B-B14F-4D97-AF65-F5344CB8AC3E}">
-        <p14:creationId xmlns:p14="http://schemas.microsoft.com/office/powerpoint/2010/main" xmlns="" val="3088154541"/>
+        <p14:creationId xmlns="" xmlns:p14="http://schemas.microsoft.com/office/powerpoint/2010/main" val="3088154541"/>
       </p:ext>
     </p:extLst>
   </p:cSld>

</xml_diff>